<commit_message>
Changes in architecture diagram
</commit_message>
<xml_diff>
--- a/resource/RISK GAME.pptx
+++ b/resource/RISK GAME.pptx
@@ -245,7 +245,7 @@
           </a:lstStyle>
           <a:p>
             <a:r>
-              <a:rPr lang="en-US" smtClean="0"/>
+              <a:rPr lang="en-US"/>
               <a:t>Click to edit Master title style</a:t>
             </a:r>
             <a:endParaRPr lang="en-US" dirty="0"/>
@@ -317,7 +317,7 @@
           </a:lstStyle>
           <a:p>
             <a:r>
-              <a:rPr lang="en-US" smtClean="0"/>
+              <a:rPr lang="en-US"/>
               <a:t>Click to edit Master subtitle style</a:t>
             </a:r>
             <a:endParaRPr lang="en-US" dirty="0"/>
@@ -341,7 +341,7 @@
           <a:p>
             <a:fld id="{F5A0DC1E-3DF2-4B67-89A3-6A8F210A898F}" type="datetimeFigureOut">
               <a:rPr lang="en-IN" smtClean="0"/>
-              <a:t>25/02/2021</a:t>
+              <a:t>25-03-2021</a:t>
             </a:fld>
             <a:endParaRPr lang="en-IN"/>
           </a:p>
@@ -473,7 +473,7 @@
           <a:lstStyle/>
           <a:p>
             <a:r>
-              <a:rPr lang="en-US" smtClean="0"/>
+              <a:rPr lang="en-US"/>
               <a:t>Click to edit Master title style</a:t>
             </a:r>
             <a:endParaRPr lang="en-US" dirty="0"/>
@@ -497,35 +497,35 @@
           <a:p>
             <a:pPr lvl="0"/>
             <a:r>
-              <a:rPr lang="en-US" smtClean="0"/>
+              <a:rPr lang="en-US"/>
               <a:t>Click to edit Master text styles</a:t>
             </a:r>
           </a:p>
           <a:p>
             <a:pPr lvl="1"/>
             <a:r>
-              <a:rPr lang="en-US" smtClean="0"/>
+              <a:rPr lang="en-US"/>
               <a:t>Second level</a:t>
             </a:r>
           </a:p>
           <a:p>
             <a:pPr lvl="2"/>
             <a:r>
-              <a:rPr lang="en-US" smtClean="0"/>
+              <a:rPr lang="en-US"/>
               <a:t>Third level</a:t>
             </a:r>
           </a:p>
           <a:p>
             <a:pPr lvl="3"/>
             <a:r>
-              <a:rPr lang="en-US" smtClean="0"/>
+              <a:rPr lang="en-US"/>
               <a:t>Fourth level</a:t>
             </a:r>
           </a:p>
           <a:p>
             <a:pPr lvl="4"/>
             <a:r>
-              <a:rPr lang="en-US" smtClean="0"/>
+              <a:rPr lang="en-US"/>
               <a:t>Fifth level</a:t>
             </a:r>
             <a:endParaRPr lang="en-US" dirty="0"/>
@@ -549,7 +549,7 @@
           <a:p>
             <a:fld id="{F5A0DC1E-3DF2-4B67-89A3-6A8F210A898F}" type="datetimeFigureOut">
               <a:rPr lang="en-IN" smtClean="0"/>
-              <a:t>25/02/2021</a:t>
+              <a:t>25-03-2021</a:t>
             </a:fld>
             <a:endParaRPr lang="en-IN"/>
           </a:p>
@@ -724,7 +724,7 @@
           <a:lstStyle/>
           <a:p>
             <a:r>
-              <a:rPr lang="en-US" smtClean="0"/>
+              <a:rPr lang="en-US"/>
               <a:t>Click to edit Master title style</a:t>
             </a:r>
             <a:endParaRPr lang="en-US" dirty="0"/>
@@ -753,35 +753,35 @@
           <a:p>
             <a:pPr lvl="0"/>
             <a:r>
-              <a:rPr lang="en-US" smtClean="0"/>
+              <a:rPr lang="en-US"/>
               <a:t>Click to edit Master text styles</a:t>
             </a:r>
           </a:p>
           <a:p>
             <a:pPr lvl="1"/>
             <a:r>
-              <a:rPr lang="en-US" smtClean="0"/>
+              <a:rPr lang="en-US"/>
               <a:t>Second level</a:t>
             </a:r>
           </a:p>
           <a:p>
             <a:pPr lvl="2"/>
             <a:r>
-              <a:rPr lang="en-US" smtClean="0"/>
+              <a:rPr lang="en-US"/>
               <a:t>Third level</a:t>
             </a:r>
           </a:p>
           <a:p>
             <a:pPr lvl="3"/>
             <a:r>
-              <a:rPr lang="en-US" smtClean="0"/>
+              <a:rPr lang="en-US"/>
               <a:t>Fourth level</a:t>
             </a:r>
           </a:p>
           <a:p>
             <a:pPr lvl="4"/>
             <a:r>
-              <a:rPr lang="en-US" smtClean="0"/>
+              <a:rPr lang="en-US"/>
               <a:t>Fifth level</a:t>
             </a:r>
             <a:endParaRPr lang="en-US" dirty="0"/>
@@ -805,7 +805,7 @@
           <a:p>
             <a:fld id="{F5A0DC1E-3DF2-4B67-89A3-6A8F210A898F}" type="datetimeFigureOut">
               <a:rPr lang="en-IN" smtClean="0"/>
-              <a:t>25/02/2021</a:t>
+              <a:t>25-03-2021</a:t>
             </a:fld>
             <a:endParaRPr lang="en-IN"/>
           </a:p>
@@ -899,7 +899,7 @@
           <a:lstStyle/>
           <a:p>
             <a:r>
-              <a:rPr lang="en-US" smtClean="0"/>
+              <a:rPr lang="en-US"/>
               <a:t>Click to edit Master title style</a:t>
             </a:r>
             <a:endParaRPr lang="en-US" dirty="0"/>
@@ -923,35 +923,35 @@
           <a:p>
             <a:pPr lvl="0"/>
             <a:r>
-              <a:rPr lang="en-US" smtClean="0"/>
+              <a:rPr lang="en-US"/>
               <a:t>Click to edit Master text styles</a:t>
             </a:r>
           </a:p>
           <a:p>
             <a:pPr lvl="1"/>
             <a:r>
-              <a:rPr lang="en-US" smtClean="0"/>
+              <a:rPr lang="en-US"/>
               <a:t>Second level</a:t>
             </a:r>
           </a:p>
           <a:p>
             <a:pPr lvl="2"/>
             <a:r>
-              <a:rPr lang="en-US" smtClean="0"/>
+              <a:rPr lang="en-US"/>
               <a:t>Third level</a:t>
             </a:r>
           </a:p>
           <a:p>
             <a:pPr lvl="3"/>
             <a:r>
-              <a:rPr lang="en-US" smtClean="0"/>
+              <a:rPr lang="en-US"/>
               <a:t>Fourth level</a:t>
             </a:r>
           </a:p>
           <a:p>
             <a:pPr lvl="4"/>
             <a:r>
-              <a:rPr lang="en-US" smtClean="0"/>
+              <a:rPr lang="en-US"/>
               <a:t>Fifth level</a:t>
             </a:r>
             <a:endParaRPr lang="en-US" dirty="0"/>
@@ -975,7 +975,7 @@
           <a:p>
             <a:fld id="{F5A0DC1E-3DF2-4B67-89A3-6A8F210A898F}" type="datetimeFigureOut">
               <a:rPr lang="en-IN" smtClean="0"/>
-              <a:t>25/02/2021</a:t>
+              <a:t>25-03-2021</a:t>
             </a:fld>
             <a:endParaRPr lang="en-IN"/>
           </a:p>
@@ -1174,7 +1174,7 @@
           </a:lstStyle>
           <a:p>
             <a:r>
-              <a:rPr lang="en-US" smtClean="0"/>
+              <a:rPr lang="en-US"/>
               <a:t>Click to edit Master title style</a:t>
             </a:r>
             <a:endParaRPr lang="en-US" dirty="0"/>
@@ -1295,7 +1295,7 @@
           <a:p>
             <a:pPr lvl="0"/>
             <a:r>
-              <a:rPr lang="en-US" smtClean="0"/>
+              <a:rPr lang="en-US"/>
               <a:t>Click to edit Master text styles</a:t>
             </a:r>
           </a:p>
@@ -1318,7 +1318,7 @@
           <a:p>
             <a:fld id="{F5A0DC1E-3DF2-4B67-89A3-6A8F210A898F}" type="datetimeFigureOut">
               <a:rPr lang="en-IN" smtClean="0"/>
-              <a:t>25/02/2021</a:t>
+              <a:t>25-03-2021</a:t>
             </a:fld>
             <a:endParaRPr lang="en-IN"/>
           </a:p>
@@ -1455,7 +1455,7 @@
           <a:lstStyle/>
           <a:p>
             <a:r>
-              <a:rPr lang="en-US" smtClean="0"/>
+              <a:rPr lang="en-US"/>
               <a:t>Click to edit Master title style</a:t>
             </a:r>
             <a:endParaRPr lang="en-US" dirty="0"/>
@@ -1484,35 +1484,35 @@
           <a:p>
             <a:pPr lvl="0"/>
             <a:r>
-              <a:rPr lang="en-US" smtClean="0"/>
+              <a:rPr lang="en-US"/>
               <a:t>Click to edit Master text styles</a:t>
             </a:r>
           </a:p>
           <a:p>
             <a:pPr lvl="1"/>
             <a:r>
-              <a:rPr lang="en-US" smtClean="0"/>
+              <a:rPr lang="en-US"/>
               <a:t>Second level</a:t>
             </a:r>
           </a:p>
           <a:p>
             <a:pPr lvl="2"/>
             <a:r>
-              <a:rPr lang="en-US" smtClean="0"/>
+              <a:rPr lang="en-US"/>
               <a:t>Third level</a:t>
             </a:r>
           </a:p>
           <a:p>
             <a:pPr lvl="3"/>
             <a:r>
-              <a:rPr lang="en-US" smtClean="0"/>
+              <a:rPr lang="en-US"/>
               <a:t>Fourth level</a:t>
             </a:r>
           </a:p>
           <a:p>
             <a:pPr lvl="4"/>
             <a:r>
-              <a:rPr lang="en-US" smtClean="0"/>
+              <a:rPr lang="en-US"/>
               <a:t>Fifth level</a:t>
             </a:r>
             <a:endParaRPr lang="en-US" dirty="0"/>
@@ -1541,35 +1541,35 @@
           <a:p>
             <a:pPr lvl="0"/>
             <a:r>
-              <a:rPr lang="en-US" smtClean="0"/>
+              <a:rPr lang="en-US"/>
               <a:t>Click to edit Master text styles</a:t>
             </a:r>
           </a:p>
           <a:p>
             <a:pPr lvl="1"/>
             <a:r>
-              <a:rPr lang="en-US" smtClean="0"/>
+              <a:rPr lang="en-US"/>
               <a:t>Second level</a:t>
             </a:r>
           </a:p>
           <a:p>
             <a:pPr lvl="2"/>
             <a:r>
-              <a:rPr lang="en-US" smtClean="0"/>
+              <a:rPr lang="en-US"/>
               <a:t>Third level</a:t>
             </a:r>
           </a:p>
           <a:p>
             <a:pPr lvl="3"/>
             <a:r>
-              <a:rPr lang="en-US" smtClean="0"/>
+              <a:rPr lang="en-US"/>
               <a:t>Fourth level</a:t>
             </a:r>
           </a:p>
           <a:p>
             <a:pPr lvl="4"/>
             <a:r>
-              <a:rPr lang="en-US" smtClean="0"/>
+              <a:rPr lang="en-US"/>
               <a:t>Fifth level</a:t>
             </a:r>
             <a:endParaRPr lang="en-US" dirty="0"/>
@@ -1593,7 +1593,7 @@
           <a:p>
             <a:fld id="{F5A0DC1E-3DF2-4B67-89A3-6A8F210A898F}" type="datetimeFigureOut">
               <a:rPr lang="en-IN" smtClean="0"/>
-              <a:t>25/02/2021</a:t>
+              <a:t>25-03-2021</a:t>
             </a:fld>
             <a:endParaRPr lang="en-IN"/>
           </a:p>
@@ -1692,7 +1692,7 @@
           <a:lstStyle/>
           <a:p>
             <a:r>
-              <a:rPr lang="en-US" smtClean="0"/>
+              <a:rPr lang="en-US"/>
               <a:t>Click to edit Master title style</a:t>
             </a:r>
             <a:endParaRPr lang="en-US" dirty="0"/>
@@ -1764,7 +1764,7 @@
           <a:p>
             <a:pPr lvl="0"/>
             <a:r>
-              <a:rPr lang="en-US" smtClean="0"/>
+              <a:rPr lang="en-US"/>
               <a:t>Click to edit Master text styles</a:t>
             </a:r>
           </a:p>
@@ -1792,35 +1792,35 @@
           <a:p>
             <a:pPr lvl="0"/>
             <a:r>
-              <a:rPr lang="en-US" smtClean="0"/>
+              <a:rPr lang="en-US"/>
               <a:t>Click to edit Master text styles</a:t>
             </a:r>
           </a:p>
           <a:p>
             <a:pPr lvl="1"/>
             <a:r>
-              <a:rPr lang="en-US" smtClean="0"/>
+              <a:rPr lang="en-US"/>
               <a:t>Second level</a:t>
             </a:r>
           </a:p>
           <a:p>
             <a:pPr lvl="2"/>
             <a:r>
-              <a:rPr lang="en-US" smtClean="0"/>
+              <a:rPr lang="en-US"/>
               <a:t>Third level</a:t>
             </a:r>
           </a:p>
           <a:p>
             <a:pPr lvl="3"/>
             <a:r>
-              <a:rPr lang="en-US" smtClean="0"/>
+              <a:rPr lang="en-US"/>
               <a:t>Fourth level</a:t>
             </a:r>
           </a:p>
           <a:p>
             <a:pPr lvl="4"/>
             <a:r>
-              <a:rPr lang="en-US" smtClean="0"/>
+              <a:rPr lang="en-US"/>
               <a:t>Fifth level</a:t>
             </a:r>
             <a:endParaRPr lang="en-US" dirty="0"/>
@@ -1892,7 +1892,7 @@
           <a:p>
             <a:pPr lvl="0"/>
             <a:r>
-              <a:rPr lang="en-US" smtClean="0"/>
+              <a:rPr lang="en-US"/>
               <a:t>Click to edit Master text styles</a:t>
             </a:r>
           </a:p>
@@ -1920,35 +1920,35 @@
           <a:p>
             <a:pPr lvl="0"/>
             <a:r>
-              <a:rPr lang="en-US" smtClean="0"/>
+              <a:rPr lang="en-US"/>
               <a:t>Click to edit Master text styles</a:t>
             </a:r>
           </a:p>
           <a:p>
             <a:pPr lvl="1"/>
             <a:r>
-              <a:rPr lang="en-US" smtClean="0"/>
+              <a:rPr lang="en-US"/>
               <a:t>Second level</a:t>
             </a:r>
           </a:p>
           <a:p>
             <a:pPr lvl="2"/>
             <a:r>
-              <a:rPr lang="en-US" smtClean="0"/>
+              <a:rPr lang="en-US"/>
               <a:t>Third level</a:t>
             </a:r>
           </a:p>
           <a:p>
             <a:pPr lvl="3"/>
             <a:r>
-              <a:rPr lang="en-US" smtClean="0"/>
+              <a:rPr lang="en-US"/>
               <a:t>Fourth level</a:t>
             </a:r>
           </a:p>
           <a:p>
             <a:pPr lvl="4"/>
             <a:r>
-              <a:rPr lang="en-US" smtClean="0"/>
+              <a:rPr lang="en-US"/>
               <a:t>Fifth level</a:t>
             </a:r>
             <a:endParaRPr lang="en-US" dirty="0"/>
@@ -1972,7 +1972,7 @@
           <a:p>
             <a:fld id="{F5A0DC1E-3DF2-4B67-89A3-6A8F210A898F}" type="datetimeFigureOut">
               <a:rPr lang="en-IN" smtClean="0"/>
-              <a:t>25/02/2021</a:t>
+              <a:t>25-03-2021</a:t>
             </a:fld>
             <a:endParaRPr lang="en-IN"/>
           </a:p>
@@ -2066,7 +2066,7 @@
           <a:lstStyle/>
           <a:p>
             <a:r>
-              <a:rPr lang="en-US" smtClean="0"/>
+              <a:rPr lang="en-US"/>
               <a:t>Click to edit Master title style</a:t>
             </a:r>
             <a:endParaRPr lang="en-US" dirty="0"/>
@@ -2090,7 +2090,7 @@
           <a:p>
             <a:fld id="{F5A0DC1E-3DF2-4B67-89A3-6A8F210A898F}" type="datetimeFigureOut">
               <a:rPr lang="en-IN" smtClean="0"/>
-              <a:t>25/02/2021</a:t>
+              <a:t>25-03-2021</a:t>
             </a:fld>
             <a:endParaRPr lang="en-IN"/>
           </a:p>
@@ -2261,7 +2261,7 @@
           <a:p>
             <a:fld id="{F5A0DC1E-3DF2-4B67-89A3-6A8F210A898F}" type="datetimeFigureOut">
               <a:rPr lang="en-IN" smtClean="0"/>
-              <a:t>25/02/2021</a:t>
+              <a:t>25-03-2021</a:t>
             </a:fld>
             <a:endParaRPr lang="en-IN"/>
           </a:p>
@@ -2454,7 +2454,7 @@
           </a:lstStyle>
           <a:p>
             <a:r>
-              <a:rPr lang="en-US" smtClean="0"/>
+              <a:rPr lang="en-US"/>
               <a:t>Click to edit Master title style</a:t>
             </a:r>
             <a:endParaRPr lang="en-US" dirty="0"/>
@@ -2483,35 +2483,35 @@
           <a:p>
             <a:pPr lvl="0"/>
             <a:r>
-              <a:rPr lang="en-US" smtClean="0"/>
+              <a:rPr lang="en-US"/>
               <a:t>Click to edit Master text styles</a:t>
             </a:r>
           </a:p>
           <a:p>
             <a:pPr lvl="1"/>
             <a:r>
-              <a:rPr lang="en-US" smtClean="0"/>
+              <a:rPr lang="en-US"/>
               <a:t>Second level</a:t>
             </a:r>
           </a:p>
           <a:p>
             <a:pPr lvl="2"/>
             <a:r>
-              <a:rPr lang="en-US" smtClean="0"/>
+              <a:rPr lang="en-US"/>
               <a:t>Third level</a:t>
             </a:r>
           </a:p>
           <a:p>
             <a:pPr lvl="3"/>
             <a:r>
-              <a:rPr lang="en-US" smtClean="0"/>
+              <a:rPr lang="en-US"/>
               <a:t>Fourth level</a:t>
             </a:r>
           </a:p>
           <a:p>
             <a:pPr lvl="4"/>
             <a:r>
-              <a:rPr lang="en-US" smtClean="0"/>
+              <a:rPr lang="en-US"/>
               <a:t>Fifth level</a:t>
             </a:r>
             <a:endParaRPr lang="en-US" dirty="0"/>
@@ -2583,7 +2583,7 @@
           <a:p>
             <a:pPr lvl="0"/>
             <a:r>
-              <a:rPr lang="en-US" smtClean="0"/>
+              <a:rPr lang="en-US"/>
               <a:t>Click to edit Master text styles</a:t>
             </a:r>
           </a:p>
@@ -2615,7 +2615,7 @@
           <a:p>
             <a:fld id="{F5A0DC1E-3DF2-4B67-89A3-6A8F210A898F}" type="datetimeFigureOut">
               <a:rPr lang="en-IN" smtClean="0"/>
-              <a:t>25/02/2021</a:t>
+              <a:t>25-03-2021</a:t>
             </a:fld>
             <a:endParaRPr lang="en-IN"/>
           </a:p>
@@ -2821,7 +2821,7 @@
           </a:lstStyle>
           <a:p>
             <a:r>
-              <a:rPr lang="en-US" smtClean="0"/>
+              <a:rPr lang="en-US"/>
               <a:t>Click to edit Master title style</a:t>
             </a:r>
             <a:endParaRPr lang="en-US" dirty="0"/>
@@ -2891,7 +2891,7 @@
           </a:lstStyle>
           <a:p>
             <a:r>
-              <a:rPr lang="en-US" smtClean="0"/>
+              <a:rPr lang="en-US"/>
               <a:t>Click icon to add picture</a:t>
             </a:r>
             <a:endParaRPr lang="en-US" dirty="0"/>
@@ -2969,7 +2969,7 @@
           <a:p>
             <a:pPr lvl="0"/>
             <a:r>
-              <a:rPr lang="en-US" smtClean="0"/>
+              <a:rPr lang="en-US"/>
               <a:t>Click to edit Master text styles</a:t>
             </a:r>
           </a:p>
@@ -2992,7 +2992,7 @@
           <a:p>
             <a:fld id="{F5A0DC1E-3DF2-4B67-89A3-6A8F210A898F}" type="datetimeFigureOut">
               <a:rPr lang="en-IN" smtClean="0"/>
-              <a:t>25/02/2021</a:t>
+              <a:t>25-03-2021</a:t>
             </a:fld>
             <a:endParaRPr lang="en-IN"/>
           </a:p>
@@ -3177,7 +3177,7 @@
           <a:lstStyle/>
           <a:p>
             <a:r>
-              <a:rPr lang="en-US" smtClean="0"/>
+              <a:rPr lang="en-US"/>
               <a:t>Click to edit Master title style</a:t>
             </a:r>
             <a:endParaRPr lang="en-US" dirty="0"/>
@@ -3211,35 +3211,35 @@
           <a:p>
             <a:pPr lvl="0"/>
             <a:r>
-              <a:rPr lang="en-US" smtClean="0"/>
+              <a:rPr lang="en-US"/>
               <a:t>Click to edit Master text styles</a:t>
             </a:r>
           </a:p>
           <a:p>
             <a:pPr lvl="1"/>
             <a:r>
-              <a:rPr lang="en-US" smtClean="0"/>
+              <a:rPr lang="en-US"/>
               <a:t>Second level</a:t>
             </a:r>
           </a:p>
           <a:p>
             <a:pPr lvl="2"/>
             <a:r>
-              <a:rPr lang="en-US" smtClean="0"/>
+              <a:rPr lang="en-US"/>
               <a:t>Third level</a:t>
             </a:r>
           </a:p>
           <a:p>
             <a:pPr lvl="3"/>
             <a:r>
-              <a:rPr lang="en-US" smtClean="0"/>
+              <a:rPr lang="en-US"/>
               <a:t>Fourth level</a:t>
             </a:r>
           </a:p>
           <a:p>
             <a:pPr lvl="4"/>
             <a:r>
-              <a:rPr lang="en-US" smtClean="0"/>
+              <a:rPr lang="en-US"/>
               <a:t>Fifth level</a:t>
             </a:r>
             <a:endParaRPr lang="en-US" dirty="0"/>
@@ -3279,7 +3279,7 @@
           <a:p>
             <a:fld id="{F5A0DC1E-3DF2-4B67-89A3-6A8F210A898F}" type="datetimeFigureOut">
               <a:rPr lang="en-IN" smtClean="0"/>
-              <a:t>25/02/2021</a:t>
+              <a:t>25-03-2021</a:t>
             </a:fld>
             <a:endParaRPr lang="en-IN"/>
           </a:p>
@@ -3835,7 +3835,7 @@
             </a:br>
             <a:r>
               <a:rPr lang="en-US" sz="6000" dirty="0"/>
-              <a:t>BUILD 1</a:t>
+              <a:t>BUILD 2</a:t>
             </a:r>
             <a:br>
               <a:rPr lang="en-US" sz="6000" dirty="0"/>
@@ -3849,21 +3849,17 @@
             </a:br>
             <a:r>
               <a:rPr lang="en-US" sz="3000" dirty="0"/>
-              <a:t>SOEN 6441 Winter </a:t>
-            </a:r>
-            <a:r>
-              <a:rPr lang="en-US" sz="3000" dirty="0" smtClean="0"/>
-              <a:t>2021</a:t>
+              <a:t>SOEN 6441 Winter 2021</a:t>
             </a:r>
             <a:br>
-              <a:rPr lang="en-US" sz="3000" dirty="0" smtClean="0"/>
+              <a:rPr lang="en-US" sz="3000" dirty="0"/>
             </a:br>
             <a:r>
-              <a:rPr lang="en-US" sz="1800" dirty="0" smtClean="0"/>
+              <a:rPr lang="en-US" sz="1800" dirty="0"/>
               <a:t>Submitted to: Dr. Joey </a:t>
             </a:r>
             <a:r>
-              <a:rPr lang="en-US" sz="1800" dirty="0" err="1" smtClean="0"/>
+              <a:rPr lang="en-US" sz="1800" dirty="0" err="1"/>
               <a:t>Paquet</a:t>
             </a:r>
             <a:endParaRPr lang="en-IN" sz="1800" dirty="0"/>
@@ -3908,20 +3904,7 @@
                 <a:ea typeface="+mj-ea"/>
                 <a:cs typeface="+mj-cs"/>
               </a:rPr>
-              <a:t>40164014 - AKSHITA </a:t>
-            </a:r>
-            <a:r>
-              <a:rPr lang="en-IN" sz="6000" spc="-50" dirty="0" smtClean="0">
-                <a:solidFill>
-                  <a:schemeClr val="tx1">
-                    <a:lumMod val="85000"/>
-                    <a:lumOff val="15000"/>
-                  </a:schemeClr>
-                </a:solidFill>
-                <a:ea typeface="+mj-ea"/>
-                <a:cs typeface="+mj-cs"/>
-              </a:rPr>
-              <a:t>PATEL</a:t>
+              <a:t>40164014 - AKSHITA PATEL</a:t>
             </a:r>
           </a:p>
           <a:p>
@@ -3930,19 +3913,6 @@
                 <a:spcPct val="120000"/>
               </a:lnSpc>
             </a:pPr>
-            <a:r>
-              <a:rPr lang="en-IN" sz="6000" spc="-50" dirty="0" smtClean="0">
-                <a:solidFill>
-                  <a:schemeClr val="tx1">
-                    <a:lumMod val="85000"/>
-                    <a:lumOff val="15000"/>
-                  </a:schemeClr>
-                </a:solidFill>
-                <a:ea typeface="+mj-ea"/>
-                <a:cs typeface="+mj-cs"/>
-              </a:rPr>
-              <a:t>40166917 </a:t>
-            </a:r>
             <a:r>
               <a:rPr lang="en-IN" sz="6000" spc="-50" dirty="0">
                 <a:solidFill>
@@ -3954,7 +3924,7 @@
                 <a:ea typeface="+mj-ea"/>
                 <a:cs typeface="+mj-cs"/>
               </a:rPr>
-              <a:t>- MEGHAKSH  BRAHMBHATT</a:t>
+              <a:t>40166917 - MEGHAKSH  BRAHMBHATT</a:t>
             </a:r>
           </a:p>
           <a:p>
@@ -3974,20 +3944,7 @@
                 <a:ea typeface="+mj-ea"/>
                 <a:cs typeface="+mj-cs"/>
               </a:rPr>
-              <a:t>40172740 - RAJKUMAR </a:t>
-            </a:r>
-            <a:r>
-              <a:rPr lang="en-IN" sz="6000" spc="-50" dirty="0" smtClean="0">
-                <a:solidFill>
-                  <a:schemeClr val="tx1">
-                    <a:lumMod val="85000"/>
-                    <a:lumOff val="15000"/>
-                  </a:schemeClr>
-                </a:solidFill>
-                <a:ea typeface="+mj-ea"/>
-                <a:cs typeface="+mj-cs"/>
-              </a:rPr>
-              <a:t>ROKALI  </a:t>
+              <a:t>40172740 - RAJKUMAR ROKALI  </a:t>
             </a:r>
           </a:p>
           <a:p>
@@ -3996,19 +3953,6 @@
                 <a:spcPct val="120000"/>
               </a:lnSpc>
             </a:pPr>
-            <a:r>
-              <a:rPr lang="en-IN" sz="6000" spc="-50" dirty="0" smtClean="0">
-                <a:solidFill>
-                  <a:schemeClr val="tx1">
-                    <a:lumMod val="85000"/>
-                    <a:lumOff val="15000"/>
-                  </a:schemeClr>
-                </a:solidFill>
-                <a:ea typeface="+mj-ea"/>
-                <a:cs typeface="+mj-cs"/>
-              </a:rPr>
-              <a:t>40162295 </a:t>
-            </a:r>
             <a:r>
               <a:rPr lang="en-IN" sz="6000" spc="-50" dirty="0">
                 <a:solidFill>
@@ -4020,7 +3964,7 @@
                 <a:ea typeface="+mj-ea"/>
                 <a:cs typeface="+mj-cs"/>
               </a:rPr>
-              <a:t>- SARVESH RAYTER</a:t>
+              <a:t>40162295 - SARVESH RAYTER</a:t>
             </a:r>
           </a:p>
           <a:p>
@@ -4044,10 +3988,6 @@
             </a:r>
           </a:p>
           <a:p>
-            <a:r>
-              <a:rPr lang="en-IN" dirty="0"/>
-              <a:t/>
-            </a:r>
             <a:br>
               <a:rPr lang="en-IN" dirty="0"/>
             </a:br>
@@ -4143,10 +4083,9 @@
           <a:p>
             <a:pPr algn="ctr"/>
             <a:r>
-              <a:rPr lang="en-IN" dirty="0" smtClean="0"/>
+              <a:rPr lang="en-IN" dirty="0"/>
               <a:t>FLOW OF THE PRESENTATION</a:t>
             </a:r>
-            <a:endParaRPr lang="en-IN" dirty="0"/>
           </a:p>
         </p:txBody>
       </p:sp>
@@ -4166,42 +4105,30 @@
           <a:lstStyle/>
           <a:p>
             <a:r>
-              <a:rPr lang="en-IN" dirty="0" smtClean="0"/>
-              <a:t>1. </a:t>
-            </a:r>
-            <a:r>
-              <a:rPr lang="en-IN" dirty="0" smtClean="0"/>
-              <a:t>Architectural design of the Project.</a:t>
-            </a:r>
-            <a:endParaRPr lang="en-IN" dirty="0" smtClean="0"/>
-          </a:p>
-          <a:p>
-            <a:r>
               <a:rPr lang="en-IN" dirty="0"/>
-              <a:t>2</a:t>
-            </a:r>
-            <a:r>
-              <a:rPr lang="en-IN" dirty="0" smtClean="0"/>
-              <a:t>. </a:t>
-            </a:r>
-            <a:r>
-              <a:rPr lang="en-IN" dirty="0" smtClean="0"/>
-              <a:t>Demonstration of functional requirements.</a:t>
-            </a:r>
-            <a:endParaRPr lang="en-IN" dirty="0" smtClean="0"/>
+              <a:t>1. Architectural design of the Project.</a:t>
+            </a:r>
           </a:p>
           <a:p>
             <a:r>
               <a:rPr lang="en-IN" dirty="0"/>
-              <a:t>3</a:t>
-            </a:r>
-            <a:r>
-              <a:rPr lang="en-IN" dirty="0" smtClean="0"/>
-              <a:t>. </a:t>
-            </a:r>
-            <a:r>
-              <a:rPr lang="en-IN" dirty="0" smtClean="0"/>
-              <a:t>Coding Conventions and tools used.</a:t>
+              <a:t>2. Demonstration of functional requirements.</a:t>
+            </a:r>
+          </a:p>
+          <a:p>
+            <a:r>
+              <a:rPr lang="en-IN" dirty="0"/>
+              <a:t>3. Coding Conventions and tools used.</a:t>
+            </a:r>
+          </a:p>
+          <a:p>
+            <a:r>
+              <a:rPr lang="en-IN" dirty="0"/>
+              <a:t>4. Discussion of </a:t>
+            </a:r>
+            <a:r>
+              <a:rPr lang="en-IN"/>
+              <a:t>Refactoring document.</a:t>
             </a:r>
             <a:endParaRPr lang="en-IN" dirty="0"/>
           </a:p>
@@ -4295,10 +4222,9 @@
           <a:p>
             <a:pPr algn="ctr"/>
             <a:r>
-              <a:rPr lang="en-IN" dirty="0" smtClean="0"/>
+              <a:rPr lang="en-IN" dirty="0"/>
               <a:t>ARCHITECTURAL DESIGN</a:t>
             </a:r>
-            <a:endParaRPr lang="en-IN" dirty="0"/>
           </a:p>
         </p:txBody>
       </p:sp>
@@ -4326,18 +4252,13 @@
           <a:p>
             <a:pPr algn="ctr"/>
             <a:r>
-              <a:rPr lang="en-IN" b="1" dirty="0" smtClean="0">
+              <a:rPr lang="en-IN" b="1" dirty="0">
                 <a:solidFill>
                   <a:schemeClr val="bg1"/>
                 </a:solidFill>
               </a:rPr>
               <a:t>MODEL</a:t>
             </a:r>
-            <a:endParaRPr lang="en-IN" b="1" dirty="0">
-              <a:solidFill>
-                <a:schemeClr val="bg1"/>
-              </a:solidFill>
-            </a:endParaRPr>
           </a:p>
         </p:txBody>
       </p:sp>
@@ -4365,18 +4286,13 @@
           <a:p>
             <a:pPr algn="ctr"/>
             <a:r>
-              <a:rPr lang="en-IN" b="1" dirty="0" smtClean="0">
+              <a:rPr lang="en-IN" b="1" dirty="0">
                 <a:solidFill>
                   <a:schemeClr val="bg1"/>
                 </a:solidFill>
               </a:rPr>
               <a:t>CONTROLLR</a:t>
             </a:r>
-            <a:endParaRPr lang="en-IN" b="1" dirty="0">
-              <a:solidFill>
-                <a:schemeClr val="bg1"/>
-              </a:solidFill>
-            </a:endParaRPr>
           </a:p>
         </p:txBody>
       </p:sp>
@@ -4404,18 +4320,13 @@
           <a:p>
             <a:pPr algn="ctr"/>
             <a:r>
-              <a:rPr lang="en-IN" b="1" dirty="0" smtClean="0">
+              <a:rPr lang="en-IN" b="1" dirty="0">
                 <a:solidFill>
                   <a:schemeClr val="bg1"/>
                 </a:solidFill>
               </a:rPr>
               <a:t>VIEW</a:t>
             </a:r>
-            <a:endParaRPr lang="en-IN" b="1" dirty="0">
-              <a:solidFill>
-                <a:schemeClr val="bg1"/>
-              </a:solidFill>
-            </a:endParaRPr>
           </a:p>
         </p:txBody>
       </p:sp>
@@ -4427,8 +4338,8 @@
         </p:nvSpPr>
         <p:spPr>
           <a:xfrm>
-            <a:off x="5917842" y="2227087"/>
-            <a:ext cx="2202287" cy="1223493"/>
+            <a:off x="4298585" y="1828801"/>
+            <a:ext cx="1522870" cy="1306726"/>
           </a:xfrm>
           <a:prstGeom prst="rect">
             <a:avLst/>
@@ -4467,8 +4378,8 @@
         </p:nvSpPr>
         <p:spPr>
           <a:xfrm>
-            <a:off x="8953393" y="4166245"/>
-            <a:ext cx="2202287" cy="1223493"/>
+            <a:off x="5284666" y="3752112"/>
+            <a:ext cx="1311900" cy="1483911"/>
           </a:xfrm>
           <a:prstGeom prst="rect">
             <a:avLst/>
@@ -4507,8 +4418,8 @@
         </p:nvSpPr>
         <p:spPr>
           <a:xfrm>
-            <a:off x="3145774" y="4166244"/>
-            <a:ext cx="2202287" cy="1223493"/>
+            <a:off x="2613927" y="3661172"/>
+            <a:ext cx="1134193" cy="630107"/>
           </a:xfrm>
           <a:prstGeom prst="rect">
             <a:avLst/>
@@ -4547,8 +4458,8 @@
         </p:nvSpPr>
         <p:spPr>
           <a:xfrm>
-            <a:off x="406974" y="2227087"/>
-            <a:ext cx="2202287" cy="1223493"/>
+            <a:off x="1475069" y="2820473"/>
+            <a:ext cx="1134192" cy="630107"/>
           </a:xfrm>
           <a:prstGeom prst="rect">
             <a:avLst/>
@@ -4583,14 +4494,16 @@
         <p:nvCxnSpPr>
           <p:cNvPr id="18" name="Elbow Connector 17"/>
           <p:cNvCxnSpPr>
+            <a:cxnSpLocks/>
+            <a:stCxn id="12" idx="3"/>
             <a:endCxn id="15" idx="0"/>
           </p:cNvCxnSpPr>
           <p:nvPr/>
         </p:nvCxnSpPr>
         <p:spPr>
           <a:xfrm>
-            <a:off x="8120129" y="2807594"/>
-            <a:ext cx="1934408" cy="1358651"/>
+            <a:off x="5821455" y="2482164"/>
+            <a:ext cx="119161" cy="1269948"/>
           </a:xfrm>
           <a:prstGeom prst="bentConnector2">
             <a:avLst/>
@@ -4617,13 +4530,17 @@
       <p:cxnSp>
         <p:nvCxnSpPr>
           <p:cNvPr id="20" name="Elbow Connector 19"/>
-          <p:cNvCxnSpPr/>
+          <p:cNvCxnSpPr>
+            <a:cxnSpLocks/>
+            <a:stCxn id="15" idx="1"/>
+            <a:endCxn id="12" idx="2"/>
+          </p:cNvCxnSpPr>
           <p:nvPr/>
         </p:nvCxnSpPr>
         <p:spPr>
           <a:xfrm rot="10800000">
-            <a:off x="7817096" y="3450580"/>
-            <a:ext cx="1934407" cy="1327412"/>
+            <a:off x="5060020" y="3135528"/>
+            <a:ext cx="224646" cy="1358541"/>
           </a:xfrm>
           <a:prstGeom prst="bentConnector2">
             <a:avLst/>
@@ -4651,6 +4568,7 @@
         <p:nvCxnSpPr>
           <p:cNvPr id="26" name="Elbow Connector 25"/>
           <p:cNvCxnSpPr>
+            <a:cxnSpLocks/>
             <a:stCxn id="16" idx="0"/>
             <a:endCxn id="12" idx="1"/>
           </p:cNvCxnSpPr>
@@ -4658,8 +4576,8 @@
         </p:nvCxnSpPr>
         <p:spPr>
           <a:xfrm rot="5400000" flipH="1" flipV="1">
-            <a:off x="4418675" y="2667077"/>
-            <a:ext cx="1327410" cy="1670924"/>
+            <a:off x="3150300" y="2512888"/>
+            <a:ext cx="1179008" cy="1117561"/>
           </a:xfrm>
           <a:prstGeom prst="bentConnector2">
             <a:avLst/>
@@ -4691,8 +4609,8 @@
         </p:nvSpPr>
         <p:spPr>
           <a:xfrm>
-            <a:off x="6193376" y="2560194"/>
-            <a:ext cx="1622358" cy="369332"/>
+            <a:off x="8704490" y="3117813"/>
+            <a:ext cx="1610916" cy="369332"/>
           </a:xfrm>
           <a:prstGeom prst="rect">
             <a:avLst/>
@@ -4707,30 +4625,25 @@
           <a:p>
             <a:pPr algn="ctr"/>
             <a:r>
-              <a:rPr lang="en-IN" b="1" dirty="0" smtClean="0">
+              <a:rPr lang="en-IN" b="1" dirty="0">
                 <a:solidFill>
                   <a:schemeClr val="bg1"/>
                 </a:solidFill>
               </a:rPr>
               <a:t>CONTROLLER</a:t>
             </a:r>
-            <a:endParaRPr lang="en-IN" b="1" dirty="0">
-              <a:solidFill>
-                <a:schemeClr val="bg1"/>
-              </a:solidFill>
-            </a:endParaRPr>
-          </a:p>
-        </p:txBody>
-      </p:sp>
-      <p:sp>
-        <p:nvSpPr>
-          <p:cNvPr id="34" name="TextBox 33"/>
+          </a:p>
+        </p:txBody>
+      </p:sp>
+      <p:sp>
+        <p:nvSpPr>
+          <p:cNvPr id="35" name="TextBox 34"/>
           <p:cNvSpPr txBox="1"/>
           <p:nvPr/>
         </p:nvSpPr>
         <p:spPr>
           <a:xfrm>
-            <a:off x="9214272" y="4593509"/>
+            <a:off x="2342934" y="3690411"/>
             <a:ext cx="1622358" cy="369332"/>
           </a:xfrm>
           <a:prstGeom prst="rect">
@@ -4746,57 +4659,13 @@
           <a:p>
             <a:pPr algn="ctr"/>
             <a:r>
-              <a:rPr lang="en-IN" b="1" dirty="0" smtClean="0">
-                <a:solidFill>
-                  <a:schemeClr val="bg1"/>
-                </a:solidFill>
-              </a:rPr>
-              <a:t>MODEL</a:t>
-            </a:r>
-            <a:endParaRPr lang="en-IN" b="1" dirty="0">
-              <a:solidFill>
-                <a:schemeClr val="bg1"/>
-              </a:solidFill>
-            </a:endParaRPr>
-          </a:p>
-        </p:txBody>
-      </p:sp>
-      <p:sp>
-        <p:nvSpPr>
-          <p:cNvPr id="35" name="TextBox 34"/>
-          <p:cNvSpPr txBox="1"/>
-          <p:nvPr/>
-        </p:nvSpPr>
-        <p:spPr>
-          <a:xfrm>
-            <a:off x="3349077" y="4593324"/>
-            <a:ext cx="1622358" cy="369332"/>
-          </a:xfrm>
-          <a:prstGeom prst="rect">
-            <a:avLst/>
-          </a:prstGeom>
-          <a:noFill/>
-        </p:spPr>
-        <p:txBody>
-          <a:bodyPr wrap="square" rtlCol="0">
-            <a:spAutoFit/>
-          </a:bodyPr>
-          <a:lstStyle/>
-          <a:p>
-            <a:pPr algn="ctr"/>
-            <a:r>
-              <a:rPr lang="en-IN" b="1" dirty="0" smtClean="0">
+              <a:rPr lang="en-IN" b="1" dirty="0">
                 <a:solidFill>
                   <a:schemeClr val="bg1"/>
                 </a:solidFill>
               </a:rPr>
               <a:t>VIEW</a:t>
             </a:r>
-            <a:endParaRPr lang="en-IN" b="1" dirty="0">
-              <a:solidFill>
-                <a:schemeClr val="bg1"/>
-              </a:solidFill>
-            </a:endParaRPr>
           </a:p>
         </p:txBody>
       </p:sp>
@@ -4808,8 +4677,8 @@
         </p:nvSpPr>
         <p:spPr>
           <a:xfrm>
-            <a:off x="679466" y="2619708"/>
-            <a:ext cx="1622358" cy="369332"/>
+            <a:off x="1537525" y="2941680"/>
+            <a:ext cx="893329" cy="369332"/>
           </a:xfrm>
           <a:prstGeom prst="rect">
             <a:avLst/>
@@ -4824,18 +4693,13 @@
           <a:p>
             <a:pPr algn="ctr"/>
             <a:r>
-              <a:rPr lang="en-IN" b="1" dirty="0" smtClean="0">
+              <a:rPr lang="en-IN" b="1" dirty="0">
                 <a:solidFill>
                   <a:schemeClr val="bg1"/>
                 </a:solidFill>
               </a:rPr>
               <a:t>USER</a:t>
             </a:r>
-            <a:endParaRPr lang="en-IN" b="1" dirty="0">
-              <a:solidFill>
-                <a:schemeClr val="bg1"/>
-              </a:solidFill>
-            </a:endParaRPr>
           </a:p>
         </p:txBody>
       </p:sp>
@@ -4843,6 +4707,7 @@
         <p:nvCxnSpPr>
           <p:cNvPr id="40" name="Elbow Connector 39"/>
           <p:cNvCxnSpPr>
+            <a:cxnSpLocks/>
             <a:stCxn id="17" idx="2"/>
             <a:endCxn id="16" idx="1"/>
           </p:cNvCxnSpPr>
@@ -4850,8 +4715,8 @@
         </p:nvCxnSpPr>
         <p:spPr>
           <a:xfrm rot="16200000" flipH="1">
-            <a:off x="1663241" y="3295457"/>
-            <a:ext cx="1327411" cy="1637656"/>
+            <a:off x="2065223" y="3427522"/>
+            <a:ext cx="525646" cy="571762"/>
           </a:xfrm>
           <a:prstGeom prst="bentConnector2">
             <a:avLst/>
@@ -4878,14 +4743,14 @@
       </p:cxnSp>
       <p:sp>
         <p:nvSpPr>
-          <p:cNvPr id="41" name="TextBox 40"/>
+          <p:cNvPr id="42" name="TextBox 41"/>
           <p:cNvSpPr txBox="1"/>
           <p:nvPr/>
         </p:nvSpPr>
         <p:spPr>
           <a:xfrm>
-            <a:off x="8527630" y="2294595"/>
-            <a:ext cx="1223873" cy="369332"/>
+            <a:off x="3732024" y="5743977"/>
+            <a:ext cx="5221369" cy="369332"/>
           </a:xfrm>
           <a:prstGeom prst="rect">
             <a:avLst/>
@@ -4898,135 +4763,10 @@
           </a:bodyPr>
           <a:lstStyle/>
           <a:p>
-            <a:pPr algn="ctr"/>
-            <a:r>
-              <a:rPr lang="en-IN" b="1" dirty="0" smtClean="0"/>
-              <a:t>UPDATE</a:t>
-            </a:r>
-            <a:endParaRPr lang="en-IN" b="1" dirty="0"/>
-          </a:p>
-        </p:txBody>
-      </p:sp>
-      <p:sp>
-        <p:nvSpPr>
-          <p:cNvPr id="43" name="TextBox 42"/>
-          <p:cNvSpPr txBox="1"/>
-          <p:nvPr/>
-        </p:nvSpPr>
-        <p:spPr>
-          <a:xfrm>
-            <a:off x="7658089" y="4809231"/>
-            <a:ext cx="1223873" cy="369332"/>
-          </a:xfrm>
-          <a:prstGeom prst="rect">
-            <a:avLst/>
-          </a:prstGeom>
-          <a:noFill/>
-        </p:spPr>
-        <p:txBody>
-          <a:bodyPr wrap="square" rtlCol="0">
-            <a:spAutoFit/>
-          </a:bodyPr>
-          <a:lstStyle/>
-          <a:p>
-            <a:pPr algn="ctr"/>
-            <a:r>
-              <a:rPr lang="en-IN" b="1" dirty="0" smtClean="0"/>
-              <a:t>FEEDBACK</a:t>
-            </a:r>
-            <a:endParaRPr lang="en-IN" b="1" dirty="0"/>
-          </a:p>
-        </p:txBody>
-      </p:sp>
-      <p:sp>
-        <p:nvSpPr>
-          <p:cNvPr id="45" name="TextBox 44"/>
-          <p:cNvSpPr txBox="1"/>
-          <p:nvPr/>
-        </p:nvSpPr>
-        <p:spPr>
-          <a:xfrm>
-            <a:off x="5416737" y="4854100"/>
-            <a:ext cx="1223873" cy="369332"/>
-          </a:xfrm>
-          <a:prstGeom prst="rect">
-            <a:avLst/>
-          </a:prstGeom>
-          <a:noFill/>
-        </p:spPr>
-        <p:txBody>
-          <a:bodyPr wrap="square" rtlCol="0">
-            <a:spAutoFit/>
-          </a:bodyPr>
-          <a:lstStyle/>
-          <a:p>
-            <a:pPr algn="ctr"/>
-            <a:r>
-              <a:rPr lang="en-IN" b="1" dirty="0" smtClean="0"/>
-              <a:t>FEEDBACK</a:t>
-            </a:r>
-            <a:endParaRPr lang="en-IN" b="1" dirty="0"/>
-          </a:p>
-        </p:txBody>
-      </p:sp>
-      <p:sp>
-        <p:nvSpPr>
-          <p:cNvPr id="46" name="TextBox 45"/>
-          <p:cNvSpPr txBox="1"/>
-          <p:nvPr/>
-        </p:nvSpPr>
-        <p:spPr>
-          <a:xfrm>
-            <a:off x="4409078" y="2435042"/>
-            <a:ext cx="1223873" cy="369332"/>
-          </a:xfrm>
-          <a:prstGeom prst="rect">
-            <a:avLst/>
-          </a:prstGeom>
-          <a:noFill/>
-        </p:spPr>
-        <p:txBody>
-          <a:bodyPr wrap="square" rtlCol="0">
-            <a:spAutoFit/>
-          </a:bodyPr>
-          <a:lstStyle/>
-          <a:p>
-            <a:pPr algn="ctr"/>
-            <a:r>
-              <a:rPr lang="en-IN" b="1" dirty="0" smtClean="0"/>
-              <a:t>ACTION</a:t>
-            </a:r>
-            <a:endParaRPr lang="en-IN" b="1" dirty="0"/>
-          </a:p>
-        </p:txBody>
-      </p:sp>
-      <p:sp>
-        <p:nvSpPr>
-          <p:cNvPr id="42" name="TextBox 41"/>
-          <p:cNvSpPr txBox="1"/>
-          <p:nvPr/>
-        </p:nvSpPr>
-        <p:spPr>
-          <a:xfrm>
-            <a:off x="3732024" y="5743977"/>
-            <a:ext cx="5221369" cy="369332"/>
-          </a:xfrm>
-          <a:prstGeom prst="rect">
-            <a:avLst/>
-          </a:prstGeom>
-          <a:noFill/>
-        </p:spPr>
-        <p:txBody>
-          <a:bodyPr wrap="square" rtlCol="0">
-            <a:spAutoFit/>
-          </a:bodyPr>
-          <a:lstStyle/>
-          <a:p>
-            <a:r>
-              <a:rPr lang="en-IN" dirty="0" smtClean="0"/>
+            <a:r>
+              <a:rPr lang="en-IN" dirty="0"/>
               <a:t>MODEL – VIEW – CONTROLLER ARCHITECTURE</a:t>
             </a:r>
-            <a:endParaRPr lang="en-IN" dirty="0"/>
           </a:p>
         </p:txBody>
       </p:sp>
@@ -5075,20 +4815,2385 @@
         <p:nvCxnSpPr>
           <p:cNvPr id="4" name="Elbow Connector 3"/>
           <p:cNvCxnSpPr>
-            <a:stCxn id="12" idx="2"/>
+            <a:cxnSpLocks/>
             <a:endCxn id="16" idx="3"/>
           </p:cNvCxnSpPr>
           <p:nvPr/>
         </p:nvCxnSpPr>
         <p:spPr>
+          <a:xfrm rot="10800000" flipV="1">
+            <a:off x="3748121" y="2972472"/>
+            <a:ext cx="1226075" cy="1003753"/>
+          </a:xfrm>
+          <a:prstGeom prst="bentConnector3">
+            <a:avLst>
+              <a:gd name="adj1" fmla="val 50000"/>
+            </a:avLst>
+          </a:prstGeom>
+          <a:ln>
+            <a:tailEnd type="triangle"/>
+          </a:ln>
+        </p:spPr>
+        <p:style>
+          <a:lnRef idx="1">
+            <a:schemeClr val="accent1"/>
+          </a:lnRef>
+          <a:fillRef idx="0">
+            <a:schemeClr val="accent1"/>
+          </a:fillRef>
+          <a:effectRef idx="0">
+            <a:schemeClr val="accent1"/>
+          </a:effectRef>
+          <a:fontRef idx="minor">
+            <a:schemeClr val="tx1"/>
+          </a:fontRef>
+        </p:style>
+      </p:cxnSp>
+      <p:sp>
+        <p:nvSpPr>
+          <p:cNvPr id="70" name="TextBox 69">
+            <a:extLst>
+              <a:ext uri="{FF2B5EF4-FFF2-40B4-BE49-F238E27FC236}">
+                <a16:creationId xmlns:a16="http://schemas.microsoft.com/office/drawing/2014/main" id="{4A97F8ED-AE3E-444D-B3FD-EF24CB125651}"/>
+              </a:ext>
+            </a:extLst>
+          </p:cNvPr>
+          <p:cNvSpPr txBox="1"/>
+          <p:nvPr/>
+        </p:nvSpPr>
+        <p:spPr>
+          <a:xfrm>
+            <a:off x="4248840" y="1881825"/>
+            <a:ext cx="1622358" cy="1231106"/>
+          </a:xfrm>
+          <a:prstGeom prst="rect">
+            <a:avLst/>
+          </a:prstGeom>
+          <a:noFill/>
+        </p:spPr>
+        <p:txBody>
+          <a:bodyPr wrap="square" rtlCol="0">
+            <a:spAutoFit/>
+          </a:bodyPr>
+          <a:lstStyle/>
+          <a:p>
+            <a:pPr algn="ctr"/>
+            <a:r>
+              <a:rPr lang="en-IN" b="1" dirty="0">
+                <a:solidFill>
+                  <a:schemeClr val="bg1"/>
+                </a:solidFill>
+              </a:rPr>
+              <a:t>CONTROLLER</a:t>
+            </a:r>
+          </a:p>
+          <a:p>
+            <a:pPr algn="ctr"/>
+            <a:r>
+              <a:rPr lang="en-IN" sz="1400" b="1" dirty="0" err="1">
+                <a:solidFill>
+                  <a:schemeClr val="bg1"/>
+                </a:solidFill>
+              </a:rPr>
+              <a:t>GameEngine</a:t>
+            </a:r>
+            <a:endParaRPr lang="en-IN" sz="1400" b="1" dirty="0">
+              <a:solidFill>
+                <a:schemeClr val="bg1"/>
+              </a:solidFill>
+            </a:endParaRPr>
+          </a:p>
+          <a:p>
+            <a:pPr algn="ctr"/>
+            <a:r>
+              <a:rPr lang="en-IN" sz="1400" b="1" dirty="0" err="1">
+                <a:solidFill>
+                  <a:schemeClr val="bg1"/>
+                </a:solidFill>
+              </a:rPr>
+              <a:t>MapController</a:t>
+            </a:r>
+            <a:endParaRPr lang="en-IN" sz="1400" b="1" dirty="0">
+              <a:solidFill>
+                <a:schemeClr val="bg1"/>
+              </a:solidFill>
+            </a:endParaRPr>
+          </a:p>
+          <a:p>
+            <a:pPr algn="ctr"/>
+            <a:r>
+              <a:rPr lang="en-IN" sz="1400" b="1" dirty="0" err="1">
+                <a:solidFill>
+                  <a:schemeClr val="bg1"/>
+                </a:solidFill>
+              </a:rPr>
+              <a:t>PlayerController</a:t>
+            </a:r>
+            <a:endParaRPr lang="en-IN" sz="1400" b="1" dirty="0">
+              <a:solidFill>
+                <a:schemeClr val="bg1"/>
+              </a:solidFill>
+            </a:endParaRPr>
+          </a:p>
+          <a:p>
+            <a:pPr algn="ctr"/>
+            <a:endParaRPr lang="en-IN" sz="1400" b="1" dirty="0">
+              <a:solidFill>
+                <a:schemeClr val="bg1"/>
+              </a:solidFill>
+            </a:endParaRPr>
+          </a:p>
+        </p:txBody>
+      </p:sp>
+      <p:sp>
+        <p:nvSpPr>
+          <p:cNvPr id="71" name="TextBox 70">
+            <a:extLst>
+              <a:ext uri="{FF2B5EF4-FFF2-40B4-BE49-F238E27FC236}">
+                <a16:creationId xmlns:a16="http://schemas.microsoft.com/office/drawing/2014/main" id="{487CE72F-56E8-4E7F-BB11-4F81070967E7}"/>
+              </a:ext>
+            </a:extLst>
+          </p:cNvPr>
+          <p:cNvSpPr txBox="1"/>
+          <p:nvPr/>
+        </p:nvSpPr>
+        <p:spPr>
+          <a:xfrm>
+            <a:off x="5336766" y="3790945"/>
+            <a:ext cx="1170793" cy="369332"/>
+          </a:xfrm>
+          <a:prstGeom prst="rect">
+            <a:avLst/>
+          </a:prstGeom>
+          <a:noFill/>
+        </p:spPr>
+        <p:txBody>
+          <a:bodyPr wrap="square" rtlCol="0">
+            <a:spAutoFit/>
+          </a:bodyPr>
+          <a:lstStyle/>
+          <a:p>
+            <a:pPr algn="ctr"/>
+            <a:r>
+              <a:rPr lang="en-IN" b="1" dirty="0">
+                <a:solidFill>
+                  <a:schemeClr val="bg1"/>
+                </a:solidFill>
+              </a:rPr>
+              <a:t>MODEL</a:t>
+            </a:r>
+          </a:p>
+        </p:txBody>
+      </p:sp>
+      <p:sp>
+        <p:nvSpPr>
+          <p:cNvPr id="74" name="Rectangle 73">
+            <a:extLst>
+              <a:ext uri="{FF2B5EF4-FFF2-40B4-BE49-F238E27FC236}">
+                <a16:creationId xmlns:a16="http://schemas.microsoft.com/office/drawing/2014/main" id="{C02AE149-738A-4BF4-9A46-DFA2979393B1}"/>
+              </a:ext>
+            </a:extLst>
+          </p:cNvPr>
+          <p:cNvSpPr/>
+          <p:nvPr/>
+        </p:nvSpPr>
+        <p:spPr>
+          <a:xfrm>
+            <a:off x="9488309" y="1792469"/>
+            <a:ext cx="1312997" cy="730961"/>
+          </a:xfrm>
+          <a:prstGeom prst="rect">
+            <a:avLst/>
+          </a:prstGeom>
+        </p:spPr>
+        <p:style>
+          <a:lnRef idx="2">
+            <a:schemeClr val="accent1">
+              <a:shade val="50000"/>
+            </a:schemeClr>
+          </a:lnRef>
+          <a:fillRef idx="1">
+            <a:schemeClr val="accent1"/>
+          </a:fillRef>
+          <a:effectRef idx="0">
+            <a:schemeClr val="accent1"/>
+          </a:effectRef>
+          <a:fontRef idx="minor">
+            <a:schemeClr val="lt1"/>
+          </a:fontRef>
+        </p:style>
+        <p:txBody>
+          <a:bodyPr rtlCol="0" anchor="ctr"/>
+          <a:lstStyle/>
+          <a:p>
+            <a:pPr algn="ctr"/>
+            <a:endParaRPr lang="en-US"/>
+          </a:p>
+        </p:txBody>
+      </p:sp>
+      <p:sp>
+        <p:nvSpPr>
+          <p:cNvPr id="80" name="TextBox 79">
+            <a:extLst>
+              <a:ext uri="{FF2B5EF4-FFF2-40B4-BE49-F238E27FC236}">
+                <a16:creationId xmlns:a16="http://schemas.microsoft.com/office/drawing/2014/main" id="{50BFA0C1-5175-4E36-AC8A-BED98753ACF9}"/>
+              </a:ext>
+            </a:extLst>
+          </p:cNvPr>
+          <p:cNvSpPr txBox="1"/>
+          <p:nvPr/>
+        </p:nvSpPr>
+        <p:spPr>
+          <a:xfrm>
+            <a:off x="9443885" y="1973283"/>
+            <a:ext cx="1312997" cy="369332"/>
+          </a:xfrm>
+          <a:prstGeom prst="rect">
+            <a:avLst/>
+          </a:prstGeom>
+          <a:noFill/>
+        </p:spPr>
+        <p:txBody>
+          <a:bodyPr wrap="square" rtlCol="0">
+            <a:spAutoFit/>
+          </a:bodyPr>
+          <a:lstStyle/>
+          <a:p>
+            <a:pPr algn="ctr"/>
+            <a:r>
+              <a:rPr lang="en-IN" b="1" dirty="0">
+                <a:solidFill>
+                  <a:schemeClr val="bg1"/>
+                </a:solidFill>
+              </a:rPr>
+              <a:t>Phase</a:t>
+            </a:r>
+          </a:p>
+        </p:txBody>
+      </p:sp>
+      <p:sp>
+        <p:nvSpPr>
+          <p:cNvPr id="87" name="Rectangle 86">
+            <a:extLst>
+              <a:ext uri="{FF2B5EF4-FFF2-40B4-BE49-F238E27FC236}">
+                <a16:creationId xmlns:a16="http://schemas.microsoft.com/office/drawing/2014/main" id="{D987B2E7-8B3E-4A0C-B942-D65D26E341F4}"/>
+              </a:ext>
+            </a:extLst>
+          </p:cNvPr>
+          <p:cNvSpPr/>
+          <p:nvPr/>
+        </p:nvSpPr>
+        <p:spPr>
+          <a:xfrm>
+            <a:off x="7767256" y="3052620"/>
+            <a:ext cx="759269" cy="421816"/>
+          </a:xfrm>
+          <a:prstGeom prst="rect">
+            <a:avLst/>
+          </a:prstGeom>
+        </p:spPr>
+        <p:style>
+          <a:lnRef idx="2">
+            <a:schemeClr val="accent1">
+              <a:shade val="50000"/>
+            </a:schemeClr>
+          </a:lnRef>
+          <a:fillRef idx="1">
+            <a:schemeClr val="accent1"/>
+          </a:fillRef>
+          <a:effectRef idx="0">
+            <a:schemeClr val="accent1"/>
+          </a:effectRef>
+          <a:fontRef idx="minor">
+            <a:schemeClr val="lt1"/>
+          </a:fontRef>
+        </p:style>
+        <p:txBody>
+          <a:bodyPr rtlCol="0" anchor="ctr"/>
+          <a:lstStyle/>
+          <a:p>
+            <a:pPr algn="ctr"/>
+            <a:endParaRPr lang="en-IN"/>
+          </a:p>
+        </p:txBody>
+      </p:sp>
+      <p:sp>
+        <p:nvSpPr>
+          <p:cNvPr id="88" name="Rectangle 87">
+            <a:extLst>
+              <a:ext uri="{FF2B5EF4-FFF2-40B4-BE49-F238E27FC236}">
+                <a16:creationId xmlns:a16="http://schemas.microsoft.com/office/drawing/2014/main" id="{DD4EE508-B559-410C-A71F-AF36AEFBEC4F}"/>
+              </a:ext>
+            </a:extLst>
+          </p:cNvPr>
+          <p:cNvSpPr/>
+          <p:nvPr/>
+        </p:nvSpPr>
+        <p:spPr>
+          <a:xfrm>
+            <a:off x="8667788" y="3047928"/>
+            <a:ext cx="759269" cy="421816"/>
+          </a:xfrm>
+          <a:prstGeom prst="rect">
+            <a:avLst/>
+          </a:prstGeom>
+        </p:spPr>
+        <p:style>
+          <a:lnRef idx="2">
+            <a:schemeClr val="accent1">
+              <a:shade val="50000"/>
+            </a:schemeClr>
+          </a:lnRef>
+          <a:fillRef idx="1">
+            <a:schemeClr val="accent1"/>
+          </a:fillRef>
+          <a:effectRef idx="0">
+            <a:schemeClr val="accent1"/>
+          </a:effectRef>
+          <a:fontRef idx="minor">
+            <a:schemeClr val="lt1"/>
+          </a:fontRef>
+        </p:style>
+        <p:txBody>
+          <a:bodyPr rtlCol="0" anchor="ctr"/>
+          <a:lstStyle/>
+          <a:p>
+            <a:pPr algn="ctr"/>
+            <a:endParaRPr lang="en-IN"/>
+          </a:p>
+        </p:txBody>
+      </p:sp>
+      <p:sp>
+        <p:nvSpPr>
+          <p:cNvPr id="89" name="Rectangle 88">
+            <a:extLst>
+              <a:ext uri="{FF2B5EF4-FFF2-40B4-BE49-F238E27FC236}">
+                <a16:creationId xmlns:a16="http://schemas.microsoft.com/office/drawing/2014/main" id="{5B16BA99-AF94-4404-AC74-AAFCA1254520}"/>
+              </a:ext>
+            </a:extLst>
+          </p:cNvPr>
+          <p:cNvSpPr/>
+          <p:nvPr/>
+        </p:nvSpPr>
+        <p:spPr>
+          <a:xfrm>
+            <a:off x="9520151" y="3047928"/>
+            <a:ext cx="759269" cy="421816"/>
+          </a:xfrm>
+          <a:prstGeom prst="rect">
+            <a:avLst/>
+          </a:prstGeom>
+        </p:spPr>
+        <p:style>
+          <a:lnRef idx="2">
+            <a:schemeClr val="accent1">
+              <a:shade val="50000"/>
+            </a:schemeClr>
+          </a:lnRef>
+          <a:fillRef idx="1">
+            <a:schemeClr val="accent1"/>
+          </a:fillRef>
+          <a:effectRef idx="0">
+            <a:schemeClr val="accent1"/>
+          </a:effectRef>
+          <a:fontRef idx="minor">
+            <a:schemeClr val="lt1"/>
+          </a:fontRef>
+        </p:style>
+        <p:txBody>
+          <a:bodyPr rtlCol="0" anchor="ctr"/>
+          <a:lstStyle/>
+          <a:p>
+            <a:pPr algn="ctr"/>
+            <a:endParaRPr lang="en-IN"/>
+          </a:p>
+        </p:txBody>
+      </p:sp>
+      <p:sp>
+        <p:nvSpPr>
+          <p:cNvPr id="90" name="Rectangle 89">
+            <a:extLst>
+              <a:ext uri="{FF2B5EF4-FFF2-40B4-BE49-F238E27FC236}">
+                <a16:creationId xmlns:a16="http://schemas.microsoft.com/office/drawing/2014/main" id="{19F2B8FD-60C0-4FBA-9EE1-5E8903307ED9}"/>
+              </a:ext>
+            </a:extLst>
+          </p:cNvPr>
+          <p:cNvSpPr/>
+          <p:nvPr/>
+        </p:nvSpPr>
+        <p:spPr>
+          <a:xfrm>
+            <a:off x="10372514" y="3047628"/>
+            <a:ext cx="759269" cy="421816"/>
+          </a:xfrm>
+          <a:prstGeom prst="rect">
+            <a:avLst/>
+          </a:prstGeom>
+        </p:spPr>
+        <p:style>
+          <a:lnRef idx="2">
+            <a:schemeClr val="accent1">
+              <a:shade val="50000"/>
+            </a:schemeClr>
+          </a:lnRef>
+          <a:fillRef idx="1">
+            <a:schemeClr val="accent1"/>
+          </a:fillRef>
+          <a:effectRef idx="0">
+            <a:schemeClr val="accent1"/>
+          </a:effectRef>
+          <a:fontRef idx="minor">
+            <a:schemeClr val="lt1"/>
+          </a:fontRef>
+        </p:style>
+        <p:txBody>
+          <a:bodyPr rtlCol="0" anchor="ctr"/>
+          <a:lstStyle/>
+          <a:p>
+            <a:pPr algn="ctr"/>
+            <a:endParaRPr lang="en-IN"/>
+          </a:p>
+        </p:txBody>
+      </p:sp>
+      <p:sp>
+        <p:nvSpPr>
+          <p:cNvPr id="91" name="Flowchart: Decision 90">
+            <a:extLst>
+              <a:ext uri="{FF2B5EF4-FFF2-40B4-BE49-F238E27FC236}">
+                <a16:creationId xmlns:a16="http://schemas.microsoft.com/office/drawing/2014/main" id="{D843C0B5-757D-415F-BADD-478AF81ED175}"/>
+              </a:ext>
+            </a:extLst>
+          </p:cNvPr>
+          <p:cNvSpPr/>
+          <p:nvPr/>
+        </p:nvSpPr>
+        <p:spPr>
+          <a:xfrm>
+            <a:off x="5821455" y="1985252"/>
+            <a:ext cx="348526" cy="273413"/>
+          </a:xfrm>
+          <a:prstGeom prst="flowChartDecision">
+            <a:avLst/>
+          </a:prstGeom>
+        </p:spPr>
+        <p:style>
+          <a:lnRef idx="2">
+            <a:schemeClr val="accent1">
+              <a:shade val="50000"/>
+            </a:schemeClr>
+          </a:lnRef>
+          <a:fillRef idx="1">
+            <a:schemeClr val="accent1"/>
+          </a:fillRef>
+          <a:effectRef idx="0">
+            <a:schemeClr val="accent1"/>
+          </a:effectRef>
+          <a:fontRef idx="minor">
+            <a:schemeClr val="lt1"/>
+          </a:fontRef>
+        </p:style>
+        <p:txBody>
+          <a:bodyPr rtlCol="0" anchor="ctr"/>
+          <a:lstStyle/>
+          <a:p>
+            <a:pPr algn="ctr"/>
+            <a:endParaRPr lang="en-US"/>
+          </a:p>
+        </p:txBody>
+      </p:sp>
+      <p:sp>
+        <p:nvSpPr>
+          <p:cNvPr id="94" name="TextBox 93">
+            <a:extLst>
+              <a:ext uri="{FF2B5EF4-FFF2-40B4-BE49-F238E27FC236}">
+                <a16:creationId xmlns:a16="http://schemas.microsoft.com/office/drawing/2014/main" id="{DCA91F34-BD61-4C19-BAFB-A75725B3BF79}"/>
+              </a:ext>
+            </a:extLst>
+          </p:cNvPr>
+          <p:cNvSpPr txBox="1"/>
+          <p:nvPr/>
+        </p:nvSpPr>
+        <p:spPr>
+          <a:xfrm>
+            <a:off x="7661131" y="3144595"/>
+            <a:ext cx="918009" cy="276999"/>
+          </a:xfrm>
+          <a:prstGeom prst="rect">
+            <a:avLst/>
+          </a:prstGeom>
+          <a:noFill/>
+        </p:spPr>
+        <p:txBody>
+          <a:bodyPr wrap="square" rtlCol="0">
+            <a:spAutoFit/>
+          </a:bodyPr>
+          <a:lstStyle/>
+          <a:p>
+            <a:pPr algn="ctr"/>
+            <a:r>
+              <a:rPr lang="en-IN" sz="1200" b="1" dirty="0">
+                <a:solidFill>
+                  <a:schemeClr val="bg1"/>
+                </a:solidFill>
+              </a:rPr>
+              <a:t>Edit</a:t>
+            </a:r>
+          </a:p>
+        </p:txBody>
+      </p:sp>
+      <p:sp>
+        <p:nvSpPr>
+          <p:cNvPr id="95" name="TextBox 94">
+            <a:extLst>
+              <a:ext uri="{FF2B5EF4-FFF2-40B4-BE49-F238E27FC236}">
+                <a16:creationId xmlns:a16="http://schemas.microsoft.com/office/drawing/2014/main" id="{6081199C-117E-4927-8418-CC92E56A46C1}"/>
+              </a:ext>
+            </a:extLst>
+          </p:cNvPr>
+          <p:cNvSpPr txBox="1"/>
+          <p:nvPr/>
+        </p:nvSpPr>
+        <p:spPr>
+          <a:xfrm>
+            <a:off x="8574694" y="3110638"/>
+            <a:ext cx="918009" cy="276999"/>
+          </a:xfrm>
+          <a:prstGeom prst="rect">
+            <a:avLst/>
+          </a:prstGeom>
+          <a:noFill/>
+        </p:spPr>
+        <p:txBody>
+          <a:bodyPr wrap="square" rtlCol="0">
+            <a:spAutoFit/>
+          </a:bodyPr>
+          <a:lstStyle/>
+          <a:p>
+            <a:pPr algn="ctr"/>
+            <a:r>
+              <a:rPr lang="en-IN" sz="1200" b="1" dirty="0" err="1">
+                <a:solidFill>
+                  <a:schemeClr val="bg1"/>
+                </a:solidFill>
+              </a:rPr>
+              <a:t>Startup</a:t>
+            </a:r>
+            <a:endParaRPr lang="en-IN" sz="1200" b="1" dirty="0">
+              <a:solidFill>
+                <a:schemeClr val="bg1"/>
+              </a:solidFill>
+            </a:endParaRPr>
+          </a:p>
+        </p:txBody>
+      </p:sp>
+      <p:sp>
+        <p:nvSpPr>
+          <p:cNvPr id="96" name="TextBox 95">
+            <a:extLst>
+              <a:ext uri="{FF2B5EF4-FFF2-40B4-BE49-F238E27FC236}">
+                <a16:creationId xmlns:a16="http://schemas.microsoft.com/office/drawing/2014/main" id="{1DC97FE0-A9F5-4F0D-A4D2-C09C267FEC03}"/>
+              </a:ext>
+            </a:extLst>
+          </p:cNvPr>
+          <p:cNvSpPr txBox="1"/>
+          <p:nvPr/>
+        </p:nvSpPr>
+        <p:spPr>
+          <a:xfrm>
+            <a:off x="9437260" y="3155035"/>
+            <a:ext cx="918009" cy="230832"/>
+          </a:xfrm>
+          <a:prstGeom prst="rect">
+            <a:avLst/>
+          </a:prstGeom>
+          <a:noFill/>
+        </p:spPr>
+        <p:txBody>
+          <a:bodyPr wrap="square" rtlCol="0">
+            <a:spAutoFit/>
+          </a:bodyPr>
+          <a:lstStyle/>
+          <a:p>
+            <a:pPr algn="ctr"/>
+            <a:r>
+              <a:rPr lang="en-IN" sz="900" b="1" dirty="0">
+                <a:solidFill>
+                  <a:schemeClr val="bg1"/>
+                </a:solidFill>
+              </a:rPr>
+              <a:t>Reinforcement</a:t>
+            </a:r>
+          </a:p>
+        </p:txBody>
+      </p:sp>
+      <p:sp>
+        <p:nvSpPr>
+          <p:cNvPr id="97" name="TextBox 96">
+            <a:extLst>
+              <a:ext uri="{FF2B5EF4-FFF2-40B4-BE49-F238E27FC236}">
+                <a16:creationId xmlns:a16="http://schemas.microsoft.com/office/drawing/2014/main" id="{EDA1FFFA-D300-40A8-96CE-E23ABFEB31B4}"/>
+              </a:ext>
+            </a:extLst>
+          </p:cNvPr>
+          <p:cNvSpPr txBox="1"/>
+          <p:nvPr/>
+        </p:nvSpPr>
+        <p:spPr>
+          <a:xfrm>
+            <a:off x="10263968" y="3103787"/>
+            <a:ext cx="918009" cy="276999"/>
+          </a:xfrm>
+          <a:prstGeom prst="rect">
+            <a:avLst/>
+          </a:prstGeom>
+          <a:noFill/>
+        </p:spPr>
+        <p:txBody>
+          <a:bodyPr wrap="square" rtlCol="0">
+            <a:spAutoFit/>
+          </a:bodyPr>
+          <a:lstStyle/>
+          <a:p>
+            <a:pPr algn="ctr"/>
+            <a:r>
+              <a:rPr lang="en-IN" sz="1200" b="1" dirty="0" err="1">
+                <a:solidFill>
+                  <a:schemeClr val="bg1"/>
+                </a:solidFill>
+              </a:rPr>
+              <a:t>IssueOrder</a:t>
+            </a:r>
+            <a:endParaRPr lang="en-IN" sz="1200" b="1" dirty="0">
+              <a:solidFill>
+                <a:schemeClr val="bg1"/>
+              </a:solidFill>
+            </a:endParaRPr>
+          </a:p>
+        </p:txBody>
+      </p:sp>
+      <p:cxnSp>
+        <p:nvCxnSpPr>
+          <p:cNvPr id="101" name="Connector: Elbow 100">
+            <a:extLst>
+              <a:ext uri="{FF2B5EF4-FFF2-40B4-BE49-F238E27FC236}">
+                <a16:creationId xmlns:a16="http://schemas.microsoft.com/office/drawing/2014/main" id="{CBAF200F-A791-4B0F-B0C7-311F5F0FB4A7}"/>
+              </a:ext>
+            </a:extLst>
+          </p:cNvPr>
+          <p:cNvCxnSpPr>
+            <a:cxnSpLocks/>
+            <a:stCxn id="91" idx="3"/>
+          </p:cNvCxnSpPr>
+          <p:nvPr/>
+        </p:nvCxnSpPr>
+        <p:spPr>
+          <a:xfrm flipV="1">
+            <a:off x="6169981" y="2023849"/>
+            <a:ext cx="3322722" cy="98110"/>
+          </a:xfrm>
+          <a:prstGeom prst="bentConnector3">
+            <a:avLst/>
+          </a:prstGeom>
+        </p:spPr>
+        <p:style>
+          <a:lnRef idx="1">
+            <a:schemeClr val="accent1"/>
+          </a:lnRef>
+          <a:fillRef idx="0">
+            <a:schemeClr val="accent1"/>
+          </a:fillRef>
+          <a:effectRef idx="0">
+            <a:schemeClr val="accent1"/>
+          </a:effectRef>
+          <a:fontRef idx="minor">
+            <a:schemeClr val="tx1"/>
+          </a:fontRef>
+        </p:style>
+      </p:cxnSp>
+      <p:sp>
+        <p:nvSpPr>
+          <p:cNvPr id="106" name="Rectangle 105">
+            <a:extLst>
+              <a:ext uri="{FF2B5EF4-FFF2-40B4-BE49-F238E27FC236}">
+                <a16:creationId xmlns:a16="http://schemas.microsoft.com/office/drawing/2014/main" id="{81946E50-5607-4B11-89B5-521BB3C431E7}"/>
+              </a:ext>
+            </a:extLst>
+          </p:cNvPr>
+          <p:cNvSpPr/>
+          <p:nvPr/>
+        </p:nvSpPr>
+        <p:spPr>
+          <a:xfrm>
+            <a:off x="6908439" y="3057046"/>
+            <a:ext cx="759269" cy="421816"/>
+          </a:xfrm>
+          <a:prstGeom prst="rect">
+            <a:avLst/>
+          </a:prstGeom>
+        </p:spPr>
+        <p:style>
+          <a:lnRef idx="2">
+            <a:schemeClr val="accent1">
+              <a:shade val="50000"/>
+            </a:schemeClr>
+          </a:lnRef>
+          <a:fillRef idx="1">
+            <a:schemeClr val="accent1"/>
+          </a:fillRef>
+          <a:effectRef idx="0">
+            <a:schemeClr val="accent1"/>
+          </a:effectRef>
+          <a:fontRef idx="minor">
+            <a:schemeClr val="lt1"/>
+          </a:fontRef>
+        </p:style>
+        <p:txBody>
+          <a:bodyPr rtlCol="0" anchor="ctr"/>
+          <a:lstStyle/>
+          <a:p>
+            <a:pPr algn="ctr"/>
+            <a:endParaRPr lang="en-IN"/>
+          </a:p>
+        </p:txBody>
+      </p:sp>
+      <p:sp>
+        <p:nvSpPr>
+          <p:cNvPr id="107" name="Rectangle 106">
+            <a:extLst>
+              <a:ext uri="{FF2B5EF4-FFF2-40B4-BE49-F238E27FC236}">
+                <a16:creationId xmlns:a16="http://schemas.microsoft.com/office/drawing/2014/main" id="{130E79D5-9C9D-4BA9-9100-FC6C9F1DF5A6}"/>
+              </a:ext>
+            </a:extLst>
+          </p:cNvPr>
+          <p:cNvSpPr/>
+          <p:nvPr/>
+        </p:nvSpPr>
+        <p:spPr>
+          <a:xfrm>
+            <a:off x="11275071" y="3047628"/>
+            <a:ext cx="759269" cy="421816"/>
+          </a:xfrm>
+          <a:prstGeom prst="rect">
+            <a:avLst/>
+          </a:prstGeom>
+        </p:spPr>
+        <p:style>
+          <a:lnRef idx="2">
+            <a:schemeClr val="accent1">
+              <a:shade val="50000"/>
+            </a:schemeClr>
+          </a:lnRef>
+          <a:fillRef idx="1">
+            <a:schemeClr val="accent1"/>
+          </a:fillRef>
+          <a:effectRef idx="0">
+            <a:schemeClr val="accent1"/>
+          </a:effectRef>
+          <a:fontRef idx="minor">
+            <a:schemeClr val="lt1"/>
+          </a:fontRef>
+        </p:style>
+        <p:txBody>
+          <a:bodyPr rtlCol="0" anchor="ctr"/>
+          <a:lstStyle/>
+          <a:p>
+            <a:pPr algn="ctr"/>
+            <a:endParaRPr lang="en-IN"/>
+          </a:p>
+        </p:txBody>
+      </p:sp>
+      <p:sp>
+        <p:nvSpPr>
+          <p:cNvPr id="108" name="TextBox 107">
+            <a:extLst>
+              <a:ext uri="{FF2B5EF4-FFF2-40B4-BE49-F238E27FC236}">
+                <a16:creationId xmlns:a16="http://schemas.microsoft.com/office/drawing/2014/main" id="{72F825C1-9F1C-4AB2-8A5A-5906D64704E4}"/>
+              </a:ext>
+            </a:extLst>
+          </p:cNvPr>
+          <p:cNvSpPr txBox="1"/>
+          <p:nvPr/>
+        </p:nvSpPr>
+        <p:spPr>
+          <a:xfrm>
+            <a:off x="6835523" y="3128451"/>
+            <a:ext cx="918009" cy="276999"/>
+          </a:xfrm>
+          <a:prstGeom prst="rect">
+            <a:avLst/>
+          </a:prstGeom>
+          <a:noFill/>
+        </p:spPr>
+        <p:txBody>
+          <a:bodyPr wrap="square" rtlCol="0">
+            <a:spAutoFit/>
+          </a:bodyPr>
+          <a:lstStyle/>
+          <a:p>
+            <a:pPr algn="ctr"/>
+            <a:r>
+              <a:rPr lang="en-IN" sz="1200" b="1" dirty="0">
+                <a:solidFill>
+                  <a:schemeClr val="bg1"/>
+                </a:solidFill>
+              </a:rPr>
+              <a:t>End</a:t>
+            </a:r>
+          </a:p>
+        </p:txBody>
+      </p:sp>
+      <p:sp>
+        <p:nvSpPr>
+          <p:cNvPr id="109" name="TextBox 108">
+            <a:extLst>
+              <a:ext uri="{FF2B5EF4-FFF2-40B4-BE49-F238E27FC236}">
+                <a16:creationId xmlns:a16="http://schemas.microsoft.com/office/drawing/2014/main" id="{EAA01326-13FC-4AE4-8025-2C2D3D87C06B}"/>
+              </a:ext>
+            </a:extLst>
+          </p:cNvPr>
+          <p:cNvSpPr txBox="1"/>
+          <p:nvPr/>
+        </p:nvSpPr>
+        <p:spPr>
+          <a:xfrm>
+            <a:off x="11199222" y="3036117"/>
+            <a:ext cx="918009" cy="461665"/>
+          </a:xfrm>
+          <a:prstGeom prst="rect">
+            <a:avLst/>
+          </a:prstGeom>
+          <a:noFill/>
+        </p:spPr>
+        <p:txBody>
+          <a:bodyPr wrap="square" rtlCol="0">
+            <a:spAutoFit/>
+          </a:bodyPr>
+          <a:lstStyle/>
+          <a:p>
+            <a:pPr algn="ctr"/>
+            <a:r>
+              <a:rPr lang="en-IN" sz="1200" b="1" dirty="0">
+                <a:solidFill>
+                  <a:schemeClr val="bg1"/>
+                </a:solidFill>
+              </a:rPr>
+              <a:t>Execute</a:t>
+            </a:r>
+          </a:p>
+          <a:p>
+            <a:pPr algn="ctr"/>
+            <a:r>
+              <a:rPr lang="en-IN" sz="1200" b="1" dirty="0">
+                <a:solidFill>
+                  <a:schemeClr val="bg1"/>
+                </a:solidFill>
+              </a:rPr>
+              <a:t>Order</a:t>
+            </a:r>
+          </a:p>
+        </p:txBody>
+      </p:sp>
+      <p:sp>
+        <p:nvSpPr>
+          <p:cNvPr id="117" name="TextBox 116">
+            <a:extLst>
+              <a:ext uri="{FF2B5EF4-FFF2-40B4-BE49-F238E27FC236}">
+                <a16:creationId xmlns:a16="http://schemas.microsoft.com/office/drawing/2014/main" id="{D3D6547D-6BD6-4D04-86DD-45281FC1292D}"/>
+              </a:ext>
+            </a:extLst>
+          </p:cNvPr>
+          <p:cNvSpPr txBox="1"/>
+          <p:nvPr/>
+        </p:nvSpPr>
+        <p:spPr>
+          <a:xfrm>
+            <a:off x="5216178" y="4124736"/>
+            <a:ext cx="1412147" cy="1107996"/>
+          </a:xfrm>
+          <a:prstGeom prst="rect">
+            <a:avLst/>
+          </a:prstGeom>
+          <a:noFill/>
+        </p:spPr>
+        <p:txBody>
+          <a:bodyPr wrap="square" rtlCol="0">
+            <a:spAutoFit/>
+          </a:bodyPr>
+          <a:lstStyle/>
+          <a:p>
+            <a:pPr algn="ctr"/>
+            <a:r>
+              <a:rPr lang="en-IN" sz="1100" b="1" dirty="0" err="1">
+                <a:solidFill>
+                  <a:schemeClr val="bg1"/>
+                </a:solidFill>
+              </a:rPr>
+              <a:t>GameModel</a:t>
+            </a:r>
+            <a:endParaRPr lang="en-IN" sz="1100" b="1" dirty="0">
+              <a:solidFill>
+                <a:schemeClr val="bg1"/>
+              </a:solidFill>
+            </a:endParaRPr>
+          </a:p>
+          <a:p>
+            <a:pPr algn="ctr"/>
+            <a:r>
+              <a:rPr lang="en-IN" sz="1100" b="1" dirty="0">
+                <a:solidFill>
+                  <a:schemeClr val="bg1"/>
+                </a:solidFill>
+              </a:rPr>
+              <a:t>Map</a:t>
+            </a:r>
+          </a:p>
+          <a:p>
+            <a:pPr algn="ctr"/>
+            <a:r>
+              <a:rPr lang="en-IN" sz="1100" b="1" dirty="0">
+                <a:solidFill>
+                  <a:schemeClr val="bg1"/>
+                </a:solidFill>
+              </a:rPr>
+              <a:t>Continent</a:t>
+            </a:r>
+          </a:p>
+          <a:p>
+            <a:pPr algn="ctr"/>
+            <a:r>
+              <a:rPr lang="en-IN" sz="1100" b="1" dirty="0">
+                <a:solidFill>
+                  <a:schemeClr val="bg1"/>
+                </a:solidFill>
+              </a:rPr>
+              <a:t>Country</a:t>
+            </a:r>
+          </a:p>
+          <a:p>
+            <a:pPr algn="ctr"/>
+            <a:r>
+              <a:rPr lang="en-IN" sz="1100" b="1" dirty="0">
+                <a:solidFill>
+                  <a:schemeClr val="bg1"/>
+                </a:solidFill>
+              </a:rPr>
+              <a:t>Player</a:t>
+            </a:r>
+          </a:p>
+          <a:p>
+            <a:pPr algn="ctr"/>
+            <a:r>
+              <a:rPr lang="en-IN" sz="1100" b="1" dirty="0">
+                <a:solidFill>
+                  <a:schemeClr val="bg1"/>
+                </a:solidFill>
+              </a:rPr>
+              <a:t>Order</a:t>
+            </a:r>
+          </a:p>
+        </p:txBody>
+      </p:sp>
+      <p:cxnSp>
+        <p:nvCxnSpPr>
+          <p:cNvPr id="119" name="Connector: Elbow 118">
+            <a:extLst>
+              <a:ext uri="{FF2B5EF4-FFF2-40B4-BE49-F238E27FC236}">
+                <a16:creationId xmlns:a16="http://schemas.microsoft.com/office/drawing/2014/main" id="{56DE157D-EE6A-41C5-8151-1FC45DFDDFEB}"/>
+              </a:ext>
+            </a:extLst>
+          </p:cNvPr>
+          <p:cNvCxnSpPr>
+            <a:stCxn id="106" idx="0"/>
+            <a:endCxn id="74" idx="2"/>
+          </p:cNvCxnSpPr>
+          <p:nvPr/>
+        </p:nvCxnSpPr>
+        <p:spPr>
+          <a:xfrm rot="5400000" flipH="1" flipV="1">
+            <a:off x="8449633" y="1361871"/>
+            <a:ext cx="533616" cy="2856734"/>
+          </a:xfrm>
+          <a:prstGeom prst="bentConnector3">
+            <a:avLst/>
+          </a:prstGeom>
+          <a:ln>
+            <a:tailEnd type="triangle"/>
+          </a:ln>
+        </p:spPr>
+        <p:style>
+          <a:lnRef idx="1">
+            <a:schemeClr val="accent1"/>
+          </a:lnRef>
+          <a:fillRef idx="0">
+            <a:schemeClr val="accent1"/>
+          </a:fillRef>
+          <a:effectRef idx="0">
+            <a:schemeClr val="accent1"/>
+          </a:effectRef>
+          <a:fontRef idx="minor">
+            <a:schemeClr val="tx1"/>
+          </a:fontRef>
+        </p:style>
+      </p:cxnSp>
+      <p:cxnSp>
+        <p:nvCxnSpPr>
+          <p:cNvPr id="121" name="Connector: Elbow 120">
+            <a:extLst>
+              <a:ext uri="{FF2B5EF4-FFF2-40B4-BE49-F238E27FC236}">
+                <a16:creationId xmlns:a16="http://schemas.microsoft.com/office/drawing/2014/main" id="{CC9B43A8-3B74-4FD3-85C4-2DB00FEBC3F5}"/>
+              </a:ext>
+            </a:extLst>
+          </p:cNvPr>
+          <p:cNvCxnSpPr>
+            <a:cxnSpLocks/>
+            <a:stCxn id="87" idx="0"/>
+            <a:endCxn id="74" idx="2"/>
+          </p:cNvCxnSpPr>
+          <p:nvPr/>
+        </p:nvCxnSpPr>
+        <p:spPr>
+          <a:xfrm rot="5400000" flipH="1" flipV="1">
+            <a:off x="8881254" y="1789067"/>
+            <a:ext cx="529190" cy="1997917"/>
+          </a:xfrm>
+          <a:prstGeom prst="bentConnector3">
+            <a:avLst>
+              <a:gd name="adj1" fmla="val 50000"/>
+            </a:avLst>
+          </a:prstGeom>
+          <a:ln>
+            <a:tailEnd type="triangle"/>
+          </a:ln>
+        </p:spPr>
+        <p:style>
+          <a:lnRef idx="1">
+            <a:schemeClr val="accent1"/>
+          </a:lnRef>
+          <a:fillRef idx="0">
+            <a:schemeClr val="accent1"/>
+          </a:fillRef>
+          <a:effectRef idx="0">
+            <a:schemeClr val="accent1"/>
+          </a:effectRef>
+          <a:fontRef idx="minor">
+            <a:schemeClr val="tx1"/>
+          </a:fontRef>
+        </p:style>
+      </p:cxnSp>
+      <p:cxnSp>
+        <p:nvCxnSpPr>
+          <p:cNvPr id="125" name="Connector: Elbow 124">
+            <a:extLst>
+              <a:ext uri="{FF2B5EF4-FFF2-40B4-BE49-F238E27FC236}">
+                <a16:creationId xmlns:a16="http://schemas.microsoft.com/office/drawing/2014/main" id="{322A6308-C0B2-43B7-A434-96764C3CE99D}"/>
+              </a:ext>
+            </a:extLst>
+          </p:cNvPr>
+          <p:cNvCxnSpPr>
+            <a:stCxn id="88" idx="0"/>
+            <a:endCxn id="74" idx="2"/>
+          </p:cNvCxnSpPr>
+          <p:nvPr/>
+        </p:nvCxnSpPr>
+        <p:spPr>
+          <a:xfrm rot="5400000" flipH="1" flipV="1">
+            <a:off x="9333866" y="2236987"/>
+            <a:ext cx="524498" cy="1097385"/>
+          </a:xfrm>
+          <a:prstGeom prst="bentConnector3">
+            <a:avLst/>
+          </a:prstGeom>
+          <a:ln>
+            <a:tailEnd type="triangle"/>
+          </a:ln>
+        </p:spPr>
+        <p:style>
+          <a:lnRef idx="1">
+            <a:schemeClr val="accent1"/>
+          </a:lnRef>
+          <a:fillRef idx="0">
+            <a:schemeClr val="accent1"/>
+          </a:fillRef>
+          <a:effectRef idx="0">
+            <a:schemeClr val="accent1"/>
+          </a:effectRef>
+          <a:fontRef idx="minor">
+            <a:schemeClr val="tx1"/>
+          </a:fontRef>
+        </p:style>
+      </p:cxnSp>
+      <p:cxnSp>
+        <p:nvCxnSpPr>
+          <p:cNvPr id="127" name="Connector: Elbow 126">
+            <a:extLst>
+              <a:ext uri="{FF2B5EF4-FFF2-40B4-BE49-F238E27FC236}">
+                <a16:creationId xmlns:a16="http://schemas.microsoft.com/office/drawing/2014/main" id="{025F194D-7E97-4BE7-90C1-498D232BEDC3}"/>
+              </a:ext>
+            </a:extLst>
+          </p:cNvPr>
+          <p:cNvCxnSpPr>
+            <a:stCxn id="89" idx="0"/>
+            <a:endCxn id="74" idx="2"/>
+          </p:cNvCxnSpPr>
+          <p:nvPr/>
+        </p:nvCxnSpPr>
+        <p:spPr>
+          <a:xfrm rot="5400000" flipH="1" flipV="1">
+            <a:off x="9760048" y="2663168"/>
+            <a:ext cx="524498" cy="245022"/>
+          </a:xfrm>
+          <a:prstGeom prst="bentConnector3">
+            <a:avLst/>
+          </a:prstGeom>
+          <a:ln>
+            <a:tailEnd type="triangle"/>
+          </a:ln>
+        </p:spPr>
+        <p:style>
+          <a:lnRef idx="1">
+            <a:schemeClr val="accent1"/>
+          </a:lnRef>
+          <a:fillRef idx="0">
+            <a:schemeClr val="accent1"/>
+          </a:fillRef>
+          <a:effectRef idx="0">
+            <a:schemeClr val="accent1"/>
+          </a:effectRef>
+          <a:fontRef idx="minor">
+            <a:schemeClr val="tx1"/>
+          </a:fontRef>
+        </p:style>
+      </p:cxnSp>
+      <p:cxnSp>
+        <p:nvCxnSpPr>
+          <p:cNvPr id="129" name="Connector: Elbow 128">
+            <a:extLst>
+              <a:ext uri="{FF2B5EF4-FFF2-40B4-BE49-F238E27FC236}">
+                <a16:creationId xmlns:a16="http://schemas.microsoft.com/office/drawing/2014/main" id="{CA6B49A1-FC37-4909-80AB-ABD1699E5737}"/>
+              </a:ext>
+            </a:extLst>
+          </p:cNvPr>
+          <p:cNvCxnSpPr>
+            <a:stCxn id="90" idx="0"/>
+            <a:endCxn id="74" idx="2"/>
+          </p:cNvCxnSpPr>
+          <p:nvPr/>
+        </p:nvCxnSpPr>
+        <p:spPr>
+          <a:xfrm rot="16200000" flipV="1">
+            <a:off x="10186380" y="2481858"/>
+            <a:ext cx="524198" cy="607341"/>
+          </a:xfrm>
+          <a:prstGeom prst="bentConnector3">
+            <a:avLst/>
+          </a:prstGeom>
+          <a:ln>
+            <a:tailEnd type="triangle"/>
+          </a:ln>
+        </p:spPr>
+        <p:style>
+          <a:lnRef idx="1">
+            <a:schemeClr val="accent1"/>
+          </a:lnRef>
+          <a:fillRef idx="0">
+            <a:schemeClr val="accent1"/>
+          </a:fillRef>
+          <a:effectRef idx="0">
+            <a:schemeClr val="accent1"/>
+          </a:effectRef>
+          <a:fontRef idx="minor">
+            <a:schemeClr val="tx1"/>
+          </a:fontRef>
+        </p:style>
+      </p:cxnSp>
+      <p:cxnSp>
+        <p:nvCxnSpPr>
+          <p:cNvPr id="131" name="Connector: Elbow 130">
+            <a:extLst>
+              <a:ext uri="{FF2B5EF4-FFF2-40B4-BE49-F238E27FC236}">
+                <a16:creationId xmlns:a16="http://schemas.microsoft.com/office/drawing/2014/main" id="{ABF22CB6-C754-44FA-A6A1-BE1515698C3A}"/>
+              </a:ext>
+            </a:extLst>
+          </p:cNvPr>
+          <p:cNvCxnSpPr>
+            <a:stCxn id="109" idx="0"/>
+            <a:endCxn id="74" idx="2"/>
+          </p:cNvCxnSpPr>
+          <p:nvPr/>
+        </p:nvCxnSpPr>
+        <p:spPr>
+          <a:xfrm rot="16200000" flipV="1">
+            <a:off x="10645175" y="2023064"/>
+            <a:ext cx="512687" cy="1513419"/>
+          </a:xfrm>
+          <a:prstGeom prst="bentConnector3">
+            <a:avLst/>
+          </a:prstGeom>
+          <a:ln>
+            <a:tailEnd type="triangle"/>
+          </a:ln>
+        </p:spPr>
+        <p:style>
+          <a:lnRef idx="1">
+            <a:schemeClr val="accent1"/>
+          </a:lnRef>
+          <a:fillRef idx="0">
+            <a:schemeClr val="accent1"/>
+          </a:fillRef>
+          <a:effectRef idx="0">
+            <a:schemeClr val="accent1"/>
+          </a:effectRef>
+          <a:fontRef idx="minor">
+            <a:schemeClr val="tx1"/>
+          </a:fontRef>
+        </p:style>
+      </p:cxnSp>
+      <p:sp>
+        <p:nvSpPr>
+          <p:cNvPr id="132" name="TextBox 131">
+            <a:extLst>
+              <a:ext uri="{FF2B5EF4-FFF2-40B4-BE49-F238E27FC236}">
+                <a16:creationId xmlns:a16="http://schemas.microsoft.com/office/drawing/2014/main" id="{3B5E71FD-90D0-47C2-AA96-A23BD16AD572}"/>
+              </a:ext>
+            </a:extLst>
+          </p:cNvPr>
+          <p:cNvSpPr txBox="1"/>
+          <p:nvPr/>
+        </p:nvSpPr>
+        <p:spPr>
+          <a:xfrm>
+            <a:off x="2376234" y="3961189"/>
+            <a:ext cx="1622358" cy="261610"/>
+          </a:xfrm>
+          <a:prstGeom prst="rect">
+            <a:avLst/>
+          </a:prstGeom>
+          <a:noFill/>
+        </p:spPr>
+        <p:txBody>
+          <a:bodyPr wrap="square" rtlCol="0">
+            <a:spAutoFit/>
+          </a:bodyPr>
+          <a:lstStyle/>
+          <a:p>
+            <a:pPr algn="ctr"/>
+            <a:r>
+              <a:rPr lang="en-IN" sz="1100" b="1" dirty="0" err="1">
+                <a:solidFill>
+                  <a:schemeClr val="bg1"/>
+                </a:solidFill>
+              </a:rPr>
+              <a:t>CommandPrompt</a:t>
+            </a:r>
+            <a:endParaRPr lang="en-IN" sz="1100" b="1" dirty="0">
+              <a:solidFill>
+                <a:schemeClr val="bg1"/>
+              </a:solidFill>
+            </a:endParaRPr>
+          </a:p>
+        </p:txBody>
+      </p:sp>
+      <p:sp>
+        <p:nvSpPr>
+          <p:cNvPr id="139" name="Rectangle 138">
+            <a:extLst>
+              <a:ext uri="{FF2B5EF4-FFF2-40B4-BE49-F238E27FC236}">
+                <a16:creationId xmlns:a16="http://schemas.microsoft.com/office/drawing/2014/main" id="{28D374E5-06ED-40D7-A632-66F8E0629D04}"/>
+              </a:ext>
+            </a:extLst>
+          </p:cNvPr>
+          <p:cNvSpPr/>
+          <p:nvPr/>
+        </p:nvSpPr>
+        <p:spPr>
+          <a:xfrm>
+            <a:off x="9115335" y="3674150"/>
+            <a:ext cx="906713" cy="504778"/>
+          </a:xfrm>
+          <a:prstGeom prst="rect">
+            <a:avLst/>
+          </a:prstGeom>
+        </p:spPr>
+        <p:style>
+          <a:lnRef idx="2">
+            <a:schemeClr val="accent1">
+              <a:shade val="50000"/>
+            </a:schemeClr>
+          </a:lnRef>
+          <a:fillRef idx="1">
+            <a:schemeClr val="accent1"/>
+          </a:fillRef>
+          <a:effectRef idx="0">
+            <a:schemeClr val="accent1"/>
+          </a:effectRef>
+          <a:fontRef idx="minor">
+            <a:schemeClr val="lt1"/>
+          </a:fontRef>
+        </p:style>
+        <p:txBody>
+          <a:bodyPr rtlCol="0" anchor="ctr"/>
+          <a:lstStyle/>
+          <a:p>
+            <a:pPr algn="ctr"/>
+            <a:endParaRPr lang="en-US"/>
+          </a:p>
+        </p:txBody>
+      </p:sp>
+      <p:sp>
+        <p:nvSpPr>
+          <p:cNvPr id="140" name="TextBox 139">
+            <a:extLst>
+              <a:ext uri="{FF2B5EF4-FFF2-40B4-BE49-F238E27FC236}">
+                <a16:creationId xmlns:a16="http://schemas.microsoft.com/office/drawing/2014/main" id="{08E09B3B-7C7C-48CD-A31B-7A8617F21E30}"/>
+              </a:ext>
+            </a:extLst>
+          </p:cNvPr>
+          <p:cNvSpPr txBox="1"/>
+          <p:nvPr/>
+        </p:nvSpPr>
+        <p:spPr>
+          <a:xfrm>
+            <a:off x="9115334" y="3715301"/>
+            <a:ext cx="906713" cy="369332"/>
+          </a:xfrm>
+          <a:prstGeom prst="rect">
+            <a:avLst/>
+          </a:prstGeom>
+          <a:noFill/>
+        </p:spPr>
+        <p:txBody>
+          <a:bodyPr wrap="square" rtlCol="0">
+            <a:spAutoFit/>
+          </a:bodyPr>
+          <a:lstStyle/>
+          <a:p>
+            <a:pPr algn="ctr"/>
+            <a:r>
+              <a:rPr lang="en-IN" b="1" dirty="0">
+                <a:solidFill>
+                  <a:schemeClr val="bg1"/>
+                </a:solidFill>
+              </a:rPr>
+              <a:t>Order</a:t>
+            </a:r>
+          </a:p>
+        </p:txBody>
+      </p:sp>
+      <p:sp>
+        <p:nvSpPr>
+          <p:cNvPr id="141" name="TextBox 140">
+            <a:extLst>
+              <a:ext uri="{FF2B5EF4-FFF2-40B4-BE49-F238E27FC236}">
+                <a16:creationId xmlns:a16="http://schemas.microsoft.com/office/drawing/2014/main" id="{48A53641-8E73-4D77-A779-96C66ED1D023}"/>
+              </a:ext>
+            </a:extLst>
+          </p:cNvPr>
+          <p:cNvSpPr txBox="1"/>
+          <p:nvPr/>
+        </p:nvSpPr>
+        <p:spPr>
+          <a:xfrm>
+            <a:off x="7709174" y="4309402"/>
+            <a:ext cx="1519707" cy="369332"/>
+          </a:xfrm>
+          <a:prstGeom prst="rect">
+            <a:avLst/>
+          </a:prstGeom>
+          <a:noFill/>
+        </p:spPr>
+        <p:txBody>
+          <a:bodyPr wrap="square" rtlCol="0">
+            <a:spAutoFit/>
+          </a:bodyPr>
+          <a:lstStyle/>
+          <a:p>
+            <a:pPr algn="ctr"/>
+            <a:r>
+              <a:rPr lang="en-IN" b="1" dirty="0">
+                <a:solidFill>
+                  <a:schemeClr val="bg1"/>
+                </a:solidFill>
+              </a:rPr>
+              <a:t>CONTROLLR</a:t>
+            </a:r>
+          </a:p>
+        </p:txBody>
+      </p:sp>
+      <p:sp>
+        <p:nvSpPr>
+          <p:cNvPr id="142" name="TextBox 141">
+            <a:extLst>
+              <a:ext uri="{FF2B5EF4-FFF2-40B4-BE49-F238E27FC236}">
+                <a16:creationId xmlns:a16="http://schemas.microsoft.com/office/drawing/2014/main" id="{41E88371-96EA-4C24-B2BE-A3B120D76EF7}"/>
+              </a:ext>
+            </a:extLst>
+          </p:cNvPr>
+          <p:cNvSpPr txBox="1"/>
+          <p:nvPr/>
+        </p:nvSpPr>
+        <p:spPr>
+          <a:xfrm>
+            <a:off x="8892402" y="4619621"/>
+            <a:ext cx="1610916" cy="369332"/>
+          </a:xfrm>
+          <a:prstGeom prst="rect">
+            <a:avLst/>
+          </a:prstGeom>
+          <a:noFill/>
+        </p:spPr>
+        <p:txBody>
+          <a:bodyPr wrap="square" rtlCol="0">
+            <a:spAutoFit/>
+          </a:bodyPr>
+          <a:lstStyle/>
+          <a:p>
+            <a:pPr algn="ctr"/>
+            <a:r>
+              <a:rPr lang="en-IN" b="1" dirty="0">
+                <a:solidFill>
+                  <a:schemeClr val="bg1"/>
+                </a:solidFill>
+              </a:rPr>
+              <a:t>CONTROLLER</a:t>
+            </a:r>
+          </a:p>
+        </p:txBody>
+      </p:sp>
+      <p:sp>
+        <p:nvSpPr>
+          <p:cNvPr id="143" name="Rectangle 142">
+            <a:extLst>
+              <a:ext uri="{FF2B5EF4-FFF2-40B4-BE49-F238E27FC236}">
+                <a16:creationId xmlns:a16="http://schemas.microsoft.com/office/drawing/2014/main" id="{43ED95D3-E850-4338-8272-3D84AB2D45DA}"/>
+              </a:ext>
+            </a:extLst>
+          </p:cNvPr>
+          <p:cNvSpPr/>
+          <p:nvPr/>
+        </p:nvSpPr>
+        <p:spPr>
+          <a:xfrm>
+            <a:off x="7955168" y="4554428"/>
+            <a:ext cx="759269" cy="421816"/>
+          </a:xfrm>
+          <a:prstGeom prst="rect">
+            <a:avLst/>
+          </a:prstGeom>
+        </p:spPr>
+        <p:style>
+          <a:lnRef idx="2">
+            <a:schemeClr val="accent1">
+              <a:shade val="50000"/>
+            </a:schemeClr>
+          </a:lnRef>
+          <a:fillRef idx="1">
+            <a:schemeClr val="accent1"/>
+          </a:fillRef>
+          <a:effectRef idx="0">
+            <a:schemeClr val="accent1"/>
+          </a:effectRef>
+          <a:fontRef idx="minor">
+            <a:schemeClr val="lt1"/>
+          </a:fontRef>
+        </p:style>
+        <p:txBody>
+          <a:bodyPr rtlCol="0" anchor="ctr"/>
+          <a:lstStyle/>
+          <a:p>
+            <a:pPr algn="ctr"/>
+            <a:endParaRPr lang="en-IN"/>
+          </a:p>
+        </p:txBody>
+      </p:sp>
+      <p:sp>
+        <p:nvSpPr>
+          <p:cNvPr id="144" name="Rectangle 143">
+            <a:extLst>
+              <a:ext uri="{FF2B5EF4-FFF2-40B4-BE49-F238E27FC236}">
+                <a16:creationId xmlns:a16="http://schemas.microsoft.com/office/drawing/2014/main" id="{A15F8655-7E27-4267-8103-68121B965B86}"/>
+              </a:ext>
+            </a:extLst>
+          </p:cNvPr>
+          <p:cNvSpPr/>
+          <p:nvPr/>
+        </p:nvSpPr>
+        <p:spPr>
+          <a:xfrm>
+            <a:off x="8855700" y="4549736"/>
+            <a:ext cx="759269" cy="421816"/>
+          </a:xfrm>
+          <a:prstGeom prst="rect">
+            <a:avLst/>
+          </a:prstGeom>
+        </p:spPr>
+        <p:style>
+          <a:lnRef idx="2">
+            <a:schemeClr val="accent1">
+              <a:shade val="50000"/>
+            </a:schemeClr>
+          </a:lnRef>
+          <a:fillRef idx="1">
+            <a:schemeClr val="accent1"/>
+          </a:fillRef>
+          <a:effectRef idx="0">
+            <a:schemeClr val="accent1"/>
+          </a:effectRef>
+          <a:fontRef idx="minor">
+            <a:schemeClr val="lt1"/>
+          </a:fontRef>
+        </p:style>
+        <p:txBody>
+          <a:bodyPr rtlCol="0" anchor="ctr"/>
+          <a:lstStyle/>
+          <a:p>
+            <a:pPr algn="ctr"/>
+            <a:endParaRPr lang="en-IN"/>
+          </a:p>
+        </p:txBody>
+      </p:sp>
+      <p:sp>
+        <p:nvSpPr>
+          <p:cNvPr id="145" name="Rectangle 144">
+            <a:extLst>
+              <a:ext uri="{FF2B5EF4-FFF2-40B4-BE49-F238E27FC236}">
+                <a16:creationId xmlns:a16="http://schemas.microsoft.com/office/drawing/2014/main" id="{89A50676-A6C6-4096-8631-38DDD5D9293A}"/>
+              </a:ext>
+            </a:extLst>
+          </p:cNvPr>
+          <p:cNvSpPr/>
+          <p:nvPr/>
+        </p:nvSpPr>
+        <p:spPr>
+          <a:xfrm>
+            <a:off x="9708063" y="4549736"/>
+            <a:ext cx="759269" cy="421816"/>
+          </a:xfrm>
+          <a:prstGeom prst="rect">
+            <a:avLst/>
+          </a:prstGeom>
+        </p:spPr>
+        <p:style>
+          <a:lnRef idx="2">
+            <a:schemeClr val="accent1">
+              <a:shade val="50000"/>
+            </a:schemeClr>
+          </a:lnRef>
+          <a:fillRef idx="1">
+            <a:schemeClr val="accent1"/>
+          </a:fillRef>
+          <a:effectRef idx="0">
+            <a:schemeClr val="accent1"/>
+          </a:effectRef>
+          <a:fontRef idx="minor">
+            <a:schemeClr val="lt1"/>
+          </a:fontRef>
+        </p:style>
+        <p:txBody>
+          <a:bodyPr rtlCol="0" anchor="ctr"/>
+          <a:lstStyle/>
+          <a:p>
+            <a:pPr algn="ctr"/>
+            <a:endParaRPr lang="en-IN"/>
+          </a:p>
+        </p:txBody>
+      </p:sp>
+      <p:sp>
+        <p:nvSpPr>
+          <p:cNvPr id="146" name="Rectangle 145">
+            <a:extLst>
+              <a:ext uri="{FF2B5EF4-FFF2-40B4-BE49-F238E27FC236}">
+                <a16:creationId xmlns:a16="http://schemas.microsoft.com/office/drawing/2014/main" id="{7FE732F5-66F4-49C2-893F-7A2552A3EFE2}"/>
+              </a:ext>
+            </a:extLst>
+          </p:cNvPr>
+          <p:cNvSpPr/>
+          <p:nvPr/>
+        </p:nvSpPr>
+        <p:spPr>
+          <a:xfrm>
+            <a:off x="10560426" y="4549436"/>
+            <a:ext cx="759269" cy="421816"/>
+          </a:xfrm>
+          <a:prstGeom prst="rect">
+            <a:avLst/>
+          </a:prstGeom>
+        </p:spPr>
+        <p:style>
+          <a:lnRef idx="2">
+            <a:schemeClr val="accent1">
+              <a:shade val="50000"/>
+            </a:schemeClr>
+          </a:lnRef>
+          <a:fillRef idx="1">
+            <a:schemeClr val="accent1"/>
+          </a:fillRef>
+          <a:effectRef idx="0">
+            <a:schemeClr val="accent1"/>
+          </a:effectRef>
+          <a:fontRef idx="minor">
+            <a:schemeClr val="lt1"/>
+          </a:fontRef>
+        </p:style>
+        <p:txBody>
+          <a:bodyPr rtlCol="0" anchor="ctr"/>
+          <a:lstStyle/>
+          <a:p>
+            <a:pPr algn="ctr"/>
+            <a:endParaRPr lang="en-IN"/>
+          </a:p>
+        </p:txBody>
+      </p:sp>
+      <p:sp>
+        <p:nvSpPr>
+          <p:cNvPr id="147" name="TextBox 146">
+            <a:extLst>
+              <a:ext uri="{FF2B5EF4-FFF2-40B4-BE49-F238E27FC236}">
+                <a16:creationId xmlns:a16="http://schemas.microsoft.com/office/drawing/2014/main" id="{28666FA5-C0D4-4B21-B8A9-E3987B5394BD}"/>
+              </a:ext>
+            </a:extLst>
+          </p:cNvPr>
+          <p:cNvSpPr txBox="1"/>
+          <p:nvPr/>
+        </p:nvSpPr>
+        <p:spPr>
+          <a:xfrm>
+            <a:off x="7849043" y="4646403"/>
+            <a:ext cx="918009" cy="276999"/>
+          </a:xfrm>
+          <a:prstGeom prst="rect">
+            <a:avLst/>
+          </a:prstGeom>
+          <a:noFill/>
+        </p:spPr>
+        <p:txBody>
+          <a:bodyPr wrap="square" rtlCol="0">
+            <a:spAutoFit/>
+          </a:bodyPr>
+          <a:lstStyle/>
+          <a:p>
+            <a:pPr algn="ctr"/>
+            <a:r>
+              <a:rPr lang="en-IN" sz="1200" b="1" dirty="0">
+                <a:solidFill>
+                  <a:schemeClr val="bg1"/>
+                </a:solidFill>
+              </a:rPr>
+              <a:t>Deploy</a:t>
+            </a:r>
+          </a:p>
+        </p:txBody>
+      </p:sp>
+      <p:sp>
+        <p:nvSpPr>
+          <p:cNvPr id="148" name="TextBox 147">
+            <a:extLst>
+              <a:ext uri="{FF2B5EF4-FFF2-40B4-BE49-F238E27FC236}">
+                <a16:creationId xmlns:a16="http://schemas.microsoft.com/office/drawing/2014/main" id="{6958D732-41EC-4E29-BB37-E1B609EF6CF5}"/>
+              </a:ext>
+            </a:extLst>
+          </p:cNvPr>
+          <p:cNvSpPr txBox="1"/>
+          <p:nvPr/>
+        </p:nvSpPr>
+        <p:spPr>
+          <a:xfrm>
+            <a:off x="8762606" y="4612446"/>
+            <a:ext cx="918009" cy="276999"/>
+          </a:xfrm>
+          <a:prstGeom prst="rect">
+            <a:avLst/>
+          </a:prstGeom>
+          <a:noFill/>
+        </p:spPr>
+        <p:txBody>
+          <a:bodyPr wrap="square" rtlCol="0">
+            <a:spAutoFit/>
+          </a:bodyPr>
+          <a:lstStyle/>
+          <a:p>
+            <a:pPr algn="ctr"/>
+            <a:r>
+              <a:rPr lang="en-IN" sz="1200" b="1" dirty="0">
+                <a:solidFill>
+                  <a:schemeClr val="bg1"/>
+                </a:solidFill>
+              </a:rPr>
+              <a:t>Blockade</a:t>
+            </a:r>
+          </a:p>
+        </p:txBody>
+      </p:sp>
+      <p:sp>
+        <p:nvSpPr>
+          <p:cNvPr id="149" name="TextBox 148">
+            <a:extLst>
+              <a:ext uri="{FF2B5EF4-FFF2-40B4-BE49-F238E27FC236}">
+                <a16:creationId xmlns:a16="http://schemas.microsoft.com/office/drawing/2014/main" id="{FCA8E678-C86C-48A6-86AB-F0FB7C0B80AB}"/>
+              </a:ext>
+            </a:extLst>
+          </p:cNvPr>
+          <p:cNvSpPr txBox="1"/>
+          <p:nvPr/>
+        </p:nvSpPr>
+        <p:spPr>
+          <a:xfrm>
+            <a:off x="9607416" y="4630209"/>
+            <a:ext cx="918009" cy="230832"/>
+          </a:xfrm>
+          <a:prstGeom prst="rect">
+            <a:avLst/>
+          </a:prstGeom>
+          <a:noFill/>
+        </p:spPr>
+        <p:txBody>
+          <a:bodyPr wrap="square" rtlCol="0">
+            <a:spAutoFit/>
+          </a:bodyPr>
+          <a:lstStyle/>
+          <a:p>
+            <a:pPr algn="ctr"/>
+            <a:r>
+              <a:rPr lang="en-IN" sz="900" b="1" dirty="0">
+                <a:solidFill>
+                  <a:schemeClr val="bg1"/>
+                </a:solidFill>
+              </a:rPr>
+              <a:t>Negotiate</a:t>
+            </a:r>
+          </a:p>
+        </p:txBody>
+      </p:sp>
+      <p:sp>
+        <p:nvSpPr>
+          <p:cNvPr id="150" name="TextBox 149">
+            <a:extLst>
+              <a:ext uri="{FF2B5EF4-FFF2-40B4-BE49-F238E27FC236}">
+                <a16:creationId xmlns:a16="http://schemas.microsoft.com/office/drawing/2014/main" id="{F276A2BC-4C1C-467D-9106-63F10BAB4549}"/>
+              </a:ext>
+            </a:extLst>
+          </p:cNvPr>
+          <p:cNvSpPr txBox="1"/>
+          <p:nvPr/>
+        </p:nvSpPr>
+        <p:spPr>
+          <a:xfrm>
+            <a:off x="10451880" y="4605595"/>
+            <a:ext cx="918009" cy="276999"/>
+          </a:xfrm>
+          <a:prstGeom prst="rect">
+            <a:avLst/>
+          </a:prstGeom>
+          <a:noFill/>
+        </p:spPr>
+        <p:txBody>
+          <a:bodyPr wrap="square" rtlCol="0">
+            <a:spAutoFit/>
+          </a:bodyPr>
+          <a:lstStyle/>
+          <a:p>
+            <a:pPr algn="ctr"/>
+            <a:r>
+              <a:rPr lang="en-IN" sz="1200" b="1" dirty="0">
+                <a:solidFill>
+                  <a:schemeClr val="bg1"/>
+                </a:solidFill>
+              </a:rPr>
+              <a:t>Airlift</a:t>
+            </a:r>
+          </a:p>
+        </p:txBody>
+      </p:sp>
+      <p:sp>
+        <p:nvSpPr>
+          <p:cNvPr id="151" name="Rectangle 150">
+            <a:extLst>
+              <a:ext uri="{FF2B5EF4-FFF2-40B4-BE49-F238E27FC236}">
+                <a16:creationId xmlns:a16="http://schemas.microsoft.com/office/drawing/2014/main" id="{D6605B80-EA63-47AC-B019-BB0914DD6F2F}"/>
+              </a:ext>
+            </a:extLst>
+          </p:cNvPr>
+          <p:cNvSpPr/>
+          <p:nvPr/>
+        </p:nvSpPr>
+        <p:spPr>
+          <a:xfrm>
+            <a:off x="7096351" y="4558854"/>
+            <a:ext cx="759269" cy="421816"/>
+          </a:xfrm>
+          <a:prstGeom prst="rect">
+            <a:avLst/>
+          </a:prstGeom>
+        </p:spPr>
+        <p:style>
+          <a:lnRef idx="2">
+            <a:schemeClr val="accent1">
+              <a:shade val="50000"/>
+            </a:schemeClr>
+          </a:lnRef>
+          <a:fillRef idx="1">
+            <a:schemeClr val="accent1"/>
+          </a:fillRef>
+          <a:effectRef idx="0">
+            <a:schemeClr val="accent1"/>
+          </a:effectRef>
+          <a:fontRef idx="minor">
+            <a:schemeClr val="lt1"/>
+          </a:fontRef>
+        </p:style>
+        <p:txBody>
+          <a:bodyPr rtlCol="0" anchor="ctr"/>
+          <a:lstStyle/>
+          <a:p>
+            <a:pPr algn="ctr"/>
+            <a:endParaRPr lang="en-IN"/>
+          </a:p>
+        </p:txBody>
+      </p:sp>
+      <p:sp>
+        <p:nvSpPr>
+          <p:cNvPr id="152" name="Rectangle 151">
+            <a:extLst>
+              <a:ext uri="{FF2B5EF4-FFF2-40B4-BE49-F238E27FC236}">
+                <a16:creationId xmlns:a16="http://schemas.microsoft.com/office/drawing/2014/main" id="{80E8B561-1BDB-46F9-A7AA-8351ADCD9C6A}"/>
+              </a:ext>
+            </a:extLst>
+          </p:cNvPr>
+          <p:cNvSpPr/>
+          <p:nvPr/>
+        </p:nvSpPr>
+        <p:spPr>
+          <a:xfrm>
+            <a:off x="11462983" y="4549436"/>
+            <a:ext cx="759269" cy="421816"/>
+          </a:xfrm>
+          <a:prstGeom prst="rect">
+            <a:avLst/>
+          </a:prstGeom>
+        </p:spPr>
+        <p:style>
+          <a:lnRef idx="2">
+            <a:schemeClr val="accent1">
+              <a:shade val="50000"/>
+            </a:schemeClr>
+          </a:lnRef>
+          <a:fillRef idx="1">
+            <a:schemeClr val="accent1"/>
+          </a:fillRef>
+          <a:effectRef idx="0">
+            <a:schemeClr val="accent1"/>
+          </a:effectRef>
+          <a:fontRef idx="minor">
+            <a:schemeClr val="lt1"/>
+          </a:fontRef>
+        </p:style>
+        <p:txBody>
+          <a:bodyPr rtlCol="0" anchor="ctr"/>
+          <a:lstStyle/>
+          <a:p>
+            <a:pPr algn="ctr"/>
+            <a:endParaRPr lang="en-IN"/>
+          </a:p>
+        </p:txBody>
+      </p:sp>
+      <p:sp>
+        <p:nvSpPr>
+          <p:cNvPr id="153" name="TextBox 152">
+            <a:extLst>
+              <a:ext uri="{FF2B5EF4-FFF2-40B4-BE49-F238E27FC236}">
+                <a16:creationId xmlns:a16="http://schemas.microsoft.com/office/drawing/2014/main" id="{CB553CFA-BF9B-491B-86EA-44571A7F90C9}"/>
+              </a:ext>
+            </a:extLst>
+          </p:cNvPr>
+          <p:cNvSpPr txBox="1"/>
+          <p:nvPr/>
+        </p:nvSpPr>
+        <p:spPr>
+          <a:xfrm>
+            <a:off x="7023435" y="4639492"/>
+            <a:ext cx="918009" cy="276999"/>
+          </a:xfrm>
+          <a:prstGeom prst="rect">
+            <a:avLst/>
+          </a:prstGeom>
+          <a:noFill/>
+        </p:spPr>
+        <p:txBody>
+          <a:bodyPr wrap="square" rtlCol="0">
+            <a:spAutoFit/>
+          </a:bodyPr>
+          <a:lstStyle/>
+          <a:p>
+            <a:pPr algn="ctr"/>
+            <a:r>
+              <a:rPr lang="en-IN" sz="1200" b="1" dirty="0">
+                <a:solidFill>
+                  <a:schemeClr val="bg1"/>
+                </a:solidFill>
+              </a:rPr>
+              <a:t>Advance</a:t>
+            </a:r>
+          </a:p>
+        </p:txBody>
+      </p:sp>
+      <p:sp>
+        <p:nvSpPr>
+          <p:cNvPr id="154" name="TextBox 153">
+            <a:extLst>
+              <a:ext uri="{FF2B5EF4-FFF2-40B4-BE49-F238E27FC236}">
+                <a16:creationId xmlns:a16="http://schemas.microsoft.com/office/drawing/2014/main" id="{808A2A9B-0FD4-41F4-A4E0-CA3CB687D947}"/>
+              </a:ext>
+            </a:extLst>
+          </p:cNvPr>
+          <p:cNvSpPr txBox="1"/>
+          <p:nvPr/>
+        </p:nvSpPr>
+        <p:spPr>
+          <a:xfrm>
+            <a:off x="11369889" y="4610676"/>
+            <a:ext cx="918009" cy="276999"/>
+          </a:xfrm>
+          <a:prstGeom prst="rect">
+            <a:avLst/>
+          </a:prstGeom>
+          <a:noFill/>
+        </p:spPr>
+        <p:txBody>
+          <a:bodyPr wrap="square" rtlCol="0">
+            <a:spAutoFit/>
+          </a:bodyPr>
+          <a:lstStyle/>
+          <a:p>
+            <a:pPr algn="ctr"/>
+            <a:r>
+              <a:rPr lang="en-IN" sz="1200" b="1" dirty="0">
+                <a:solidFill>
+                  <a:schemeClr val="bg1"/>
+                </a:solidFill>
+              </a:rPr>
+              <a:t>Bomb</a:t>
+            </a:r>
+          </a:p>
+        </p:txBody>
+      </p:sp>
+      <p:cxnSp>
+        <p:nvCxnSpPr>
+          <p:cNvPr id="162" name="Connector: Elbow 161">
+            <a:extLst>
+              <a:ext uri="{FF2B5EF4-FFF2-40B4-BE49-F238E27FC236}">
+                <a16:creationId xmlns:a16="http://schemas.microsoft.com/office/drawing/2014/main" id="{29A04AE2-49C2-4F38-93BD-DE298AB3BE2B}"/>
+              </a:ext>
+            </a:extLst>
+          </p:cNvPr>
+          <p:cNvCxnSpPr>
+            <a:stCxn id="151" idx="0"/>
+            <a:endCxn id="139" idx="2"/>
+          </p:cNvCxnSpPr>
+          <p:nvPr/>
+        </p:nvCxnSpPr>
+        <p:spPr>
+          <a:xfrm rot="5400000" flipH="1" flipV="1">
+            <a:off x="8332376" y="3322538"/>
+            <a:ext cx="379926" cy="2092706"/>
+          </a:xfrm>
+          <a:prstGeom prst="bentConnector3">
+            <a:avLst/>
+          </a:prstGeom>
+          <a:ln>
+            <a:tailEnd type="triangle"/>
+          </a:ln>
+        </p:spPr>
+        <p:style>
+          <a:lnRef idx="1">
+            <a:schemeClr val="accent1"/>
+          </a:lnRef>
+          <a:fillRef idx="0">
+            <a:schemeClr val="accent1"/>
+          </a:fillRef>
+          <a:effectRef idx="0">
+            <a:schemeClr val="accent1"/>
+          </a:effectRef>
+          <a:fontRef idx="minor">
+            <a:schemeClr val="tx1"/>
+          </a:fontRef>
+        </p:style>
+      </p:cxnSp>
+      <p:cxnSp>
+        <p:nvCxnSpPr>
+          <p:cNvPr id="164" name="Connector: Elbow 163">
+            <a:extLst>
+              <a:ext uri="{FF2B5EF4-FFF2-40B4-BE49-F238E27FC236}">
+                <a16:creationId xmlns:a16="http://schemas.microsoft.com/office/drawing/2014/main" id="{E2B5DC45-CE47-4B72-8E39-44C28359E106}"/>
+              </a:ext>
+            </a:extLst>
+          </p:cNvPr>
+          <p:cNvCxnSpPr>
+            <a:stCxn id="143" idx="0"/>
+            <a:endCxn id="139" idx="2"/>
+          </p:cNvCxnSpPr>
+          <p:nvPr/>
+        </p:nvCxnSpPr>
+        <p:spPr>
+          <a:xfrm rot="5400000" flipH="1" flipV="1">
+            <a:off x="8763997" y="3749734"/>
+            <a:ext cx="375500" cy="1233889"/>
+          </a:xfrm>
+          <a:prstGeom prst="bentConnector3">
+            <a:avLst/>
+          </a:prstGeom>
+          <a:ln>
+            <a:tailEnd type="triangle"/>
+          </a:ln>
+        </p:spPr>
+        <p:style>
+          <a:lnRef idx="1">
+            <a:schemeClr val="accent1"/>
+          </a:lnRef>
+          <a:fillRef idx="0">
+            <a:schemeClr val="accent1"/>
+          </a:fillRef>
+          <a:effectRef idx="0">
+            <a:schemeClr val="accent1"/>
+          </a:effectRef>
+          <a:fontRef idx="minor">
+            <a:schemeClr val="tx1"/>
+          </a:fontRef>
+        </p:style>
+      </p:cxnSp>
+      <p:cxnSp>
+        <p:nvCxnSpPr>
+          <p:cNvPr id="166" name="Connector: Elbow 165">
+            <a:extLst>
+              <a:ext uri="{FF2B5EF4-FFF2-40B4-BE49-F238E27FC236}">
+                <a16:creationId xmlns:a16="http://schemas.microsoft.com/office/drawing/2014/main" id="{1FDEA49E-70F0-4395-8B35-5E7B5289D153}"/>
+              </a:ext>
+            </a:extLst>
+          </p:cNvPr>
+          <p:cNvCxnSpPr>
+            <a:stCxn id="144" idx="0"/>
+            <a:endCxn id="139" idx="2"/>
+          </p:cNvCxnSpPr>
+          <p:nvPr/>
+        </p:nvCxnSpPr>
+        <p:spPr>
+          <a:xfrm rot="5400000" flipH="1" flipV="1">
+            <a:off x="9216609" y="4197654"/>
+            <a:ext cx="370808" cy="333357"/>
+          </a:xfrm>
+          <a:prstGeom prst="bentConnector3">
+            <a:avLst/>
+          </a:prstGeom>
+          <a:ln>
+            <a:tailEnd type="triangle"/>
+          </a:ln>
+        </p:spPr>
+        <p:style>
+          <a:lnRef idx="1">
+            <a:schemeClr val="accent1"/>
+          </a:lnRef>
+          <a:fillRef idx="0">
+            <a:schemeClr val="accent1"/>
+          </a:fillRef>
+          <a:effectRef idx="0">
+            <a:schemeClr val="accent1"/>
+          </a:effectRef>
+          <a:fontRef idx="minor">
+            <a:schemeClr val="tx1"/>
+          </a:fontRef>
+        </p:style>
+      </p:cxnSp>
+      <p:cxnSp>
+        <p:nvCxnSpPr>
+          <p:cNvPr id="168" name="Connector: Elbow 167">
+            <a:extLst>
+              <a:ext uri="{FF2B5EF4-FFF2-40B4-BE49-F238E27FC236}">
+                <a16:creationId xmlns:a16="http://schemas.microsoft.com/office/drawing/2014/main" id="{FB2ADCF2-EDF7-4CF3-AF75-FFC10B337224}"/>
+              </a:ext>
+            </a:extLst>
+          </p:cNvPr>
+          <p:cNvCxnSpPr>
+            <a:stCxn id="145" idx="0"/>
+            <a:endCxn id="139" idx="2"/>
+          </p:cNvCxnSpPr>
+          <p:nvPr/>
+        </p:nvCxnSpPr>
+        <p:spPr>
+          <a:xfrm rot="16200000" flipV="1">
+            <a:off x="9642791" y="4104829"/>
+            <a:ext cx="370808" cy="519006"/>
+          </a:xfrm>
+          <a:prstGeom prst="bentConnector3">
+            <a:avLst/>
+          </a:prstGeom>
+          <a:ln>
+            <a:tailEnd type="triangle"/>
+          </a:ln>
+        </p:spPr>
+        <p:style>
+          <a:lnRef idx="1">
+            <a:schemeClr val="accent1"/>
+          </a:lnRef>
+          <a:fillRef idx="0">
+            <a:schemeClr val="accent1"/>
+          </a:fillRef>
+          <a:effectRef idx="0">
+            <a:schemeClr val="accent1"/>
+          </a:effectRef>
+          <a:fontRef idx="minor">
+            <a:schemeClr val="tx1"/>
+          </a:fontRef>
+        </p:style>
+      </p:cxnSp>
+      <p:cxnSp>
+        <p:nvCxnSpPr>
+          <p:cNvPr id="170" name="Connector: Elbow 169">
+            <a:extLst>
+              <a:ext uri="{FF2B5EF4-FFF2-40B4-BE49-F238E27FC236}">
+                <a16:creationId xmlns:a16="http://schemas.microsoft.com/office/drawing/2014/main" id="{82C98B70-ECDB-47D1-AD3C-66631A0D288D}"/>
+              </a:ext>
+            </a:extLst>
+          </p:cNvPr>
+          <p:cNvCxnSpPr>
+            <a:stCxn id="146" idx="0"/>
+            <a:endCxn id="139" idx="2"/>
+          </p:cNvCxnSpPr>
+          <p:nvPr/>
+        </p:nvCxnSpPr>
+        <p:spPr>
+          <a:xfrm rot="16200000" flipV="1">
+            <a:off x="10069123" y="3678497"/>
+            <a:ext cx="370508" cy="1371369"/>
+          </a:xfrm>
+          <a:prstGeom prst="bentConnector3">
+            <a:avLst/>
+          </a:prstGeom>
+          <a:ln>
+            <a:tailEnd type="triangle"/>
+          </a:ln>
+        </p:spPr>
+        <p:style>
+          <a:lnRef idx="1">
+            <a:schemeClr val="accent1"/>
+          </a:lnRef>
+          <a:fillRef idx="0">
+            <a:schemeClr val="accent1"/>
+          </a:fillRef>
+          <a:effectRef idx="0">
+            <a:schemeClr val="accent1"/>
+          </a:effectRef>
+          <a:fontRef idx="minor">
+            <a:schemeClr val="tx1"/>
+          </a:fontRef>
+        </p:style>
+      </p:cxnSp>
+      <p:cxnSp>
+        <p:nvCxnSpPr>
+          <p:cNvPr id="172" name="Connector: Elbow 171">
+            <a:extLst>
+              <a:ext uri="{FF2B5EF4-FFF2-40B4-BE49-F238E27FC236}">
+                <a16:creationId xmlns:a16="http://schemas.microsoft.com/office/drawing/2014/main" id="{2BBC7BE9-FC5D-4705-95A0-3E9E354F2227}"/>
+              </a:ext>
+            </a:extLst>
+          </p:cNvPr>
+          <p:cNvCxnSpPr>
+            <a:stCxn id="152" idx="0"/>
+            <a:endCxn id="139" idx="2"/>
+          </p:cNvCxnSpPr>
+          <p:nvPr/>
+        </p:nvCxnSpPr>
+        <p:spPr>
+          <a:xfrm rot="16200000" flipV="1">
+            <a:off x="10520401" y="3227219"/>
+            <a:ext cx="370508" cy="2273926"/>
+          </a:xfrm>
+          <a:prstGeom prst="bentConnector3">
+            <a:avLst/>
+          </a:prstGeom>
+          <a:ln>
+            <a:tailEnd type="triangle"/>
+          </a:ln>
+        </p:spPr>
+        <p:style>
+          <a:lnRef idx="1">
+            <a:schemeClr val="accent1"/>
+          </a:lnRef>
+          <a:fillRef idx="0">
+            <a:schemeClr val="accent1"/>
+          </a:fillRef>
+          <a:effectRef idx="0">
+            <a:schemeClr val="accent1"/>
+          </a:effectRef>
+          <a:fontRef idx="minor">
+            <a:schemeClr val="tx1"/>
+          </a:fontRef>
+        </p:style>
+      </p:cxnSp>
+      <p:sp>
+        <p:nvSpPr>
+          <p:cNvPr id="173" name="TextBox 172">
+            <a:extLst>
+              <a:ext uri="{FF2B5EF4-FFF2-40B4-BE49-F238E27FC236}">
+                <a16:creationId xmlns:a16="http://schemas.microsoft.com/office/drawing/2014/main" id="{F2749A32-760F-4499-B593-70738991A69E}"/>
+              </a:ext>
+            </a:extLst>
+          </p:cNvPr>
+          <p:cNvSpPr txBox="1"/>
+          <p:nvPr/>
+        </p:nvSpPr>
+        <p:spPr>
+          <a:xfrm>
+            <a:off x="3088809" y="2164440"/>
+            <a:ext cx="874150" cy="369332"/>
+          </a:xfrm>
+          <a:prstGeom prst="rect">
+            <a:avLst/>
+          </a:prstGeom>
+          <a:noFill/>
+        </p:spPr>
+        <p:txBody>
+          <a:bodyPr wrap="square" rtlCol="0">
+            <a:spAutoFit/>
+          </a:bodyPr>
+          <a:lstStyle/>
+          <a:p>
+            <a:r>
+              <a:rPr lang="en-US" dirty="0"/>
+              <a:t>Action</a:t>
+            </a:r>
+          </a:p>
+        </p:txBody>
+      </p:sp>
+      <p:sp>
+        <p:nvSpPr>
+          <p:cNvPr id="174" name="TextBox 173">
+            <a:extLst>
+              <a:ext uri="{FF2B5EF4-FFF2-40B4-BE49-F238E27FC236}">
+                <a16:creationId xmlns:a16="http://schemas.microsoft.com/office/drawing/2014/main" id="{FA5DF48E-E540-4D75-A564-1B722F12FB99}"/>
+              </a:ext>
+            </a:extLst>
+          </p:cNvPr>
+          <p:cNvSpPr txBox="1"/>
+          <p:nvPr/>
+        </p:nvSpPr>
+        <p:spPr>
           <a:xfrm rot="5400000">
-            <a:off x="5519819" y="3278823"/>
-            <a:ext cx="1327411" cy="1670925"/>
-          </a:xfrm>
-          <a:prstGeom prst="bentConnector2">
-            <a:avLst/>
+            <a:off x="5638014" y="2938621"/>
+            <a:ext cx="874150" cy="369332"/>
+          </a:xfrm>
+          <a:prstGeom prst="rect">
+            <a:avLst/>
+          </a:prstGeom>
+          <a:noFill/>
+        </p:spPr>
+        <p:txBody>
+          <a:bodyPr wrap="square" rtlCol="0">
+            <a:spAutoFit/>
+          </a:bodyPr>
+          <a:lstStyle/>
+          <a:p>
+            <a:r>
+              <a:rPr lang="en-US" dirty="0"/>
+              <a:t>Update</a:t>
+            </a:r>
+          </a:p>
+        </p:txBody>
+      </p:sp>
+      <p:sp>
+        <p:nvSpPr>
+          <p:cNvPr id="175" name="TextBox 174">
+            <a:extLst>
+              <a:ext uri="{FF2B5EF4-FFF2-40B4-BE49-F238E27FC236}">
+                <a16:creationId xmlns:a16="http://schemas.microsoft.com/office/drawing/2014/main" id="{DBB8BFA0-DBEB-456D-B835-8E6BF95CBED4}"/>
+              </a:ext>
+            </a:extLst>
+          </p:cNvPr>
+          <p:cNvSpPr txBox="1"/>
+          <p:nvPr/>
+        </p:nvSpPr>
+        <p:spPr>
+          <a:xfrm rot="16200000">
+            <a:off x="4331657" y="3975611"/>
+            <a:ext cx="1158618" cy="369332"/>
+          </a:xfrm>
+          <a:prstGeom prst="rect">
+            <a:avLst/>
+          </a:prstGeom>
+          <a:noFill/>
+        </p:spPr>
+        <p:txBody>
+          <a:bodyPr wrap="square" rtlCol="0">
+            <a:spAutoFit/>
+          </a:bodyPr>
+          <a:lstStyle/>
+          <a:p>
+            <a:r>
+              <a:rPr lang="en-US" dirty="0"/>
+              <a:t>Feedback</a:t>
+            </a:r>
+          </a:p>
+        </p:txBody>
+      </p:sp>
+      <p:sp>
+        <p:nvSpPr>
+          <p:cNvPr id="177" name="TextBox 176">
+            <a:extLst>
+              <a:ext uri="{FF2B5EF4-FFF2-40B4-BE49-F238E27FC236}">
+                <a16:creationId xmlns:a16="http://schemas.microsoft.com/office/drawing/2014/main" id="{132309CA-EB51-4E57-AB15-4F96A2510424}"/>
+              </a:ext>
+            </a:extLst>
+          </p:cNvPr>
+          <p:cNvSpPr txBox="1"/>
+          <p:nvPr/>
+        </p:nvSpPr>
+        <p:spPr>
+          <a:xfrm rot="16200000">
+            <a:off x="3870421" y="3524918"/>
+            <a:ext cx="1158618" cy="369332"/>
+          </a:xfrm>
+          <a:prstGeom prst="rect">
+            <a:avLst/>
+          </a:prstGeom>
+          <a:noFill/>
+        </p:spPr>
+        <p:txBody>
+          <a:bodyPr wrap="square" rtlCol="0">
+            <a:spAutoFit/>
+          </a:bodyPr>
+          <a:lstStyle/>
+          <a:p>
+            <a:r>
+              <a:rPr lang="en-US" dirty="0"/>
+              <a:t>Feedback</a:t>
+            </a:r>
+          </a:p>
+        </p:txBody>
+      </p:sp>
+      <p:cxnSp>
+        <p:nvCxnSpPr>
+          <p:cNvPr id="183" name="Connector: Elbow 182">
+            <a:extLst>
+              <a:ext uri="{FF2B5EF4-FFF2-40B4-BE49-F238E27FC236}">
+                <a16:creationId xmlns:a16="http://schemas.microsoft.com/office/drawing/2014/main" id="{A23746F9-AF66-45CD-A397-F1BC32D609E0}"/>
+              </a:ext>
+            </a:extLst>
+          </p:cNvPr>
+          <p:cNvCxnSpPr>
+            <a:stCxn id="15" idx="3"/>
+            <a:endCxn id="140" idx="1"/>
+          </p:cNvCxnSpPr>
+          <p:nvPr/>
+        </p:nvCxnSpPr>
+        <p:spPr>
+          <a:xfrm flipV="1">
+            <a:off x="6596566" y="3899967"/>
+            <a:ext cx="2518768" cy="594101"/>
+          </a:xfrm>
+          <a:prstGeom prst="bentConnector3">
+            <a:avLst>
+              <a:gd name="adj1" fmla="val 18631"/>
+            </a:avLst>
           </a:prstGeom>
           <a:ln>
+            <a:headEnd type="triangle"/>
             <a:tailEnd type="triangle"/>
           </a:ln>
         </p:spPr>
@@ -5156,10 +7261,9 @@
           <a:p>
             <a:pPr algn="ctr"/>
             <a:r>
-              <a:rPr lang="en-IN" sz="4400" dirty="0" smtClean="0"/>
+              <a:rPr lang="en-IN" sz="4400" dirty="0"/>
               <a:t>CODING CONVENTIONS AND TOOLS USED</a:t>
             </a:r>
-            <a:endParaRPr lang="en-IN" sz="4400" dirty="0"/>
           </a:p>
         </p:txBody>
       </p:sp>
@@ -5183,34 +7287,17 @@
               <a:buChar char="•"/>
             </a:pPr>
             <a:r>
-              <a:rPr lang="en-US" dirty="0" smtClean="0"/>
-              <a:t> Class </a:t>
-            </a:r>
-            <a:r>
               <a:rPr lang="en-US" dirty="0"/>
-              <a:t>names in </a:t>
-            </a:r>
-            <a:r>
-              <a:rPr lang="en-US" dirty="0" err="1" smtClean="0"/>
-              <a:t>Camel</a:t>
-            </a:r>
-            <a:r>
-              <a:rPr lang="en-US" dirty="0" err="1" smtClean="0"/>
-              <a:t>Case</a:t>
-            </a:r>
-            <a:r>
-              <a:rPr lang="en-US" dirty="0" smtClean="0"/>
-              <a:t> </a:t>
+              <a:t> Class names in </a:t>
+            </a:r>
+            <a:r>
+              <a:rPr lang="en-US" dirty="0" err="1"/>
+              <a:t>CamelCase</a:t>
             </a:r>
             <a:r>
               <a:rPr lang="en-US" dirty="0"/>
-              <a:t>that starts with a capital </a:t>
-            </a:r>
-            <a:r>
-              <a:rPr lang="en-US" dirty="0" smtClean="0"/>
-              <a:t>letter.</a:t>
-            </a:r>
-            <a:endParaRPr lang="en-US" dirty="0" smtClean="0"/>
+              <a:t> that starts with a capital letter.</a:t>
+            </a:r>
           </a:p>
           <a:p>
             <a:pPr>
@@ -5218,18 +7305,9 @@
               <a:buChar char="•"/>
             </a:pPr>
             <a:r>
-              <a:rPr lang="en-US" dirty="0" smtClean="0"/>
-              <a:t> Data </a:t>
-            </a:r>
-            <a:r>
               <a:rPr lang="en-US" dirty="0"/>
-              <a:t>members start with d_ </a:t>
-            </a:r>
-            <a:r>
-              <a:rPr lang="en-US" dirty="0" smtClean="0"/>
-              <a:t>.</a:t>
-            </a:r>
-            <a:endParaRPr lang="en-US" dirty="0" smtClean="0"/>
+              <a:t> Data members start with d_ .</a:t>
+            </a:r>
           </a:p>
           <a:p>
             <a:pPr>
@@ -5237,18 +7315,9 @@
               <a:buChar char="•"/>
             </a:pPr>
             <a:r>
-              <a:rPr lang="en-US" dirty="0" smtClean="0"/>
-              <a:t> Method </a:t>
-            </a:r>
-            <a:r>
               <a:rPr lang="en-US" dirty="0"/>
-              <a:t>parameters start with p_ </a:t>
-            </a:r>
-            <a:r>
-              <a:rPr lang="en-US" dirty="0" smtClean="0"/>
-              <a:t>.</a:t>
-            </a:r>
-            <a:endParaRPr lang="en-US" dirty="0" smtClean="0"/>
+              <a:t> Method parameters start with p_ .</a:t>
+            </a:r>
           </a:p>
           <a:p>
             <a:pPr>
@@ -5256,18 +7325,9 @@
               <a:buChar char="•"/>
             </a:pPr>
             <a:r>
-              <a:rPr lang="en-US" dirty="0" smtClean="0"/>
-              <a:t> Local </a:t>
-            </a:r>
-            <a:r>
               <a:rPr lang="en-US" dirty="0"/>
-              <a:t>variables start with l_ </a:t>
-            </a:r>
-            <a:r>
-              <a:rPr lang="en-US" dirty="0" smtClean="0"/>
-              <a:t>.</a:t>
-            </a:r>
-            <a:endParaRPr lang="en-US" dirty="0"/>
+              <a:t> Local variables start with l_ .</a:t>
+            </a:r>
           </a:p>
           <a:p>
             <a:pPr>
@@ -5275,16 +7335,8 @@
               <a:buChar char="•"/>
             </a:pPr>
             <a:r>
-              <a:rPr lang="en-US" dirty="0" smtClean="0"/>
-              <a:t>Static </a:t>
-            </a:r>
-            <a:r>
               <a:rPr lang="en-US" dirty="0"/>
-              <a:t>members start with a capital letter, non-static members start with a lower case </a:t>
-            </a:r>
-            <a:r>
-              <a:rPr lang="en-US" dirty="0" smtClean="0"/>
-              <a:t>letter.</a:t>
+              <a:t>Static members start with a capital letter, non-static members start with a lower case letter.</a:t>
             </a:r>
             <a:endParaRPr lang="en-IN" dirty="0"/>
           </a:p>
@@ -5294,27 +7346,27 @@
               <a:buChar char="•"/>
             </a:pPr>
             <a:r>
-              <a:rPr lang="en-IN" dirty="0" smtClean="0"/>
+              <a:rPr lang="en-IN" dirty="0"/>
               <a:t>For version control we have used </a:t>
             </a:r>
             <a:r>
-              <a:rPr lang="en-IN" b="1" dirty="0" err="1" smtClean="0"/>
+              <a:rPr lang="en-IN" b="1" dirty="0" err="1"/>
               <a:t>EGit</a:t>
             </a:r>
             <a:r>
-              <a:rPr lang="en-IN" b="1" dirty="0" smtClean="0"/>
+              <a:rPr lang="en-IN" b="1" dirty="0"/>
               <a:t> </a:t>
             </a:r>
             <a:r>
-              <a:rPr lang="en-IN" dirty="0" smtClean="0"/>
+              <a:rPr lang="en-IN" dirty="0"/>
               <a:t>(Eclipse Git) and </a:t>
             </a:r>
             <a:r>
-              <a:rPr lang="en-IN" b="1" dirty="0" err="1" smtClean="0"/>
+              <a:rPr lang="en-IN" b="1" dirty="0" err="1"/>
               <a:t>Github</a:t>
             </a:r>
             <a:r>
-              <a:rPr lang="en-IN" b="1" dirty="0" smtClean="0"/>
+              <a:rPr lang="en-IN" b="1" dirty="0"/>
               <a:t>.</a:t>
             </a:r>
           </a:p>
@@ -5324,15 +7376,15 @@
               <a:buChar char="•"/>
             </a:pPr>
             <a:r>
-              <a:rPr lang="en-IN" dirty="0" smtClean="0"/>
+              <a:rPr lang="en-IN" dirty="0"/>
               <a:t>For documentation we have used </a:t>
             </a:r>
             <a:r>
-              <a:rPr lang="en-IN" b="1" dirty="0" err="1" smtClean="0"/>
+              <a:rPr lang="en-IN" b="1" dirty="0" err="1"/>
               <a:t>Javadoc</a:t>
             </a:r>
             <a:r>
-              <a:rPr lang="en-IN" dirty="0" smtClean="0"/>
+              <a:rPr lang="en-IN" dirty="0"/>
               <a:t>. </a:t>
             </a:r>
           </a:p>
@@ -5342,15 +7394,15 @@
               <a:buChar char="•"/>
             </a:pPr>
             <a:r>
-              <a:rPr lang="en-IN" dirty="0" smtClean="0"/>
+              <a:rPr lang="en-IN" dirty="0"/>
               <a:t>For unit testing we have used </a:t>
             </a:r>
             <a:r>
-              <a:rPr lang="en-IN" b="1" dirty="0" err="1" smtClean="0"/>
+              <a:rPr lang="en-IN" b="1" dirty="0" err="1"/>
               <a:t>JUnit</a:t>
             </a:r>
             <a:r>
-              <a:rPr lang="en-IN" dirty="0" smtClean="0"/>
+              <a:rPr lang="en-IN" dirty="0"/>
               <a:t>.</a:t>
             </a:r>
           </a:p>
@@ -5360,38 +7412,25 @@
               <a:buChar char="•"/>
             </a:pPr>
             <a:r>
-              <a:rPr lang="en-IN" dirty="0" smtClean="0"/>
-              <a:t>For </a:t>
-            </a:r>
-            <a:r>
               <a:rPr lang="en-IN" dirty="0"/>
-              <a:t>C</a:t>
-            </a:r>
-            <a:r>
-              <a:rPr lang="en-IN" dirty="0" smtClean="0"/>
-              <a:t>ontinuous Integration we have used </a:t>
+              <a:t>For Continuous Integration we have used </a:t>
             </a:r>
             <a:r>
               <a:rPr lang="en-IN" b="1" dirty="0" err="1"/>
-              <a:t>G</a:t>
-            </a:r>
-            <a:r>
-              <a:rPr lang="en-IN" b="1" dirty="0" err="1" smtClean="0"/>
-              <a:t>ithub</a:t>
-            </a:r>
-            <a:r>
-              <a:rPr lang="en-IN" dirty="0" smtClean="0"/>
+              <a:t>Github</a:t>
+            </a:r>
+            <a:r>
+              <a:rPr lang="en-IN" dirty="0"/>
               <a:t> </a:t>
             </a:r>
             <a:r>
-              <a:rPr lang="en-IN" b="1" dirty="0" smtClean="0"/>
+              <a:rPr lang="en-IN" b="1" dirty="0"/>
               <a:t>Actions</a:t>
             </a:r>
             <a:r>
-              <a:rPr lang="en-IN" dirty="0" smtClean="0"/>
+              <a:rPr lang="en-IN" dirty="0"/>
               <a:t>.</a:t>
             </a:r>
-            <a:endParaRPr lang="en-IN" dirty="0"/>
           </a:p>
         </p:txBody>
       </p:sp>

</xml_diff>

<commit_message>
Uncommitted change in the architecture diagram
</commit_message>
<xml_diff>
--- a/resource/RISK GAME.pptx
+++ b/resource/RISK GAME.pptx
@@ -4124,13 +4124,8 @@
           <a:p>
             <a:r>
               <a:rPr lang="en-IN" dirty="0"/>
-              <a:t>4. Discussion of </a:t>
-            </a:r>
-            <a:r>
-              <a:rPr lang="en-IN"/>
-              <a:t>Refactoring document.</a:t>
-            </a:r>
-            <a:endParaRPr lang="en-IN" dirty="0"/>
+              <a:t>4. Discussion of Refactoring document.</a:t>
+            </a:r>
           </a:p>
         </p:txBody>
       </p:sp>

</xml_diff>

<commit_message>
added doc for data members
</commit_message>
<xml_diff>
--- a/resource/RISK GAME.pptx
+++ b/resource/RISK GAME.pptx
@@ -8,7 +8,8 @@
     <p:sldId id="256" r:id="rId2"/>
     <p:sldId id="257" r:id="rId3"/>
     <p:sldId id="258" r:id="rId4"/>
-    <p:sldId id="259" r:id="rId5"/>
+    <p:sldId id="260" r:id="rId5"/>
+    <p:sldId id="259" r:id="rId6"/>
   </p:sldIdLst>
   <p:sldSz cx="12192000" cy="6858000"/>
   <p:notesSz cx="6858000" cy="9144000"/>
@@ -341,7 +342,7 @@
           <a:p>
             <a:fld id="{F5A0DC1E-3DF2-4B67-89A3-6A8F210A898F}" type="datetimeFigureOut">
               <a:rPr lang="en-IN" smtClean="0"/>
-              <a:t>25-03-2021</a:t>
+              <a:t>15-04-2021</a:t>
             </a:fld>
             <a:endParaRPr lang="en-IN"/>
           </a:p>
@@ -549,7 +550,7 @@
           <a:p>
             <a:fld id="{F5A0DC1E-3DF2-4B67-89A3-6A8F210A898F}" type="datetimeFigureOut">
               <a:rPr lang="en-IN" smtClean="0"/>
-              <a:t>25-03-2021</a:t>
+              <a:t>15-04-2021</a:t>
             </a:fld>
             <a:endParaRPr lang="en-IN"/>
           </a:p>
@@ -805,7 +806,7 @@
           <a:p>
             <a:fld id="{F5A0DC1E-3DF2-4B67-89A3-6A8F210A898F}" type="datetimeFigureOut">
               <a:rPr lang="en-IN" smtClean="0"/>
-              <a:t>25-03-2021</a:t>
+              <a:t>15-04-2021</a:t>
             </a:fld>
             <a:endParaRPr lang="en-IN"/>
           </a:p>
@@ -975,7 +976,7 @@
           <a:p>
             <a:fld id="{F5A0DC1E-3DF2-4B67-89A3-6A8F210A898F}" type="datetimeFigureOut">
               <a:rPr lang="en-IN" smtClean="0"/>
-              <a:t>25-03-2021</a:t>
+              <a:t>15-04-2021</a:t>
             </a:fld>
             <a:endParaRPr lang="en-IN"/>
           </a:p>
@@ -1318,7 +1319,7 @@
           <a:p>
             <a:fld id="{F5A0DC1E-3DF2-4B67-89A3-6A8F210A898F}" type="datetimeFigureOut">
               <a:rPr lang="en-IN" smtClean="0"/>
-              <a:t>25-03-2021</a:t>
+              <a:t>15-04-2021</a:t>
             </a:fld>
             <a:endParaRPr lang="en-IN"/>
           </a:p>
@@ -1593,7 +1594,7 @@
           <a:p>
             <a:fld id="{F5A0DC1E-3DF2-4B67-89A3-6A8F210A898F}" type="datetimeFigureOut">
               <a:rPr lang="en-IN" smtClean="0"/>
-              <a:t>25-03-2021</a:t>
+              <a:t>15-04-2021</a:t>
             </a:fld>
             <a:endParaRPr lang="en-IN"/>
           </a:p>
@@ -1972,7 +1973,7 @@
           <a:p>
             <a:fld id="{F5A0DC1E-3DF2-4B67-89A3-6A8F210A898F}" type="datetimeFigureOut">
               <a:rPr lang="en-IN" smtClean="0"/>
-              <a:t>25-03-2021</a:t>
+              <a:t>15-04-2021</a:t>
             </a:fld>
             <a:endParaRPr lang="en-IN"/>
           </a:p>
@@ -2090,7 +2091,7 @@
           <a:p>
             <a:fld id="{F5A0DC1E-3DF2-4B67-89A3-6A8F210A898F}" type="datetimeFigureOut">
               <a:rPr lang="en-IN" smtClean="0"/>
-              <a:t>25-03-2021</a:t>
+              <a:t>15-04-2021</a:t>
             </a:fld>
             <a:endParaRPr lang="en-IN"/>
           </a:p>
@@ -2261,7 +2262,7 @@
           <a:p>
             <a:fld id="{F5A0DC1E-3DF2-4B67-89A3-6A8F210A898F}" type="datetimeFigureOut">
               <a:rPr lang="en-IN" smtClean="0"/>
-              <a:t>25-03-2021</a:t>
+              <a:t>15-04-2021</a:t>
             </a:fld>
             <a:endParaRPr lang="en-IN"/>
           </a:p>
@@ -2615,7 +2616,7 @@
           <a:p>
             <a:fld id="{F5A0DC1E-3DF2-4B67-89A3-6A8F210A898F}" type="datetimeFigureOut">
               <a:rPr lang="en-IN" smtClean="0"/>
-              <a:t>25-03-2021</a:t>
+              <a:t>15-04-2021</a:t>
             </a:fld>
             <a:endParaRPr lang="en-IN"/>
           </a:p>
@@ -2992,7 +2993,7 @@
           <a:p>
             <a:fld id="{F5A0DC1E-3DF2-4B67-89A3-6A8F210A898F}" type="datetimeFigureOut">
               <a:rPr lang="en-IN" smtClean="0"/>
-              <a:t>25-03-2021</a:t>
+              <a:t>15-04-2021</a:t>
             </a:fld>
             <a:endParaRPr lang="en-IN"/>
           </a:p>
@@ -3279,7 +3280,7 @@
           <a:p>
             <a:fld id="{F5A0DC1E-3DF2-4B67-89A3-6A8F210A898F}" type="datetimeFigureOut">
               <a:rPr lang="en-IN" smtClean="0"/>
-              <a:t>25-03-2021</a:t>
+              <a:t>15-04-2021</a:t>
             </a:fld>
             <a:endParaRPr lang="en-IN"/>
           </a:p>
@@ -4885,18 +4886,13 @@
           <a:p>
             <a:pPr algn="ctr"/>
             <a:r>
-              <a:rPr lang="en-IN" sz="1400" b="1" dirty="0" err="1">
+              <a:rPr lang="en-IN" sz="1400" b="1" dirty="0">
                 <a:solidFill>
                   <a:schemeClr val="bg1"/>
                 </a:solidFill>
               </a:rPr>
               <a:t>GameEngine</a:t>
             </a:r>
-            <a:endParaRPr lang="en-IN" sz="1400" b="1" dirty="0">
-              <a:solidFill>
-                <a:schemeClr val="bg1"/>
-              </a:solidFill>
-            </a:endParaRPr>
           </a:p>
           <a:p>
             <a:pPr algn="ctr"/>
@@ -7221,6 +7217,1774 @@
 </file>
 
 <file path=ppt/slides/slide4.xml><?xml version="1.0" encoding="utf-8"?>
+<p:sld xmlns:a="http://schemas.openxmlformats.org/drawingml/2006/main" xmlns:r="http://schemas.openxmlformats.org/officeDocument/2006/relationships" xmlns:p="http://schemas.openxmlformats.org/presentationml/2006/main">
+  <p:cSld>
+    <p:spTree>
+      <p:nvGrpSpPr>
+        <p:cNvPr id="1" name=""/>
+        <p:cNvGrpSpPr/>
+        <p:nvPr/>
+      </p:nvGrpSpPr>
+      <p:grpSpPr>
+        <a:xfrm>
+          <a:off x="0" y="0"/>
+          <a:ext cx="0" cy="0"/>
+          <a:chOff x="0" y="0"/>
+          <a:chExt cx="0" cy="0"/>
+        </a:xfrm>
+      </p:grpSpPr>
+      <p:sp>
+        <p:nvSpPr>
+          <p:cNvPr id="2" name="Title 1"/>
+          <p:cNvSpPr>
+            <a:spLocks noGrp="1"/>
+          </p:cNvSpPr>
+          <p:nvPr>
+            <p:ph type="title"/>
+          </p:nvPr>
+        </p:nvSpPr>
+        <p:spPr/>
+        <p:txBody>
+          <a:bodyPr/>
+          <a:lstStyle/>
+          <a:p>
+            <a:pPr algn="ctr"/>
+            <a:r>
+              <a:rPr lang="en-IN" dirty="0"/>
+              <a:t>ARCHITECTURAL DESIGN(Cont.)</a:t>
+            </a:r>
+          </a:p>
+        </p:txBody>
+      </p:sp>
+      <p:sp>
+        <p:nvSpPr>
+          <p:cNvPr id="8" name="TextBox 7"/>
+          <p:cNvSpPr txBox="1"/>
+          <p:nvPr/>
+        </p:nvSpPr>
+        <p:spPr>
+          <a:xfrm>
+            <a:off x="7521262" y="2807594"/>
+            <a:ext cx="1519707" cy="369332"/>
+          </a:xfrm>
+          <a:prstGeom prst="rect">
+            <a:avLst/>
+          </a:prstGeom>
+          <a:noFill/>
+        </p:spPr>
+        <p:txBody>
+          <a:bodyPr wrap="square" rtlCol="0">
+            <a:spAutoFit/>
+          </a:bodyPr>
+          <a:lstStyle/>
+          <a:p>
+            <a:pPr algn="ctr"/>
+            <a:r>
+              <a:rPr lang="en-IN" b="1" dirty="0">
+                <a:solidFill>
+                  <a:schemeClr val="bg1"/>
+                </a:solidFill>
+              </a:rPr>
+              <a:t>CONTROLLR</a:t>
+            </a:r>
+          </a:p>
+        </p:txBody>
+      </p:sp>
+      <p:sp>
+        <p:nvSpPr>
+          <p:cNvPr id="9" name="TextBox 8"/>
+          <p:cNvSpPr txBox="1"/>
+          <p:nvPr/>
+        </p:nvSpPr>
+        <p:spPr>
+          <a:xfrm>
+            <a:off x="1952576" y="4866772"/>
+            <a:ext cx="1648496" cy="369332"/>
+          </a:xfrm>
+          <a:prstGeom prst="rect">
+            <a:avLst/>
+          </a:prstGeom>
+          <a:noFill/>
+        </p:spPr>
+        <p:txBody>
+          <a:bodyPr wrap="square" rtlCol="0">
+            <a:spAutoFit/>
+          </a:bodyPr>
+          <a:lstStyle/>
+          <a:p>
+            <a:pPr algn="ctr"/>
+            <a:r>
+              <a:rPr lang="en-IN" b="1" dirty="0">
+                <a:solidFill>
+                  <a:schemeClr val="bg1"/>
+                </a:solidFill>
+              </a:rPr>
+              <a:t>VIEW</a:t>
+            </a:r>
+          </a:p>
+        </p:txBody>
+      </p:sp>
+      <p:sp>
+        <p:nvSpPr>
+          <p:cNvPr id="12" name="Rectangle 11"/>
+          <p:cNvSpPr/>
+          <p:nvPr/>
+        </p:nvSpPr>
+        <p:spPr>
+          <a:xfrm>
+            <a:off x="4298585" y="1828801"/>
+            <a:ext cx="1522870" cy="867270"/>
+          </a:xfrm>
+          <a:prstGeom prst="rect">
+            <a:avLst/>
+          </a:prstGeom>
+        </p:spPr>
+        <p:style>
+          <a:lnRef idx="2">
+            <a:schemeClr val="accent1">
+              <a:shade val="50000"/>
+            </a:schemeClr>
+          </a:lnRef>
+          <a:fillRef idx="1">
+            <a:schemeClr val="accent1"/>
+          </a:fillRef>
+          <a:effectRef idx="0">
+            <a:schemeClr val="accent1"/>
+          </a:effectRef>
+          <a:fontRef idx="minor">
+            <a:schemeClr val="lt1"/>
+          </a:fontRef>
+        </p:style>
+        <p:txBody>
+          <a:bodyPr rtlCol="0" anchor="ctr"/>
+          <a:lstStyle/>
+          <a:p>
+            <a:pPr algn="ctr"/>
+            <a:endParaRPr lang="en-IN"/>
+          </a:p>
+        </p:txBody>
+      </p:sp>
+      <p:sp>
+        <p:nvSpPr>
+          <p:cNvPr id="15" name="Rectangle 14"/>
+          <p:cNvSpPr/>
+          <p:nvPr/>
+        </p:nvSpPr>
+        <p:spPr>
+          <a:xfrm>
+            <a:off x="3127386" y="3728908"/>
+            <a:ext cx="1311900" cy="867270"/>
+          </a:xfrm>
+          <a:prstGeom prst="rect">
+            <a:avLst/>
+          </a:prstGeom>
+        </p:spPr>
+        <p:style>
+          <a:lnRef idx="2">
+            <a:schemeClr val="accent1">
+              <a:shade val="50000"/>
+            </a:schemeClr>
+          </a:lnRef>
+          <a:fillRef idx="1">
+            <a:schemeClr val="accent1"/>
+          </a:fillRef>
+          <a:effectRef idx="0">
+            <a:schemeClr val="accent1"/>
+          </a:effectRef>
+          <a:fontRef idx="minor">
+            <a:schemeClr val="lt1"/>
+          </a:fontRef>
+        </p:style>
+        <p:txBody>
+          <a:bodyPr rtlCol="0" anchor="ctr"/>
+          <a:lstStyle/>
+          <a:p>
+            <a:pPr algn="ctr"/>
+            <a:endParaRPr lang="en-IN"/>
+          </a:p>
+        </p:txBody>
+      </p:sp>
+      <p:sp>
+        <p:nvSpPr>
+          <p:cNvPr id="31" name="TextBox 30"/>
+          <p:cNvSpPr txBox="1"/>
+          <p:nvPr/>
+        </p:nvSpPr>
+        <p:spPr>
+          <a:xfrm>
+            <a:off x="8704490" y="3117813"/>
+            <a:ext cx="1610916" cy="369332"/>
+          </a:xfrm>
+          <a:prstGeom prst="rect">
+            <a:avLst/>
+          </a:prstGeom>
+          <a:noFill/>
+        </p:spPr>
+        <p:txBody>
+          <a:bodyPr wrap="square" rtlCol="0">
+            <a:spAutoFit/>
+          </a:bodyPr>
+          <a:lstStyle/>
+          <a:p>
+            <a:pPr algn="ctr"/>
+            <a:r>
+              <a:rPr lang="en-IN" b="1" dirty="0">
+                <a:solidFill>
+                  <a:schemeClr val="bg1"/>
+                </a:solidFill>
+              </a:rPr>
+              <a:t>CONTROLLER</a:t>
+            </a:r>
+          </a:p>
+        </p:txBody>
+      </p:sp>
+      <p:sp>
+        <p:nvSpPr>
+          <p:cNvPr id="42" name="TextBox 41"/>
+          <p:cNvSpPr txBox="1"/>
+          <p:nvPr/>
+        </p:nvSpPr>
+        <p:spPr>
+          <a:xfrm>
+            <a:off x="3732024" y="5743977"/>
+            <a:ext cx="5221369" cy="369332"/>
+          </a:xfrm>
+          <a:prstGeom prst="rect">
+            <a:avLst/>
+          </a:prstGeom>
+          <a:noFill/>
+        </p:spPr>
+        <p:txBody>
+          <a:bodyPr wrap="square" rtlCol="0">
+            <a:spAutoFit/>
+          </a:bodyPr>
+          <a:lstStyle/>
+          <a:p>
+            <a:r>
+              <a:rPr lang="en-IN" dirty="0"/>
+              <a:t>MODEL – VIEW – CONTROLLER ARCHITECTURE</a:t>
+            </a:r>
+          </a:p>
+        </p:txBody>
+      </p:sp>
+      <p:pic>
+        <p:nvPicPr>
+          <p:cNvPr id="24" name="Picture 2" descr="Web Services &amp; Applications (BCompSc) - SUSPENDED ADMISSIONS"/>
+          <p:cNvPicPr>
+            <a:picLocks noChangeAspect="1" noChangeArrowheads="1"/>
+          </p:cNvPicPr>
+          <p:nvPr/>
+        </p:nvPicPr>
+        <p:blipFill>
+          <a:blip r:embed="rId2" cstate="print">
+            <a:extLst>
+              <a:ext uri="{28A0092B-C50C-407E-A947-70E740481C1C}">
+                <a14:useLocalDpi xmlns:a14="http://schemas.microsoft.com/office/drawing/2010/main" val="0"/>
+              </a:ext>
+            </a:extLst>
+          </a:blip>
+          <a:srcRect/>
+          <a:stretch>
+            <a:fillRect/>
+          </a:stretch>
+        </p:blipFill>
+        <p:spPr bwMode="auto">
+          <a:xfrm>
+            <a:off x="9829487" y="5581445"/>
+            <a:ext cx="2362513" cy="727456"/>
+          </a:xfrm>
+          <a:prstGeom prst="rect">
+            <a:avLst/>
+          </a:prstGeom>
+          <a:noFill/>
+          <a:extLst>
+            <a:ext uri="{909E8E84-426E-40DD-AFC4-6F175D3DCCD1}">
+              <a14:hiddenFill xmlns:a14="http://schemas.microsoft.com/office/drawing/2010/main">
+                <a:solidFill>
+                  <a:srgbClr val="FFFFFF"/>
+                </a:solidFill>
+              </a14:hiddenFill>
+            </a:ext>
+          </a:extLst>
+        </p:spPr>
+      </p:pic>
+      <p:sp>
+        <p:nvSpPr>
+          <p:cNvPr id="70" name="TextBox 69">
+            <a:extLst>
+              <a:ext uri="{FF2B5EF4-FFF2-40B4-BE49-F238E27FC236}">
+                <a16:creationId xmlns:a16="http://schemas.microsoft.com/office/drawing/2014/main" id="{4A97F8ED-AE3E-444D-B3FD-EF24CB125651}"/>
+              </a:ext>
+            </a:extLst>
+          </p:cNvPr>
+          <p:cNvSpPr txBox="1"/>
+          <p:nvPr/>
+        </p:nvSpPr>
+        <p:spPr>
+          <a:xfrm>
+            <a:off x="4298586" y="1881825"/>
+            <a:ext cx="1478446" cy="523220"/>
+          </a:xfrm>
+          <a:prstGeom prst="rect">
+            <a:avLst/>
+          </a:prstGeom>
+          <a:noFill/>
+        </p:spPr>
+        <p:txBody>
+          <a:bodyPr wrap="square" rtlCol="0">
+            <a:spAutoFit/>
+          </a:bodyPr>
+          <a:lstStyle/>
+          <a:p>
+            <a:pPr algn="ctr"/>
+            <a:r>
+              <a:rPr lang="en-IN" sz="1400" b="1" u="sng" dirty="0">
+                <a:solidFill>
+                  <a:schemeClr val="bg1"/>
+                </a:solidFill>
+              </a:rPr>
+              <a:t>Player</a:t>
+            </a:r>
+          </a:p>
+          <a:p>
+            <a:pPr algn="ctr"/>
+            <a:r>
+              <a:rPr lang="en-IN" sz="1400" b="1" dirty="0" err="1">
+                <a:solidFill>
+                  <a:schemeClr val="bg1"/>
+                </a:solidFill>
+              </a:rPr>
+              <a:t>setStrategy</a:t>
+            </a:r>
+            <a:r>
+              <a:rPr lang="en-IN" sz="1400" b="1" dirty="0">
+                <a:solidFill>
+                  <a:schemeClr val="bg1"/>
+                </a:solidFill>
+              </a:rPr>
+              <a:t>()</a:t>
+            </a:r>
+          </a:p>
+        </p:txBody>
+      </p:sp>
+      <p:sp>
+        <p:nvSpPr>
+          <p:cNvPr id="74" name="Rectangle 73">
+            <a:extLst>
+              <a:ext uri="{FF2B5EF4-FFF2-40B4-BE49-F238E27FC236}">
+                <a16:creationId xmlns:a16="http://schemas.microsoft.com/office/drawing/2014/main" id="{C02AE149-738A-4BF4-9A46-DFA2979393B1}"/>
+              </a:ext>
+            </a:extLst>
+          </p:cNvPr>
+          <p:cNvSpPr/>
+          <p:nvPr/>
+        </p:nvSpPr>
+        <p:spPr>
+          <a:xfrm>
+            <a:off x="8245442" y="1792469"/>
+            <a:ext cx="1610916" cy="826089"/>
+          </a:xfrm>
+          <a:prstGeom prst="rect">
+            <a:avLst/>
+          </a:prstGeom>
+        </p:spPr>
+        <p:style>
+          <a:lnRef idx="2">
+            <a:schemeClr val="accent1">
+              <a:shade val="50000"/>
+            </a:schemeClr>
+          </a:lnRef>
+          <a:fillRef idx="1">
+            <a:schemeClr val="accent1"/>
+          </a:fillRef>
+          <a:effectRef idx="0">
+            <a:schemeClr val="accent1"/>
+          </a:effectRef>
+          <a:fontRef idx="minor">
+            <a:schemeClr val="lt1"/>
+          </a:fontRef>
+        </p:style>
+        <p:txBody>
+          <a:bodyPr rtlCol="0" anchor="ctr"/>
+          <a:lstStyle/>
+          <a:p>
+            <a:pPr algn="ctr"/>
+            <a:endParaRPr lang="en-US"/>
+          </a:p>
+        </p:txBody>
+      </p:sp>
+      <p:sp>
+        <p:nvSpPr>
+          <p:cNvPr id="80" name="TextBox 79">
+            <a:extLst>
+              <a:ext uri="{FF2B5EF4-FFF2-40B4-BE49-F238E27FC236}">
+                <a16:creationId xmlns:a16="http://schemas.microsoft.com/office/drawing/2014/main" id="{50BFA0C1-5175-4E36-AC8A-BED98753ACF9}"/>
+              </a:ext>
+            </a:extLst>
+          </p:cNvPr>
+          <p:cNvSpPr txBox="1"/>
+          <p:nvPr/>
+        </p:nvSpPr>
+        <p:spPr>
+          <a:xfrm>
+            <a:off x="8384196" y="1732556"/>
+            <a:ext cx="1312997" cy="923330"/>
+          </a:xfrm>
+          <a:prstGeom prst="rect">
+            <a:avLst/>
+          </a:prstGeom>
+          <a:noFill/>
+        </p:spPr>
+        <p:txBody>
+          <a:bodyPr wrap="square" rtlCol="0">
+            <a:spAutoFit/>
+          </a:bodyPr>
+          <a:lstStyle/>
+          <a:p>
+            <a:pPr algn="ctr"/>
+            <a:r>
+              <a:rPr lang="en-IN" b="1" dirty="0">
+                <a:solidFill>
+                  <a:schemeClr val="bg1"/>
+                </a:solidFill>
+              </a:rPr>
+              <a:t>Strategy</a:t>
+            </a:r>
+          </a:p>
+          <a:p>
+            <a:pPr algn="ctr"/>
+            <a:r>
+              <a:rPr lang="en-IN" sz="1200" b="1" dirty="0">
+                <a:solidFill>
+                  <a:schemeClr val="bg1"/>
+                </a:solidFill>
+              </a:rPr>
+              <a:t>toDefend()</a:t>
+            </a:r>
+          </a:p>
+          <a:p>
+            <a:pPr algn="ctr"/>
+            <a:r>
+              <a:rPr lang="en-IN" sz="1200" b="1" dirty="0">
+                <a:solidFill>
+                  <a:schemeClr val="bg1"/>
+                </a:solidFill>
+              </a:rPr>
+              <a:t>toAttack()</a:t>
+            </a:r>
+          </a:p>
+          <a:p>
+            <a:pPr algn="ctr"/>
+            <a:r>
+              <a:rPr lang="en-IN" sz="1200" b="1" dirty="0">
+                <a:solidFill>
+                  <a:schemeClr val="bg1"/>
+                </a:solidFill>
+              </a:rPr>
+              <a:t>createOrder()</a:t>
+            </a:r>
+          </a:p>
+        </p:txBody>
+      </p:sp>
+      <p:sp>
+        <p:nvSpPr>
+          <p:cNvPr id="87" name="Rectangle 86">
+            <a:extLst>
+              <a:ext uri="{FF2B5EF4-FFF2-40B4-BE49-F238E27FC236}">
+                <a16:creationId xmlns:a16="http://schemas.microsoft.com/office/drawing/2014/main" id="{D987B2E7-8B3E-4A0C-B942-D65D26E341F4}"/>
+              </a:ext>
+            </a:extLst>
+          </p:cNvPr>
+          <p:cNvSpPr/>
+          <p:nvPr/>
+        </p:nvSpPr>
+        <p:spPr>
+          <a:xfrm>
+            <a:off x="7767256" y="3052620"/>
+            <a:ext cx="759269" cy="421816"/>
+          </a:xfrm>
+          <a:prstGeom prst="rect">
+            <a:avLst/>
+          </a:prstGeom>
+        </p:spPr>
+        <p:style>
+          <a:lnRef idx="2">
+            <a:schemeClr val="accent1">
+              <a:shade val="50000"/>
+            </a:schemeClr>
+          </a:lnRef>
+          <a:fillRef idx="1">
+            <a:schemeClr val="accent1"/>
+          </a:fillRef>
+          <a:effectRef idx="0">
+            <a:schemeClr val="accent1"/>
+          </a:effectRef>
+          <a:fontRef idx="minor">
+            <a:schemeClr val="lt1"/>
+          </a:fontRef>
+        </p:style>
+        <p:txBody>
+          <a:bodyPr rtlCol="0" anchor="ctr"/>
+          <a:lstStyle/>
+          <a:p>
+            <a:pPr algn="ctr"/>
+            <a:endParaRPr lang="en-IN"/>
+          </a:p>
+        </p:txBody>
+      </p:sp>
+      <p:sp>
+        <p:nvSpPr>
+          <p:cNvPr id="88" name="Rectangle 87">
+            <a:extLst>
+              <a:ext uri="{FF2B5EF4-FFF2-40B4-BE49-F238E27FC236}">
+                <a16:creationId xmlns:a16="http://schemas.microsoft.com/office/drawing/2014/main" id="{DD4EE508-B559-410C-A71F-AF36AEFBEC4F}"/>
+              </a:ext>
+            </a:extLst>
+          </p:cNvPr>
+          <p:cNvSpPr/>
+          <p:nvPr/>
+        </p:nvSpPr>
+        <p:spPr>
+          <a:xfrm>
+            <a:off x="8667788" y="3047928"/>
+            <a:ext cx="759269" cy="421816"/>
+          </a:xfrm>
+          <a:prstGeom prst="rect">
+            <a:avLst/>
+          </a:prstGeom>
+        </p:spPr>
+        <p:style>
+          <a:lnRef idx="2">
+            <a:schemeClr val="accent1">
+              <a:shade val="50000"/>
+            </a:schemeClr>
+          </a:lnRef>
+          <a:fillRef idx="1">
+            <a:schemeClr val="accent1"/>
+          </a:fillRef>
+          <a:effectRef idx="0">
+            <a:schemeClr val="accent1"/>
+          </a:effectRef>
+          <a:fontRef idx="minor">
+            <a:schemeClr val="lt1"/>
+          </a:fontRef>
+        </p:style>
+        <p:txBody>
+          <a:bodyPr rtlCol="0" anchor="ctr"/>
+          <a:lstStyle/>
+          <a:p>
+            <a:pPr algn="ctr"/>
+            <a:endParaRPr lang="en-IN"/>
+          </a:p>
+        </p:txBody>
+      </p:sp>
+      <p:sp>
+        <p:nvSpPr>
+          <p:cNvPr id="90" name="Rectangle 89">
+            <a:extLst>
+              <a:ext uri="{FF2B5EF4-FFF2-40B4-BE49-F238E27FC236}">
+                <a16:creationId xmlns:a16="http://schemas.microsoft.com/office/drawing/2014/main" id="{19F2B8FD-60C0-4FBA-9EE1-5E8903307ED9}"/>
+              </a:ext>
+            </a:extLst>
+          </p:cNvPr>
+          <p:cNvSpPr/>
+          <p:nvPr/>
+        </p:nvSpPr>
+        <p:spPr>
+          <a:xfrm>
+            <a:off x="9555768" y="3038750"/>
+            <a:ext cx="759269" cy="421816"/>
+          </a:xfrm>
+          <a:prstGeom prst="rect">
+            <a:avLst/>
+          </a:prstGeom>
+        </p:spPr>
+        <p:style>
+          <a:lnRef idx="2">
+            <a:schemeClr val="accent1">
+              <a:shade val="50000"/>
+            </a:schemeClr>
+          </a:lnRef>
+          <a:fillRef idx="1">
+            <a:schemeClr val="accent1"/>
+          </a:fillRef>
+          <a:effectRef idx="0">
+            <a:schemeClr val="accent1"/>
+          </a:effectRef>
+          <a:fontRef idx="minor">
+            <a:schemeClr val="lt1"/>
+          </a:fontRef>
+        </p:style>
+        <p:txBody>
+          <a:bodyPr rtlCol="0" anchor="ctr"/>
+          <a:lstStyle/>
+          <a:p>
+            <a:pPr algn="ctr"/>
+            <a:endParaRPr lang="en-IN"/>
+          </a:p>
+        </p:txBody>
+      </p:sp>
+      <p:sp>
+        <p:nvSpPr>
+          <p:cNvPr id="91" name="Flowchart: Decision 90">
+            <a:extLst>
+              <a:ext uri="{FF2B5EF4-FFF2-40B4-BE49-F238E27FC236}">
+                <a16:creationId xmlns:a16="http://schemas.microsoft.com/office/drawing/2014/main" id="{D843C0B5-757D-415F-BADD-478AF81ED175}"/>
+              </a:ext>
+            </a:extLst>
+          </p:cNvPr>
+          <p:cNvSpPr/>
+          <p:nvPr/>
+        </p:nvSpPr>
+        <p:spPr>
+          <a:xfrm>
+            <a:off x="5821455" y="1985252"/>
+            <a:ext cx="348526" cy="273413"/>
+          </a:xfrm>
+          <a:prstGeom prst="flowChartDecision">
+            <a:avLst/>
+          </a:prstGeom>
+        </p:spPr>
+        <p:style>
+          <a:lnRef idx="2">
+            <a:schemeClr val="accent1">
+              <a:shade val="50000"/>
+            </a:schemeClr>
+          </a:lnRef>
+          <a:fillRef idx="1">
+            <a:schemeClr val="accent1"/>
+          </a:fillRef>
+          <a:effectRef idx="0">
+            <a:schemeClr val="accent1"/>
+          </a:effectRef>
+          <a:fontRef idx="minor">
+            <a:schemeClr val="lt1"/>
+          </a:fontRef>
+        </p:style>
+        <p:txBody>
+          <a:bodyPr rtlCol="0" anchor="ctr"/>
+          <a:lstStyle/>
+          <a:p>
+            <a:pPr algn="ctr"/>
+            <a:endParaRPr lang="en-US"/>
+          </a:p>
+        </p:txBody>
+      </p:sp>
+      <p:sp>
+        <p:nvSpPr>
+          <p:cNvPr id="94" name="TextBox 93">
+            <a:extLst>
+              <a:ext uri="{FF2B5EF4-FFF2-40B4-BE49-F238E27FC236}">
+                <a16:creationId xmlns:a16="http://schemas.microsoft.com/office/drawing/2014/main" id="{DCA91F34-BD61-4C19-BAFB-A75725B3BF79}"/>
+              </a:ext>
+            </a:extLst>
+          </p:cNvPr>
+          <p:cNvSpPr txBox="1"/>
+          <p:nvPr/>
+        </p:nvSpPr>
+        <p:spPr>
+          <a:xfrm>
+            <a:off x="7661131" y="3144595"/>
+            <a:ext cx="918009" cy="276999"/>
+          </a:xfrm>
+          <a:prstGeom prst="rect">
+            <a:avLst/>
+          </a:prstGeom>
+          <a:noFill/>
+        </p:spPr>
+        <p:txBody>
+          <a:bodyPr wrap="square" rtlCol="0">
+            <a:spAutoFit/>
+          </a:bodyPr>
+          <a:lstStyle/>
+          <a:p>
+            <a:pPr algn="ctr"/>
+            <a:r>
+              <a:rPr lang="en-IN" sz="1200" b="1" dirty="0" err="1">
+                <a:solidFill>
+                  <a:schemeClr val="bg1"/>
+                </a:solidFill>
+              </a:rPr>
+              <a:t>Aggresive</a:t>
+            </a:r>
+            <a:endParaRPr lang="en-IN" sz="1200" b="1" dirty="0">
+              <a:solidFill>
+                <a:schemeClr val="bg1"/>
+              </a:solidFill>
+            </a:endParaRPr>
+          </a:p>
+        </p:txBody>
+      </p:sp>
+      <p:sp>
+        <p:nvSpPr>
+          <p:cNvPr id="95" name="TextBox 94">
+            <a:extLst>
+              <a:ext uri="{FF2B5EF4-FFF2-40B4-BE49-F238E27FC236}">
+                <a16:creationId xmlns:a16="http://schemas.microsoft.com/office/drawing/2014/main" id="{6081199C-117E-4927-8418-CC92E56A46C1}"/>
+              </a:ext>
+            </a:extLst>
+          </p:cNvPr>
+          <p:cNvSpPr txBox="1"/>
+          <p:nvPr/>
+        </p:nvSpPr>
+        <p:spPr>
+          <a:xfrm>
+            <a:off x="8574694" y="3110638"/>
+            <a:ext cx="918009" cy="276999"/>
+          </a:xfrm>
+          <a:prstGeom prst="rect">
+            <a:avLst/>
+          </a:prstGeom>
+          <a:noFill/>
+        </p:spPr>
+        <p:txBody>
+          <a:bodyPr wrap="square" rtlCol="0">
+            <a:spAutoFit/>
+          </a:bodyPr>
+          <a:lstStyle/>
+          <a:p>
+            <a:pPr algn="ctr"/>
+            <a:r>
+              <a:rPr lang="en-IN" sz="1200" b="1" dirty="0">
+                <a:solidFill>
+                  <a:schemeClr val="bg1"/>
+                </a:solidFill>
+              </a:rPr>
+              <a:t>Benevolent</a:t>
+            </a:r>
+          </a:p>
+        </p:txBody>
+      </p:sp>
+      <p:sp>
+        <p:nvSpPr>
+          <p:cNvPr id="97" name="TextBox 96">
+            <a:extLst>
+              <a:ext uri="{FF2B5EF4-FFF2-40B4-BE49-F238E27FC236}">
+                <a16:creationId xmlns:a16="http://schemas.microsoft.com/office/drawing/2014/main" id="{EDA1FFFA-D300-40A8-96CE-E23ABFEB31B4}"/>
+              </a:ext>
+            </a:extLst>
+          </p:cNvPr>
+          <p:cNvSpPr txBox="1"/>
+          <p:nvPr/>
+        </p:nvSpPr>
+        <p:spPr>
+          <a:xfrm>
+            <a:off x="9447222" y="3094909"/>
+            <a:ext cx="918009" cy="276999"/>
+          </a:xfrm>
+          <a:prstGeom prst="rect">
+            <a:avLst/>
+          </a:prstGeom>
+          <a:noFill/>
+        </p:spPr>
+        <p:txBody>
+          <a:bodyPr wrap="square" rtlCol="0">
+            <a:spAutoFit/>
+          </a:bodyPr>
+          <a:lstStyle/>
+          <a:p>
+            <a:pPr algn="ctr"/>
+            <a:r>
+              <a:rPr lang="en-IN" sz="1200" b="1" dirty="0">
+                <a:solidFill>
+                  <a:schemeClr val="bg1"/>
+                </a:solidFill>
+              </a:rPr>
+              <a:t>Random</a:t>
+            </a:r>
+          </a:p>
+        </p:txBody>
+      </p:sp>
+      <p:cxnSp>
+        <p:nvCxnSpPr>
+          <p:cNvPr id="101" name="Connector: Elbow 100">
+            <a:extLst>
+              <a:ext uri="{FF2B5EF4-FFF2-40B4-BE49-F238E27FC236}">
+                <a16:creationId xmlns:a16="http://schemas.microsoft.com/office/drawing/2014/main" id="{CBAF200F-A791-4B0F-B0C7-311F5F0FB4A7}"/>
+              </a:ext>
+            </a:extLst>
+          </p:cNvPr>
+          <p:cNvCxnSpPr>
+            <a:cxnSpLocks/>
+            <a:stCxn id="91" idx="3"/>
+          </p:cNvCxnSpPr>
+          <p:nvPr/>
+        </p:nvCxnSpPr>
+        <p:spPr>
+          <a:xfrm flipV="1">
+            <a:off x="6169981" y="2023849"/>
+            <a:ext cx="3322722" cy="98110"/>
+          </a:xfrm>
+          <a:prstGeom prst="bentConnector3">
+            <a:avLst/>
+          </a:prstGeom>
+        </p:spPr>
+        <p:style>
+          <a:lnRef idx="1">
+            <a:schemeClr val="accent1"/>
+          </a:lnRef>
+          <a:fillRef idx="0">
+            <a:schemeClr val="accent1"/>
+          </a:fillRef>
+          <a:effectRef idx="0">
+            <a:schemeClr val="accent1"/>
+          </a:effectRef>
+          <a:fontRef idx="minor">
+            <a:schemeClr val="tx1"/>
+          </a:fontRef>
+        </p:style>
+      </p:cxnSp>
+      <p:sp>
+        <p:nvSpPr>
+          <p:cNvPr id="106" name="Rectangle 105">
+            <a:extLst>
+              <a:ext uri="{FF2B5EF4-FFF2-40B4-BE49-F238E27FC236}">
+                <a16:creationId xmlns:a16="http://schemas.microsoft.com/office/drawing/2014/main" id="{81946E50-5607-4B11-89B5-521BB3C431E7}"/>
+              </a:ext>
+            </a:extLst>
+          </p:cNvPr>
+          <p:cNvSpPr/>
+          <p:nvPr/>
+        </p:nvSpPr>
+        <p:spPr>
+          <a:xfrm>
+            <a:off x="6908439" y="3057046"/>
+            <a:ext cx="759269" cy="421816"/>
+          </a:xfrm>
+          <a:prstGeom prst="rect">
+            <a:avLst/>
+          </a:prstGeom>
+        </p:spPr>
+        <p:style>
+          <a:lnRef idx="2">
+            <a:schemeClr val="accent1">
+              <a:shade val="50000"/>
+            </a:schemeClr>
+          </a:lnRef>
+          <a:fillRef idx="1">
+            <a:schemeClr val="accent1"/>
+          </a:fillRef>
+          <a:effectRef idx="0">
+            <a:schemeClr val="accent1"/>
+          </a:effectRef>
+          <a:fontRef idx="minor">
+            <a:schemeClr val="lt1"/>
+          </a:fontRef>
+        </p:style>
+        <p:txBody>
+          <a:bodyPr rtlCol="0" anchor="ctr"/>
+          <a:lstStyle/>
+          <a:p>
+            <a:pPr algn="ctr"/>
+            <a:endParaRPr lang="en-IN"/>
+          </a:p>
+        </p:txBody>
+      </p:sp>
+      <p:sp>
+        <p:nvSpPr>
+          <p:cNvPr id="107" name="Rectangle 106">
+            <a:extLst>
+              <a:ext uri="{FF2B5EF4-FFF2-40B4-BE49-F238E27FC236}">
+                <a16:creationId xmlns:a16="http://schemas.microsoft.com/office/drawing/2014/main" id="{130E79D5-9C9D-4BA9-9100-FC6C9F1DF5A6}"/>
+              </a:ext>
+            </a:extLst>
+          </p:cNvPr>
+          <p:cNvSpPr/>
+          <p:nvPr/>
+        </p:nvSpPr>
+        <p:spPr>
+          <a:xfrm>
+            <a:off x="10458325" y="3038750"/>
+            <a:ext cx="759269" cy="421816"/>
+          </a:xfrm>
+          <a:prstGeom prst="rect">
+            <a:avLst/>
+          </a:prstGeom>
+        </p:spPr>
+        <p:style>
+          <a:lnRef idx="2">
+            <a:schemeClr val="accent1">
+              <a:shade val="50000"/>
+            </a:schemeClr>
+          </a:lnRef>
+          <a:fillRef idx="1">
+            <a:schemeClr val="accent1"/>
+          </a:fillRef>
+          <a:effectRef idx="0">
+            <a:schemeClr val="accent1"/>
+          </a:effectRef>
+          <a:fontRef idx="minor">
+            <a:schemeClr val="lt1"/>
+          </a:fontRef>
+        </p:style>
+        <p:txBody>
+          <a:bodyPr rtlCol="0" anchor="ctr"/>
+          <a:lstStyle/>
+          <a:p>
+            <a:pPr algn="ctr"/>
+            <a:endParaRPr lang="en-IN"/>
+          </a:p>
+        </p:txBody>
+      </p:sp>
+      <p:sp>
+        <p:nvSpPr>
+          <p:cNvPr id="108" name="TextBox 107">
+            <a:extLst>
+              <a:ext uri="{FF2B5EF4-FFF2-40B4-BE49-F238E27FC236}">
+                <a16:creationId xmlns:a16="http://schemas.microsoft.com/office/drawing/2014/main" id="{72F825C1-9F1C-4AB2-8A5A-5906D64704E4}"/>
+              </a:ext>
+            </a:extLst>
+          </p:cNvPr>
+          <p:cNvSpPr txBox="1"/>
+          <p:nvPr/>
+        </p:nvSpPr>
+        <p:spPr>
+          <a:xfrm>
+            <a:off x="6835523" y="3128451"/>
+            <a:ext cx="918009" cy="276999"/>
+          </a:xfrm>
+          <a:prstGeom prst="rect">
+            <a:avLst/>
+          </a:prstGeom>
+          <a:noFill/>
+        </p:spPr>
+        <p:txBody>
+          <a:bodyPr wrap="square" rtlCol="0">
+            <a:spAutoFit/>
+          </a:bodyPr>
+          <a:lstStyle/>
+          <a:p>
+            <a:pPr algn="ctr"/>
+            <a:r>
+              <a:rPr lang="en-IN" sz="1200" b="1" dirty="0">
+                <a:solidFill>
+                  <a:schemeClr val="bg1"/>
+                </a:solidFill>
+              </a:rPr>
+              <a:t>Human</a:t>
+            </a:r>
+          </a:p>
+        </p:txBody>
+      </p:sp>
+      <p:sp>
+        <p:nvSpPr>
+          <p:cNvPr id="109" name="TextBox 108">
+            <a:extLst>
+              <a:ext uri="{FF2B5EF4-FFF2-40B4-BE49-F238E27FC236}">
+                <a16:creationId xmlns:a16="http://schemas.microsoft.com/office/drawing/2014/main" id="{EAA01326-13FC-4AE4-8025-2C2D3D87C06B}"/>
+              </a:ext>
+            </a:extLst>
+          </p:cNvPr>
+          <p:cNvSpPr txBox="1"/>
+          <p:nvPr/>
+        </p:nvSpPr>
+        <p:spPr>
+          <a:xfrm>
+            <a:off x="10378954" y="3075869"/>
+            <a:ext cx="918009" cy="276999"/>
+          </a:xfrm>
+          <a:prstGeom prst="rect">
+            <a:avLst/>
+          </a:prstGeom>
+          <a:noFill/>
+        </p:spPr>
+        <p:txBody>
+          <a:bodyPr wrap="square" rtlCol="0">
+            <a:spAutoFit/>
+          </a:bodyPr>
+          <a:lstStyle/>
+          <a:p>
+            <a:pPr algn="ctr"/>
+            <a:r>
+              <a:rPr lang="en-IN" sz="1200" b="1" dirty="0">
+                <a:solidFill>
+                  <a:schemeClr val="bg1"/>
+                </a:solidFill>
+              </a:rPr>
+              <a:t>Cheater</a:t>
+            </a:r>
+          </a:p>
+        </p:txBody>
+      </p:sp>
+      <p:cxnSp>
+        <p:nvCxnSpPr>
+          <p:cNvPr id="119" name="Connector: Elbow 118">
+            <a:extLst>
+              <a:ext uri="{FF2B5EF4-FFF2-40B4-BE49-F238E27FC236}">
+                <a16:creationId xmlns:a16="http://schemas.microsoft.com/office/drawing/2014/main" id="{56DE157D-EE6A-41C5-8151-1FC45DFDDFEB}"/>
+              </a:ext>
+            </a:extLst>
+          </p:cNvPr>
+          <p:cNvCxnSpPr>
+            <a:cxnSpLocks/>
+            <a:stCxn id="106" idx="0"/>
+            <a:endCxn id="74" idx="2"/>
+          </p:cNvCxnSpPr>
+          <p:nvPr/>
+        </p:nvCxnSpPr>
+        <p:spPr>
+          <a:xfrm rot="5400000" flipH="1" flipV="1">
+            <a:off x="7950243" y="1956389"/>
+            <a:ext cx="438488" cy="1762826"/>
+          </a:xfrm>
+          <a:prstGeom prst="bentConnector3">
+            <a:avLst/>
+          </a:prstGeom>
+          <a:ln>
+            <a:tailEnd type="triangle"/>
+          </a:ln>
+        </p:spPr>
+        <p:style>
+          <a:lnRef idx="1">
+            <a:schemeClr val="accent1"/>
+          </a:lnRef>
+          <a:fillRef idx="0">
+            <a:schemeClr val="accent1"/>
+          </a:fillRef>
+          <a:effectRef idx="0">
+            <a:schemeClr val="accent1"/>
+          </a:effectRef>
+          <a:fontRef idx="minor">
+            <a:schemeClr val="tx1"/>
+          </a:fontRef>
+        </p:style>
+      </p:cxnSp>
+      <p:cxnSp>
+        <p:nvCxnSpPr>
+          <p:cNvPr id="121" name="Connector: Elbow 120">
+            <a:extLst>
+              <a:ext uri="{FF2B5EF4-FFF2-40B4-BE49-F238E27FC236}">
+                <a16:creationId xmlns:a16="http://schemas.microsoft.com/office/drawing/2014/main" id="{CC9B43A8-3B74-4FD3-85C4-2DB00FEBC3F5}"/>
+              </a:ext>
+            </a:extLst>
+          </p:cNvPr>
+          <p:cNvCxnSpPr>
+            <a:cxnSpLocks/>
+            <a:stCxn id="87" idx="0"/>
+            <a:endCxn id="74" idx="2"/>
+          </p:cNvCxnSpPr>
+          <p:nvPr/>
+        </p:nvCxnSpPr>
+        <p:spPr>
+          <a:xfrm rot="5400000" flipH="1" flipV="1">
+            <a:off x="8381864" y="2383585"/>
+            <a:ext cx="434062" cy="904009"/>
+          </a:xfrm>
+          <a:prstGeom prst="bentConnector3">
+            <a:avLst>
+              <a:gd name="adj1" fmla="val 50000"/>
+            </a:avLst>
+          </a:prstGeom>
+          <a:ln>
+            <a:tailEnd type="triangle"/>
+          </a:ln>
+        </p:spPr>
+        <p:style>
+          <a:lnRef idx="1">
+            <a:schemeClr val="accent1"/>
+          </a:lnRef>
+          <a:fillRef idx="0">
+            <a:schemeClr val="accent1"/>
+          </a:fillRef>
+          <a:effectRef idx="0">
+            <a:schemeClr val="accent1"/>
+          </a:effectRef>
+          <a:fontRef idx="minor">
+            <a:schemeClr val="tx1"/>
+          </a:fontRef>
+        </p:style>
+      </p:cxnSp>
+      <p:cxnSp>
+        <p:nvCxnSpPr>
+          <p:cNvPr id="125" name="Connector: Elbow 124">
+            <a:extLst>
+              <a:ext uri="{FF2B5EF4-FFF2-40B4-BE49-F238E27FC236}">
+                <a16:creationId xmlns:a16="http://schemas.microsoft.com/office/drawing/2014/main" id="{322A6308-C0B2-43B7-A434-96764C3CE99D}"/>
+              </a:ext>
+            </a:extLst>
+          </p:cNvPr>
+          <p:cNvCxnSpPr>
+            <a:cxnSpLocks/>
+            <a:stCxn id="88" idx="0"/>
+            <a:endCxn id="74" idx="2"/>
+          </p:cNvCxnSpPr>
+          <p:nvPr/>
+        </p:nvCxnSpPr>
+        <p:spPr>
+          <a:xfrm rot="5400000" flipH="1" flipV="1">
+            <a:off x="8834476" y="2831505"/>
+            <a:ext cx="429370" cy="3477"/>
+          </a:xfrm>
+          <a:prstGeom prst="bentConnector3">
+            <a:avLst/>
+          </a:prstGeom>
+          <a:ln>
+            <a:tailEnd type="triangle"/>
+          </a:ln>
+        </p:spPr>
+        <p:style>
+          <a:lnRef idx="1">
+            <a:schemeClr val="accent1"/>
+          </a:lnRef>
+          <a:fillRef idx="0">
+            <a:schemeClr val="accent1"/>
+          </a:fillRef>
+          <a:effectRef idx="0">
+            <a:schemeClr val="accent1"/>
+          </a:effectRef>
+          <a:fontRef idx="minor">
+            <a:schemeClr val="tx1"/>
+          </a:fontRef>
+        </p:style>
+      </p:cxnSp>
+      <p:sp>
+        <p:nvSpPr>
+          <p:cNvPr id="139" name="Rectangle 138">
+            <a:extLst>
+              <a:ext uri="{FF2B5EF4-FFF2-40B4-BE49-F238E27FC236}">
+                <a16:creationId xmlns:a16="http://schemas.microsoft.com/office/drawing/2014/main" id="{28D374E5-06ED-40D7-A632-66F8E0629D04}"/>
+              </a:ext>
+            </a:extLst>
+          </p:cNvPr>
+          <p:cNvSpPr/>
+          <p:nvPr/>
+        </p:nvSpPr>
+        <p:spPr>
+          <a:xfrm>
+            <a:off x="5273016" y="3614428"/>
+            <a:ext cx="1258133" cy="821962"/>
+          </a:xfrm>
+          <a:prstGeom prst="rect">
+            <a:avLst/>
+          </a:prstGeom>
+        </p:spPr>
+        <p:style>
+          <a:lnRef idx="2">
+            <a:schemeClr val="accent1">
+              <a:shade val="50000"/>
+            </a:schemeClr>
+          </a:lnRef>
+          <a:fillRef idx="1">
+            <a:schemeClr val="accent1"/>
+          </a:fillRef>
+          <a:effectRef idx="0">
+            <a:schemeClr val="accent1"/>
+          </a:effectRef>
+          <a:fontRef idx="minor">
+            <a:schemeClr val="lt1"/>
+          </a:fontRef>
+        </p:style>
+        <p:txBody>
+          <a:bodyPr rtlCol="0" anchor="ctr"/>
+          <a:lstStyle/>
+          <a:p>
+            <a:pPr algn="ctr"/>
+            <a:endParaRPr lang="en-US"/>
+          </a:p>
+        </p:txBody>
+      </p:sp>
+      <p:sp>
+        <p:nvSpPr>
+          <p:cNvPr id="142" name="TextBox 141">
+            <a:extLst>
+              <a:ext uri="{FF2B5EF4-FFF2-40B4-BE49-F238E27FC236}">
+                <a16:creationId xmlns:a16="http://schemas.microsoft.com/office/drawing/2014/main" id="{41E88371-96EA-4C24-B2BE-A3B120D76EF7}"/>
+              </a:ext>
+            </a:extLst>
+          </p:cNvPr>
+          <p:cNvSpPr txBox="1"/>
+          <p:nvPr/>
+        </p:nvSpPr>
+        <p:spPr>
+          <a:xfrm>
+            <a:off x="5474488" y="4708401"/>
+            <a:ext cx="1610916" cy="369332"/>
+          </a:xfrm>
+          <a:prstGeom prst="rect">
+            <a:avLst/>
+          </a:prstGeom>
+          <a:noFill/>
+        </p:spPr>
+        <p:txBody>
+          <a:bodyPr wrap="square" rtlCol="0">
+            <a:spAutoFit/>
+          </a:bodyPr>
+          <a:lstStyle/>
+          <a:p>
+            <a:pPr algn="ctr"/>
+            <a:r>
+              <a:rPr lang="en-IN" b="1" dirty="0">
+                <a:solidFill>
+                  <a:schemeClr val="bg1"/>
+                </a:solidFill>
+              </a:rPr>
+              <a:t>CONTROLLER</a:t>
+            </a:r>
+          </a:p>
+        </p:txBody>
+      </p:sp>
+      <p:sp>
+        <p:nvSpPr>
+          <p:cNvPr id="145" name="Rectangle 144">
+            <a:extLst>
+              <a:ext uri="{FF2B5EF4-FFF2-40B4-BE49-F238E27FC236}">
+                <a16:creationId xmlns:a16="http://schemas.microsoft.com/office/drawing/2014/main" id="{89A50676-A6C6-4096-8631-38DDD5D9293A}"/>
+              </a:ext>
+            </a:extLst>
+          </p:cNvPr>
+          <p:cNvSpPr/>
+          <p:nvPr/>
+        </p:nvSpPr>
+        <p:spPr>
+          <a:xfrm>
+            <a:off x="5529713" y="4638515"/>
+            <a:ext cx="1519706" cy="1032049"/>
+          </a:xfrm>
+          <a:prstGeom prst="rect">
+            <a:avLst/>
+          </a:prstGeom>
+        </p:spPr>
+        <p:style>
+          <a:lnRef idx="2">
+            <a:schemeClr val="accent1">
+              <a:shade val="50000"/>
+            </a:schemeClr>
+          </a:lnRef>
+          <a:fillRef idx="1">
+            <a:schemeClr val="accent1"/>
+          </a:fillRef>
+          <a:effectRef idx="0">
+            <a:schemeClr val="accent1"/>
+          </a:effectRef>
+          <a:fontRef idx="minor">
+            <a:schemeClr val="lt1"/>
+          </a:fontRef>
+        </p:style>
+        <p:txBody>
+          <a:bodyPr rtlCol="0" anchor="ctr"/>
+          <a:lstStyle/>
+          <a:p>
+            <a:pPr algn="ctr"/>
+            <a:endParaRPr lang="en-IN"/>
+          </a:p>
+        </p:txBody>
+      </p:sp>
+      <p:sp>
+        <p:nvSpPr>
+          <p:cNvPr id="146" name="Rectangle 145">
+            <a:extLst>
+              <a:ext uri="{FF2B5EF4-FFF2-40B4-BE49-F238E27FC236}">
+                <a16:creationId xmlns:a16="http://schemas.microsoft.com/office/drawing/2014/main" id="{7FE732F5-66F4-49C2-893F-7A2552A3EFE2}"/>
+              </a:ext>
+            </a:extLst>
+          </p:cNvPr>
+          <p:cNvSpPr/>
+          <p:nvPr/>
+        </p:nvSpPr>
+        <p:spPr>
+          <a:xfrm>
+            <a:off x="7897115" y="4638216"/>
+            <a:ext cx="1529942" cy="1040210"/>
+          </a:xfrm>
+          <a:prstGeom prst="rect">
+            <a:avLst/>
+          </a:prstGeom>
+        </p:spPr>
+        <p:style>
+          <a:lnRef idx="2">
+            <a:schemeClr val="accent1">
+              <a:shade val="50000"/>
+            </a:schemeClr>
+          </a:lnRef>
+          <a:fillRef idx="1">
+            <a:schemeClr val="accent1"/>
+          </a:fillRef>
+          <a:effectRef idx="0">
+            <a:schemeClr val="accent1"/>
+          </a:effectRef>
+          <a:fontRef idx="minor">
+            <a:schemeClr val="lt1"/>
+          </a:fontRef>
+        </p:style>
+        <p:txBody>
+          <a:bodyPr rtlCol="0" anchor="ctr"/>
+          <a:lstStyle/>
+          <a:p>
+            <a:pPr algn="ctr"/>
+            <a:endParaRPr lang="en-IN"/>
+          </a:p>
+        </p:txBody>
+      </p:sp>
+      <p:sp>
+        <p:nvSpPr>
+          <p:cNvPr id="150" name="TextBox 149">
+            <a:extLst>
+              <a:ext uri="{FF2B5EF4-FFF2-40B4-BE49-F238E27FC236}">
+                <a16:creationId xmlns:a16="http://schemas.microsoft.com/office/drawing/2014/main" id="{F276A2BC-4C1C-467D-9106-63F10BAB4549}"/>
+              </a:ext>
+            </a:extLst>
+          </p:cNvPr>
+          <p:cNvSpPr txBox="1"/>
+          <p:nvPr/>
+        </p:nvSpPr>
+        <p:spPr>
+          <a:xfrm>
+            <a:off x="7917788" y="4793980"/>
+            <a:ext cx="1488595" cy="646331"/>
+          </a:xfrm>
+          <a:prstGeom prst="rect">
+            <a:avLst/>
+          </a:prstGeom>
+          <a:noFill/>
+        </p:spPr>
+        <p:txBody>
+          <a:bodyPr wrap="square" rtlCol="0">
+            <a:spAutoFit/>
+          </a:bodyPr>
+          <a:lstStyle/>
+          <a:p>
+            <a:pPr algn="ctr"/>
+            <a:r>
+              <a:rPr lang="en-IN" sz="1200" b="1" u="sng" dirty="0">
+                <a:solidFill>
+                  <a:schemeClr val="bg1"/>
+                </a:solidFill>
+              </a:rPr>
+              <a:t>Adaptee</a:t>
+            </a:r>
+          </a:p>
+          <a:p>
+            <a:pPr algn="ctr"/>
+            <a:r>
+              <a:rPr lang="en-IN" sz="1200" b="1" dirty="0">
+                <a:solidFill>
+                  <a:schemeClr val="bg1"/>
+                </a:solidFill>
+              </a:rPr>
+              <a:t>loadConquestMap()</a:t>
+            </a:r>
+          </a:p>
+          <a:p>
+            <a:pPr algn="ctr"/>
+            <a:r>
+              <a:rPr lang="en-IN" sz="1200" b="1" dirty="0">
+                <a:solidFill>
+                  <a:schemeClr val="bg1"/>
+                </a:solidFill>
+              </a:rPr>
+              <a:t>saveConquestmap()</a:t>
+            </a:r>
+          </a:p>
+        </p:txBody>
+      </p:sp>
+      <p:sp>
+        <p:nvSpPr>
+          <p:cNvPr id="153" name="TextBox 152">
+            <a:extLst>
+              <a:ext uri="{FF2B5EF4-FFF2-40B4-BE49-F238E27FC236}">
+                <a16:creationId xmlns:a16="http://schemas.microsoft.com/office/drawing/2014/main" id="{CB553CFA-BF9B-491B-86EA-44571A7F90C9}"/>
+              </a:ext>
+            </a:extLst>
+          </p:cNvPr>
+          <p:cNvSpPr txBox="1"/>
+          <p:nvPr/>
+        </p:nvSpPr>
+        <p:spPr>
+          <a:xfrm>
+            <a:off x="3203658" y="3839377"/>
+            <a:ext cx="992885" cy="461665"/>
+          </a:xfrm>
+          <a:prstGeom prst="rect">
+            <a:avLst/>
+          </a:prstGeom>
+          <a:noFill/>
+        </p:spPr>
+        <p:txBody>
+          <a:bodyPr wrap="square" rtlCol="0">
+            <a:spAutoFit/>
+          </a:bodyPr>
+          <a:lstStyle/>
+          <a:p>
+            <a:pPr algn="ctr"/>
+            <a:endParaRPr lang="en-IN" sz="1200" b="1" u="sng" dirty="0">
+              <a:solidFill>
+                <a:schemeClr val="bg1"/>
+              </a:solidFill>
+            </a:endParaRPr>
+          </a:p>
+          <a:p>
+            <a:pPr algn="ctr"/>
+            <a:r>
+              <a:rPr lang="en-IN" sz="1200" b="1" dirty="0">
+                <a:solidFill>
+                  <a:schemeClr val="bg1"/>
+                </a:solidFill>
+              </a:rPr>
+              <a:t>GameEngine</a:t>
+            </a:r>
+          </a:p>
+        </p:txBody>
+      </p:sp>
+      <p:cxnSp>
+        <p:nvCxnSpPr>
+          <p:cNvPr id="168" name="Connector: Elbow 167">
+            <a:extLst>
+              <a:ext uri="{FF2B5EF4-FFF2-40B4-BE49-F238E27FC236}">
+                <a16:creationId xmlns:a16="http://schemas.microsoft.com/office/drawing/2014/main" id="{FB2ADCF2-EDF7-4CF3-AF75-FFC10B337224}"/>
+              </a:ext>
+            </a:extLst>
+          </p:cNvPr>
+          <p:cNvCxnSpPr>
+            <a:cxnSpLocks/>
+            <a:stCxn id="145" idx="0"/>
+            <a:endCxn id="139" idx="2"/>
+          </p:cNvCxnSpPr>
+          <p:nvPr/>
+        </p:nvCxnSpPr>
+        <p:spPr>
+          <a:xfrm rot="16200000" flipV="1">
+            <a:off x="5994763" y="4343711"/>
+            <a:ext cx="202125" cy="387483"/>
+          </a:xfrm>
+          <a:prstGeom prst="bentConnector3">
+            <a:avLst/>
+          </a:prstGeom>
+          <a:ln>
+            <a:tailEnd type="triangle"/>
+          </a:ln>
+        </p:spPr>
+        <p:style>
+          <a:lnRef idx="1">
+            <a:schemeClr val="accent1"/>
+          </a:lnRef>
+          <a:fillRef idx="0">
+            <a:schemeClr val="accent1"/>
+          </a:fillRef>
+          <a:effectRef idx="0">
+            <a:schemeClr val="accent1"/>
+          </a:effectRef>
+          <a:fontRef idx="minor">
+            <a:schemeClr val="tx1"/>
+          </a:fontRef>
+        </p:style>
+      </p:cxnSp>
+      <p:cxnSp>
+        <p:nvCxnSpPr>
+          <p:cNvPr id="43" name="Connector: Elbow 42">
+            <a:extLst>
+              <a:ext uri="{FF2B5EF4-FFF2-40B4-BE49-F238E27FC236}">
+                <a16:creationId xmlns:a16="http://schemas.microsoft.com/office/drawing/2014/main" id="{8D3FDF21-FBBF-4ED0-9E0C-B00679A6292D}"/>
+              </a:ext>
+            </a:extLst>
+          </p:cNvPr>
+          <p:cNvCxnSpPr>
+            <a:stCxn id="90" idx="0"/>
+            <a:endCxn id="80" idx="2"/>
+          </p:cNvCxnSpPr>
+          <p:nvPr/>
+        </p:nvCxnSpPr>
+        <p:spPr>
+          <a:xfrm rot="16200000" flipV="1">
+            <a:off x="9296617" y="2399964"/>
+            <a:ext cx="382864" cy="894708"/>
+          </a:xfrm>
+          <a:prstGeom prst="bentConnector3">
+            <a:avLst/>
+          </a:prstGeom>
+        </p:spPr>
+        <p:style>
+          <a:lnRef idx="1">
+            <a:schemeClr val="accent1"/>
+          </a:lnRef>
+          <a:fillRef idx="0">
+            <a:schemeClr val="accent1"/>
+          </a:fillRef>
+          <a:effectRef idx="0">
+            <a:schemeClr val="accent1"/>
+          </a:effectRef>
+          <a:fontRef idx="minor">
+            <a:schemeClr val="tx1"/>
+          </a:fontRef>
+        </p:style>
+      </p:cxnSp>
+      <p:cxnSp>
+        <p:nvCxnSpPr>
+          <p:cNvPr id="47" name="Connector: Elbow 46">
+            <a:extLst>
+              <a:ext uri="{FF2B5EF4-FFF2-40B4-BE49-F238E27FC236}">
+                <a16:creationId xmlns:a16="http://schemas.microsoft.com/office/drawing/2014/main" id="{E8115F2D-3657-40B8-A9BF-471873119C0D}"/>
+              </a:ext>
+            </a:extLst>
+          </p:cNvPr>
+          <p:cNvCxnSpPr>
+            <a:stCxn id="107" idx="0"/>
+            <a:endCxn id="80" idx="2"/>
+          </p:cNvCxnSpPr>
+          <p:nvPr/>
+        </p:nvCxnSpPr>
+        <p:spPr>
+          <a:xfrm rot="16200000" flipV="1">
+            <a:off x="9747896" y="1948685"/>
+            <a:ext cx="382864" cy="1797265"/>
+          </a:xfrm>
+          <a:prstGeom prst="bentConnector3">
+            <a:avLst/>
+          </a:prstGeom>
+        </p:spPr>
+        <p:style>
+          <a:lnRef idx="1">
+            <a:schemeClr val="accent1"/>
+          </a:lnRef>
+          <a:fillRef idx="0">
+            <a:schemeClr val="accent1"/>
+          </a:fillRef>
+          <a:effectRef idx="0">
+            <a:schemeClr val="accent1"/>
+          </a:effectRef>
+          <a:fontRef idx="minor">
+            <a:schemeClr val="tx1"/>
+          </a:fontRef>
+        </p:style>
+      </p:cxnSp>
+      <p:cxnSp>
+        <p:nvCxnSpPr>
+          <p:cNvPr id="53" name="Connector: Elbow 52">
+            <a:extLst>
+              <a:ext uri="{FF2B5EF4-FFF2-40B4-BE49-F238E27FC236}">
+                <a16:creationId xmlns:a16="http://schemas.microsoft.com/office/drawing/2014/main" id="{00B13188-AF6C-4E65-A0C5-17EB06B67359}"/>
+              </a:ext>
+            </a:extLst>
+          </p:cNvPr>
+          <p:cNvCxnSpPr>
+            <a:cxnSpLocks/>
+            <a:stCxn id="15" idx="3"/>
+            <a:endCxn id="139" idx="1"/>
+          </p:cNvCxnSpPr>
+          <p:nvPr/>
+        </p:nvCxnSpPr>
+        <p:spPr>
+          <a:xfrm flipV="1">
+            <a:off x="4439286" y="4025409"/>
+            <a:ext cx="833730" cy="137134"/>
+          </a:xfrm>
+          <a:prstGeom prst="bentConnector3">
+            <a:avLst/>
+          </a:prstGeom>
+          <a:ln>
+            <a:tailEnd type="triangle"/>
+          </a:ln>
+        </p:spPr>
+        <p:style>
+          <a:lnRef idx="1">
+            <a:schemeClr val="accent1"/>
+          </a:lnRef>
+          <a:fillRef idx="0">
+            <a:schemeClr val="accent1"/>
+          </a:fillRef>
+          <a:effectRef idx="0">
+            <a:schemeClr val="accent1"/>
+          </a:effectRef>
+          <a:fontRef idx="minor">
+            <a:schemeClr val="tx1"/>
+          </a:fontRef>
+        </p:style>
+      </p:cxnSp>
+      <p:sp>
+        <p:nvSpPr>
+          <p:cNvPr id="111" name="TextBox 110">
+            <a:extLst>
+              <a:ext uri="{FF2B5EF4-FFF2-40B4-BE49-F238E27FC236}">
+                <a16:creationId xmlns:a16="http://schemas.microsoft.com/office/drawing/2014/main" id="{5F15E52F-B5D3-4CB7-882A-AA33486271F8}"/>
+              </a:ext>
+            </a:extLst>
+          </p:cNvPr>
+          <p:cNvSpPr txBox="1"/>
+          <p:nvPr/>
+        </p:nvSpPr>
+        <p:spPr>
+          <a:xfrm>
+            <a:off x="5545543" y="4786573"/>
+            <a:ext cx="1488595" cy="646331"/>
+          </a:xfrm>
+          <a:prstGeom prst="rect">
+            <a:avLst/>
+          </a:prstGeom>
+          <a:noFill/>
+        </p:spPr>
+        <p:txBody>
+          <a:bodyPr wrap="square" rtlCol="0">
+            <a:spAutoFit/>
+          </a:bodyPr>
+          <a:lstStyle/>
+          <a:p>
+            <a:pPr algn="ctr"/>
+            <a:r>
+              <a:rPr lang="en-IN" sz="1200" b="1" u="sng" dirty="0">
+                <a:solidFill>
+                  <a:schemeClr val="bg1"/>
+                </a:solidFill>
+              </a:rPr>
+              <a:t>Adaptor</a:t>
+            </a:r>
+          </a:p>
+          <a:p>
+            <a:pPr algn="ctr"/>
+            <a:r>
+              <a:rPr lang="en-IN" sz="1200" b="1" dirty="0">
+                <a:solidFill>
+                  <a:schemeClr val="bg1"/>
+                </a:solidFill>
+              </a:rPr>
+              <a:t>loadMap()</a:t>
+            </a:r>
+          </a:p>
+          <a:p>
+            <a:pPr algn="ctr"/>
+            <a:r>
+              <a:rPr lang="en-IN" sz="1200" b="1" dirty="0" err="1">
+                <a:solidFill>
+                  <a:schemeClr val="bg1"/>
+                </a:solidFill>
+              </a:rPr>
+              <a:t>SaveMap</a:t>
+            </a:r>
+            <a:r>
+              <a:rPr lang="en-IN" sz="1200" b="1" dirty="0">
+                <a:solidFill>
+                  <a:schemeClr val="bg1"/>
+                </a:solidFill>
+              </a:rPr>
+              <a:t>()</a:t>
+            </a:r>
+          </a:p>
+        </p:txBody>
+      </p:sp>
+      <p:sp>
+        <p:nvSpPr>
+          <p:cNvPr id="118" name="TextBox 117">
+            <a:extLst>
+              <a:ext uri="{FF2B5EF4-FFF2-40B4-BE49-F238E27FC236}">
+                <a16:creationId xmlns:a16="http://schemas.microsoft.com/office/drawing/2014/main" id="{8E06F1A3-43B3-42E7-B34C-25FCF2CA0BC4}"/>
+              </a:ext>
+            </a:extLst>
+          </p:cNvPr>
+          <p:cNvSpPr txBox="1"/>
+          <p:nvPr/>
+        </p:nvSpPr>
+        <p:spPr>
+          <a:xfrm>
+            <a:off x="5177104" y="3667301"/>
+            <a:ext cx="1488595" cy="646331"/>
+          </a:xfrm>
+          <a:prstGeom prst="rect">
+            <a:avLst/>
+          </a:prstGeom>
+          <a:noFill/>
+        </p:spPr>
+        <p:txBody>
+          <a:bodyPr wrap="square" rtlCol="0">
+            <a:spAutoFit/>
+          </a:bodyPr>
+          <a:lstStyle/>
+          <a:p>
+            <a:pPr algn="ctr"/>
+            <a:r>
+              <a:rPr lang="en-IN" sz="1200" b="1" u="sng" dirty="0">
+                <a:solidFill>
+                  <a:schemeClr val="bg1"/>
+                </a:solidFill>
+              </a:rPr>
+              <a:t>Target</a:t>
+            </a:r>
+          </a:p>
+          <a:p>
+            <a:pPr algn="ctr"/>
+            <a:r>
+              <a:rPr lang="en-IN" sz="1200" b="1" dirty="0">
+                <a:solidFill>
+                  <a:schemeClr val="bg1"/>
+                </a:solidFill>
+              </a:rPr>
+              <a:t>loadMap()</a:t>
+            </a:r>
+          </a:p>
+          <a:p>
+            <a:pPr algn="ctr"/>
+            <a:r>
+              <a:rPr lang="en-IN" sz="1200" b="1" dirty="0" err="1">
+                <a:solidFill>
+                  <a:schemeClr val="bg1"/>
+                </a:solidFill>
+              </a:rPr>
+              <a:t>SaveMap</a:t>
+            </a:r>
+            <a:r>
+              <a:rPr lang="en-IN" sz="1200" b="1" dirty="0">
+                <a:solidFill>
+                  <a:schemeClr val="bg1"/>
+                </a:solidFill>
+              </a:rPr>
+              <a:t>()</a:t>
+            </a:r>
+          </a:p>
+        </p:txBody>
+      </p:sp>
+      <p:cxnSp>
+        <p:nvCxnSpPr>
+          <p:cNvPr id="64" name="Connector: Elbow 63">
+            <a:extLst>
+              <a:ext uri="{FF2B5EF4-FFF2-40B4-BE49-F238E27FC236}">
+                <a16:creationId xmlns:a16="http://schemas.microsoft.com/office/drawing/2014/main" id="{7599493B-77EE-4317-B0D3-D9EB52A60356}"/>
+              </a:ext>
+            </a:extLst>
+          </p:cNvPr>
+          <p:cNvCxnSpPr>
+            <a:stCxn id="145" idx="3"/>
+            <a:endCxn id="146" idx="1"/>
+          </p:cNvCxnSpPr>
+          <p:nvPr/>
+        </p:nvCxnSpPr>
+        <p:spPr>
+          <a:xfrm>
+            <a:off x="7049419" y="5154540"/>
+            <a:ext cx="847696" cy="3781"/>
+          </a:xfrm>
+          <a:prstGeom prst="bentConnector3">
+            <a:avLst/>
+          </a:prstGeom>
+          <a:ln>
+            <a:tailEnd type="triangle"/>
+          </a:ln>
+        </p:spPr>
+        <p:style>
+          <a:lnRef idx="1">
+            <a:schemeClr val="accent1"/>
+          </a:lnRef>
+          <a:fillRef idx="0">
+            <a:schemeClr val="accent1"/>
+          </a:fillRef>
+          <a:effectRef idx="0">
+            <a:schemeClr val="accent1"/>
+          </a:effectRef>
+          <a:fontRef idx="minor">
+            <a:schemeClr val="tx1"/>
+          </a:fontRef>
+        </p:style>
+      </p:cxnSp>
+    </p:spTree>
+    <p:extLst>
+      <p:ext uri="{BB962C8B-B14F-4D97-AF65-F5344CB8AC3E}">
+        <p14:creationId xmlns:p14="http://schemas.microsoft.com/office/powerpoint/2010/main" val="524406439"/>
+      </p:ext>
+    </p:extLst>
+  </p:cSld>
+  <p:clrMapOvr>
+    <a:masterClrMapping/>
+  </p:clrMapOvr>
+</p:sld>
+</file>
+
+<file path=ppt/slides/slide5.xml><?xml version="1.0" encoding="utf-8"?>
 <p:sld xmlns:a="http://schemas.openxmlformats.org/drawingml/2006/main" xmlns:r="http://schemas.openxmlformats.org/officeDocument/2006/relationships" xmlns:p="http://schemas.openxmlformats.org/presentationml/2006/main">
   <p:cSld>
     <p:spTree>

</xml_diff>

<commit_message>
Changes in refactoring code, ppt
</commit_message>
<xml_diff>
--- a/resource/RISK GAME.pptx
+++ b/resource/RISK GAME.pptx
@@ -342,7 +342,7 @@
           <a:p>
             <a:fld id="{F5A0DC1E-3DF2-4B67-89A3-6A8F210A898F}" type="datetimeFigureOut">
               <a:rPr lang="en-IN" smtClean="0"/>
-              <a:t>15-04-2021</a:t>
+              <a:t>15/04/2021</a:t>
             </a:fld>
             <a:endParaRPr lang="en-IN"/>
           </a:p>
@@ -550,7 +550,7 @@
           <a:p>
             <a:fld id="{F5A0DC1E-3DF2-4B67-89A3-6A8F210A898F}" type="datetimeFigureOut">
               <a:rPr lang="en-IN" smtClean="0"/>
-              <a:t>15-04-2021</a:t>
+              <a:t>15/04/2021</a:t>
             </a:fld>
             <a:endParaRPr lang="en-IN"/>
           </a:p>
@@ -806,7 +806,7 @@
           <a:p>
             <a:fld id="{F5A0DC1E-3DF2-4B67-89A3-6A8F210A898F}" type="datetimeFigureOut">
               <a:rPr lang="en-IN" smtClean="0"/>
-              <a:t>15-04-2021</a:t>
+              <a:t>15/04/2021</a:t>
             </a:fld>
             <a:endParaRPr lang="en-IN"/>
           </a:p>
@@ -976,7 +976,7 @@
           <a:p>
             <a:fld id="{F5A0DC1E-3DF2-4B67-89A3-6A8F210A898F}" type="datetimeFigureOut">
               <a:rPr lang="en-IN" smtClean="0"/>
-              <a:t>15-04-2021</a:t>
+              <a:t>15/04/2021</a:t>
             </a:fld>
             <a:endParaRPr lang="en-IN"/>
           </a:p>
@@ -1319,7 +1319,7 @@
           <a:p>
             <a:fld id="{F5A0DC1E-3DF2-4B67-89A3-6A8F210A898F}" type="datetimeFigureOut">
               <a:rPr lang="en-IN" smtClean="0"/>
-              <a:t>15-04-2021</a:t>
+              <a:t>15/04/2021</a:t>
             </a:fld>
             <a:endParaRPr lang="en-IN"/>
           </a:p>
@@ -1594,7 +1594,7 @@
           <a:p>
             <a:fld id="{F5A0DC1E-3DF2-4B67-89A3-6A8F210A898F}" type="datetimeFigureOut">
               <a:rPr lang="en-IN" smtClean="0"/>
-              <a:t>15-04-2021</a:t>
+              <a:t>15/04/2021</a:t>
             </a:fld>
             <a:endParaRPr lang="en-IN"/>
           </a:p>
@@ -1973,7 +1973,7 @@
           <a:p>
             <a:fld id="{F5A0DC1E-3DF2-4B67-89A3-6A8F210A898F}" type="datetimeFigureOut">
               <a:rPr lang="en-IN" smtClean="0"/>
-              <a:t>15-04-2021</a:t>
+              <a:t>15/04/2021</a:t>
             </a:fld>
             <a:endParaRPr lang="en-IN"/>
           </a:p>
@@ -2091,7 +2091,7 @@
           <a:p>
             <a:fld id="{F5A0DC1E-3DF2-4B67-89A3-6A8F210A898F}" type="datetimeFigureOut">
               <a:rPr lang="en-IN" smtClean="0"/>
-              <a:t>15-04-2021</a:t>
+              <a:t>15/04/2021</a:t>
             </a:fld>
             <a:endParaRPr lang="en-IN"/>
           </a:p>
@@ -2262,7 +2262,7 @@
           <a:p>
             <a:fld id="{F5A0DC1E-3DF2-4B67-89A3-6A8F210A898F}" type="datetimeFigureOut">
               <a:rPr lang="en-IN" smtClean="0"/>
-              <a:t>15-04-2021</a:t>
+              <a:t>15/04/2021</a:t>
             </a:fld>
             <a:endParaRPr lang="en-IN"/>
           </a:p>
@@ -2616,7 +2616,7 @@
           <a:p>
             <a:fld id="{F5A0DC1E-3DF2-4B67-89A3-6A8F210A898F}" type="datetimeFigureOut">
               <a:rPr lang="en-IN" smtClean="0"/>
-              <a:t>15-04-2021</a:t>
+              <a:t>15/04/2021</a:t>
             </a:fld>
             <a:endParaRPr lang="en-IN"/>
           </a:p>
@@ -2993,7 +2993,7 @@
           <a:p>
             <a:fld id="{F5A0DC1E-3DF2-4B67-89A3-6A8F210A898F}" type="datetimeFigureOut">
               <a:rPr lang="en-IN" smtClean="0"/>
-              <a:t>15-04-2021</a:t>
+              <a:t>15/04/2021</a:t>
             </a:fld>
             <a:endParaRPr lang="en-IN"/>
           </a:p>
@@ -3280,7 +3280,7 @@
           <a:p>
             <a:fld id="{F5A0DC1E-3DF2-4B67-89A3-6A8F210A898F}" type="datetimeFigureOut">
               <a:rPr lang="en-IN" smtClean="0"/>
-              <a:t>15-04-2021</a:t>
+              <a:t>15/04/2021</a:t>
             </a:fld>
             <a:endParaRPr lang="en-IN"/>
           </a:p>
@@ -3836,7 +3836,15 @@
             </a:br>
             <a:r>
               <a:rPr lang="en-US" sz="6000" dirty="0"/>
-              <a:t>BUILD 2</a:t>
+              <a:t>BUILD </a:t>
+            </a:r>
+            <a:r>
+              <a:rPr lang="en-US" sz="6000" dirty="0" smtClean="0"/>
+              <a:t>3</a:t>
+            </a:r>
+            <a:r>
+              <a:rPr lang="en-US" sz="6000" dirty="0"/>
+              <a:t/>
             </a:r>
             <a:br>
               <a:rPr lang="en-US" sz="6000" dirty="0"/>
@@ -3989,6 +3997,10 @@
             </a:r>
           </a:p>
           <a:p>
+            <a:r>
+              <a:rPr lang="en-IN" dirty="0"/>
+              <a:t/>
+            </a:r>
             <a:br>
               <a:rPr lang="en-IN" dirty="0"/>
             </a:br>
@@ -4850,7 +4862,7 @@
           <p:cNvPr id="70" name="TextBox 69">
             <a:extLst>
               <a:ext uri="{FF2B5EF4-FFF2-40B4-BE49-F238E27FC236}">
-                <a16:creationId xmlns:a16="http://schemas.microsoft.com/office/drawing/2014/main" id="{4A97F8ED-AE3E-444D-B3FD-EF24CB125651}"/>
+                <a16:creationId xmlns:a16="http://schemas.microsoft.com/office/drawing/2014/main" xmlns="" id="{4A97F8ED-AE3E-444D-B3FD-EF24CB125651}"/>
               </a:ext>
             </a:extLst>
           </p:cNvPr>
@@ -4941,7 +4953,7 @@
           <p:cNvPr id="71" name="TextBox 70">
             <a:extLst>
               <a:ext uri="{FF2B5EF4-FFF2-40B4-BE49-F238E27FC236}">
-                <a16:creationId xmlns:a16="http://schemas.microsoft.com/office/drawing/2014/main" id="{487CE72F-56E8-4E7F-BB11-4F81070967E7}"/>
+                <a16:creationId xmlns:a16="http://schemas.microsoft.com/office/drawing/2014/main" xmlns="" id="{487CE72F-56E8-4E7F-BB11-4F81070967E7}"/>
               </a:ext>
             </a:extLst>
           </p:cNvPr>
@@ -4981,7 +4993,7 @@
           <p:cNvPr id="74" name="Rectangle 73">
             <a:extLst>
               <a:ext uri="{FF2B5EF4-FFF2-40B4-BE49-F238E27FC236}">
-                <a16:creationId xmlns:a16="http://schemas.microsoft.com/office/drawing/2014/main" id="{C02AE149-738A-4BF4-9A46-DFA2979393B1}"/>
+                <a16:creationId xmlns:a16="http://schemas.microsoft.com/office/drawing/2014/main" xmlns="" id="{C02AE149-738A-4BF4-9A46-DFA2979393B1}"/>
               </a:ext>
             </a:extLst>
           </p:cNvPr>
@@ -5027,7 +5039,7 @@
           <p:cNvPr id="80" name="TextBox 79">
             <a:extLst>
               <a:ext uri="{FF2B5EF4-FFF2-40B4-BE49-F238E27FC236}">
-                <a16:creationId xmlns:a16="http://schemas.microsoft.com/office/drawing/2014/main" id="{50BFA0C1-5175-4E36-AC8A-BED98753ACF9}"/>
+                <a16:creationId xmlns:a16="http://schemas.microsoft.com/office/drawing/2014/main" xmlns="" id="{50BFA0C1-5175-4E36-AC8A-BED98753ACF9}"/>
               </a:ext>
             </a:extLst>
           </p:cNvPr>
@@ -5067,7 +5079,7 @@
           <p:cNvPr id="87" name="Rectangle 86">
             <a:extLst>
               <a:ext uri="{FF2B5EF4-FFF2-40B4-BE49-F238E27FC236}">
-                <a16:creationId xmlns:a16="http://schemas.microsoft.com/office/drawing/2014/main" id="{D987B2E7-8B3E-4A0C-B942-D65D26E341F4}"/>
+                <a16:creationId xmlns:a16="http://schemas.microsoft.com/office/drawing/2014/main" xmlns="" id="{D987B2E7-8B3E-4A0C-B942-D65D26E341F4}"/>
               </a:ext>
             </a:extLst>
           </p:cNvPr>
@@ -5113,7 +5125,7 @@
           <p:cNvPr id="88" name="Rectangle 87">
             <a:extLst>
               <a:ext uri="{FF2B5EF4-FFF2-40B4-BE49-F238E27FC236}">
-                <a16:creationId xmlns:a16="http://schemas.microsoft.com/office/drawing/2014/main" id="{DD4EE508-B559-410C-A71F-AF36AEFBEC4F}"/>
+                <a16:creationId xmlns:a16="http://schemas.microsoft.com/office/drawing/2014/main" xmlns="" id="{DD4EE508-B559-410C-A71F-AF36AEFBEC4F}"/>
               </a:ext>
             </a:extLst>
           </p:cNvPr>
@@ -5159,7 +5171,7 @@
           <p:cNvPr id="89" name="Rectangle 88">
             <a:extLst>
               <a:ext uri="{FF2B5EF4-FFF2-40B4-BE49-F238E27FC236}">
-                <a16:creationId xmlns:a16="http://schemas.microsoft.com/office/drawing/2014/main" id="{5B16BA99-AF94-4404-AC74-AAFCA1254520}"/>
+                <a16:creationId xmlns:a16="http://schemas.microsoft.com/office/drawing/2014/main" xmlns="" id="{5B16BA99-AF94-4404-AC74-AAFCA1254520}"/>
               </a:ext>
             </a:extLst>
           </p:cNvPr>
@@ -5205,7 +5217,7 @@
           <p:cNvPr id="90" name="Rectangle 89">
             <a:extLst>
               <a:ext uri="{FF2B5EF4-FFF2-40B4-BE49-F238E27FC236}">
-                <a16:creationId xmlns:a16="http://schemas.microsoft.com/office/drawing/2014/main" id="{19F2B8FD-60C0-4FBA-9EE1-5E8903307ED9}"/>
+                <a16:creationId xmlns:a16="http://schemas.microsoft.com/office/drawing/2014/main" xmlns="" id="{19F2B8FD-60C0-4FBA-9EE1-5E8903307ED9}"/>
               </a:ext>
             </a:extLst>
           </p:cNvPr>
@@ -5251,7 +5263,7 @@
           <p:cNvPr id="91" name="Flowchart: Decision 90">
             <a:extLst>
               <a:ext uri="{FF2B5EF4-FFF2-40B4-BE49-F238E27FC236}">
-                <a16:creationId xmlns:a16="http://schemas.microsoft.com/office/drawing/2014/main" id="{D843C0B5-757D-415F-BADD-478AF81ED175}"/>
+                <a16:creationId xmlns:a16="http://schemas.microsoft.com/office/drawing/2014/main" xmlns="" id="{D843C0B5-757D-415F-BADD-478AF81ED175}"/>
               </a:ext>
             </a:extLst>
           </p:cNvPr>
@@ -5297,7 +5309,7 @@
           <p:cNvPr id="94" name="TextBox 93">
             <a:extLst>
               <a:ext uri="{FF2B5EF4-FFF2-40B4-BE49-F238E27FC236}">
-                <a16:creationId xmlns:a16="http://schemas.microsoft.com/office/drawing/2014/main" id="{DCA91F34-BD61-4C19-BAFB-A75725B3BF79}"/>
+                <a16:creationId xmlns:a16="http://schemas.microsoft.com/office/drawing/2014/main" xmlns="" id="{DCA91F34-BD61-4C19-BAFB-A75725B3BF79}"/>
               </a:ext>
             </a:extLst>
           </p:cNvPr>
@@ -5337,7 +5349,7 @@
           <p:cNvPr id="95" name="TextBox 94">
             <a:extLst>
               <a:ext uri="{FF2B5EF4-FFF2-40B4-BE49-F238E27FC236}">
-                <a16:creationId xmlns:a16="http://schemas.microsoft.com/office/drawing/2014/main" id="{6081199C-117E-4927-8418-CC92E56A46C1}"/>
+                <a16:creationId xmlns:a16="http://schemas.microsoft.com/office/drawing/2014/main" xmlns="" id="{6081199C-117E-4927-8418-CC92E56A46C1}"/>
               </a:ext>
             </a:extLst>
           </p:cNvPr>
@@ -5382,7 +5394,7 @@
           <p:cNvPr id="96" name="TextBox 95">
             <a:extLst>
               <a:ext uri="{FF2B5EF4-FFF2-40B4-BE49-F238E27FC236}">
-                <a16:creationId xmlns:a16="http://schemas.microsoft.com/office/drawing/2014/main" id="{1DC97FE0-A9F5-4F0D-A4D2-C09C267FEC03}"/>
+                <a16:creationId xmlns:a16="http://schemas.microsoft.com/office/drawing/2014/main" xmlns="" id="{1DC97FE0-A9F5-4F0D-A4D2-C09C267FEC03}"/>
               </a:ext>
             </a:extLst>
           </p:cNvPr>
@@ -5422,7 +5434,7 @@
           <p:cNvPr id="97" name="TextBox 96">
             <a:extLst>
               <a:ext uri="{FF2B5EF4-FFF2-40B4-BE49-F238E27FC236}">
-                <a16:creationId xmlns:a16="http://schemas.microsoft.com/office/drawing/2014/main" id="{EDA1FFFA-D300-40A8-96CE-E23ABFEB31B4}"/>
+                <a16:creationId xmlns:a16="http://schemas.microsoft.com/office/drawing/2014/main" xmlns="" id="{EDA1FFFA-D300-40A8-96CE-E23ABFEB31B4}"/>
               </a:ext>
             </a:extLst>
           </p:cNvPr>
@@ -5467,7 +5479,7 @@
           <p:cNvPr id="101" name="Connector: Elbow 100">
             <a:extLst>
               <a:ext uri="{FF2B5EF4-FFF2-40B4-BE49-F238E27FC236}">
-                <a16:creationId xmlns:a16="http://schemas.microsoft.com/office/drawing/2014/main" id="{CBAF200F-A791-4B0F-B0C7-311F5F0FB4A7}"/>
+                <a16:creationId xmlns:a16="http://schemas.microsoft.com/office/drawing/2014/main" xmlns="" id="{CBAF200F-A791-4B0F-B0C7-311F5F0FB4A7}"/>
               </a:ext>
             </a:extLst>
           </p:cNvPr>
@@ -5506,7 +5518,7 @@
           <p:cNvPr id="106" name="Rectangle 105">
             <a:extLst>
               <a:ext uri="{FF2B5EF4-FFF2-40B4-BE49-F238E27FC236}">
-                <a16:creationId xmlns:a16="http://schemas.microsoft.com/office/drawing/2014/main" id="{81946E50-5607-4B11-89B5-521BB3C431E7}"/>
+                <a16:creationId xmlns:a16="http://schemas.microsoft.com/office/drawing/2014/main" xmlns="" id="{81946E50-5607-4B11-89B5-521BB3C431E7}"/>
               </a:ext>
             </a:extLst>
           </p:cNvPr>
@@ -5552,7 +5564,7 @@
           <p:cNvPr id="107" name="Rectangle 106">
             <a:extLst>
               <a:ext uri="{FF2B5EF4-FFF2-40B4-BE49-F238E27FC236}">
-                <a16:creationId xmlns:a16="http://schemas.microsoft.com/office/drawing/2014/main" id="{130E79D5-9C9D-4BA9-9100-FC6C9F1DF5A6}"/>
+                <a16:creationId xmlns:a16="http://schemas.microsoft.com/office/drawing/2014/main" xmlns="" id="{130E79D5-9C9D-4BA9-9100-FC6C9F1DF5A6}"/>
               </a:ext>
             </a:extLst>
           </p:cNvPr>
@@ -5598,7 +5610,7 @@
           <p:cNvPr id="108" name="TextBox 107">
             <a:extLst>
               <a:ext uri="{FF2B5EF4-FFF2-40B4-BE49-F238E27FC236}">
-                <a16:creationId xmlns:a16="http://schemas.microsoft.com/office/drawing/2014/main" id="{72F825C1-9F1C-4AB2-8A5A-5906D64704E4}"/>
+                <a16:creationId xmlns:a16="http://schemas.microsoft.com/office/drawing/2014/main" xmlns="" id="{72F825C1-9F1C-4AB2-8A5A-5906D64704E4}"/>
               </a:ext>
             </a:extLst>
           </p:cNvPr>
@@ -5638,7 +5650,7 @@
           <p:cNvPr id="109" name="TextBox 108">
             <a:extLst>
               <a:ext uri="{FF2B5EF4-FFF2-40B4-BE49-F238E27FC236}">
-                <a16:creationId xmlns:a16="http://schemas.microsoft.com/office/drawing/2014/main" id="{EAA01326-13FC-4AE4-8025-2C2D3D87C06B}"/>
+                <a16:creationId xmlns:a16="http://schemas.microsoft.com/office/drawing/2014/main" xmlns="" id="{EAA01326-13FC-4AE4-8025-2C2D3D87C06B}"/>
               </a:ext>
             </a:extLst>
           </p:cNvPr>
@@ -5689,7 +5701,7 @@
           <p:cNvPr id="117" name="TextBox 116">
             <a:extLst>
               <a:ext uri="{FF2B5EF4-FFF2-40B4-BE49-F238E27FC236}">
-                <a16:creationId xmlns:a16="http://schemas.microsoft.com/office/drawing/2014/main" id="{D3D6547D-6BD6-4D04-86DD-45281FC1292D}"/>
+                <a16:creationId xmlns:a16="http://schemas.microsoft.com/office/drawing/2014/main" xmlns="" id="{D3D6547D-6BD6-4D04-86DD-45281FC1292D}"/>
               </a:ext>
             </a:extLst>
           </p:cNvPr>
@@ -5789,7 +5801,7 @@
           <p:cNvPr id="119" name="Connector: Elbow 118">
             <a:extLst>
               <a:ext uri="{FF2B5EF4-FFF2-40B4-BE49-F238E27FC236}">
-                <a16:creationId xmlns:a16="http://schemas.microsoft.com/office/drawing/2014/main" id="{56DE157D-EE6A-41C5-8151-1FC45DFDDFEB}"/>
+                <a16:creationId xmlns:a16="http://schemas.microsoft.com/office/drawing/2014/main" xmlns="" id="{56DE157D-EE6A-41C5-8151-1FC45DFDDFEB}"/>
               </a:ext>
             </a:extLst>
           </p:cNvPr>
@@ -5831,7 +5843,7 @@
           <p:cNvPr id="121" name="Connector: Elbow 120">
             <a:extLst>
               <a:ext uri="{FF2B5EF4-FFF2-40B4-BE49-F238E27FC236}">
-                <a16:creationId xmlns:a16="http://schemas.microsoft.com/office/drawing/2014/main" id="{CC9B43A8-3B74-4FD3-85C4-2DB00FEBC3F5}"/>
+                <a16:creationId xmlns:a16="http://schemas.microsoft.com/office/drawing/2014/main" xmlns="" id="{CC9B43A8-3B74-4FD3-85C4-2DB00FEBC3F5}"/>
               </a:ext>
             </a:extLst>
           </p:cNvPr>
@@ -5876,7 +5888,7 @@
           <p:cNvPr id="125" name="Connector: Elbow 124">
             <a:extLst>
               <a:ext uri="{FF2B5EF4-FFF2-40B4-BE49-F238E27FC236}">
-                <a16:creationId xmlns:a16="http://schemas.microsoft.com/office/drawing/2014/main" id="{322A6308-C0B2-43B7-A434-96764C3CE99D}"/>
+                <a16:creationId xmlns:a16="http://schemas.microsoft.com/office/drawing/2014/main" xmlns="" id="{322A6308-C0B2-43B7-A434-96764C3CE99D}"/>
               </a:ext>
             </a:extLst>
           </p:cNvPr>
@@ -5918,7 +5930,7 @@
           <p:cNvPr id="127" name="Connector: Elbow 126">
             <a:extLst>
               <a:ext uri="{FF2B5EF4-FFF2-40B4-BE49-F238E27FC236}">
-                <a16:creationId xmlns:a16="http://schemas.microsoft.com/office/drawing/2014/main" id="{025F194D-7E97-4BE7-90C1-498D232BEDC3}"/>
+                <a16:creationId xmlns:a16="http://schemas.microsoft.com/office/drawing/2014/main" xmlns="" id="{025F194D-7E97-4BE7-90C1-498D232BEDC3}"/>
               </a:ext>
             </a:extLst>
           </p:cNvPr>
@@ -5960,7 +5972,7 @@
           <p:cNvPr id="129" name="Connector: Elbow 128">
             <a:extLst>
               <a:ext uri="{FF2B5EF4-FFF2-40B4-BE49-F238E27FC236}">
-                <a16:creationId xmlns:a16="http://schemas.microsoft.com/office/drawing/2014/main" id="{CA6B49A1-FC37-4909-80AB-ABD1699E5737}"/>
+                <a16:creationId xmlns:a16="http://schemas.microsoft.com/office/drawing/2014/main" xmlns="" id="{CA6B49A1-FC37-4909-80AB-ABD1699E5737}"/>
               </a:ext>
             </a:extLst>
           </p:cNvPr>
@@ -6002,7 +6014,7 @@
           <p:cNvPr id="131" name="Connector: Elbow 130">
             <a:extLst>
               <a:ext uri="{FF2B5EF4-FFF2-40B4-BE49-F238E27FC236}">
-                <a16:creationId xmlns:a16="http://schemas.microsoft.com/office/drawing/2014/main" id="{ABF22CB6-C754-44FA-A6A1-BE1515698C3A}"/>
+                <a16:creationId xmlns:a16="http://schemas.microsoft.com/office/drawing/2014/main" xmlns="" id="{ABF22CB6-C754-44FA-A6A1-BE1515698C3A}"/>
               </a:ext>
             </a:extLst>
           </p:cNvPr>
@@ -6044,7 +6056,7 @@
           <p:cNvPr id="132" name="TextBox 131">
             <a:extLst>
               <a:ext uri="{FF2B5EF4-FFF2-40B4-BE49-F238E27FC236}">
-                <a16:creationId xmlns:a16="http://schemas.microsoft.com/office/drawing/2014/main" id="{3B5E71FD-90D0-47C2-AA96-A23BD16AD572}"/>
+                <a16:creationId xmlns:a16="http://schemas.microsoft.com/office/drawing/2014/main" xmlns="" id="{3B5E71FD-90D0-47C2-AA96-A23BD16AD572}"/>
               </a:ext>
             </a:extLst>
           </p:cNvPr>
@@ -6089,7 +6101,7 @@
           <p:cNvPr id="139" name="Rectangle 138">
             <a:extLst>
               <a:ext uri="{FF2B5EF4-FFF2-40B4-BE49-F238E27FC236}">
-                <a16:creationId xmlns:a16="http://schemas.microsoft.com/office/drawing/2014/main" id="{28D374E5-06ED-40D7-A632-66F8E0629D04}"/>
+                <a16:creationId xmlns:a16="http://schemas.microsoft.com/office/drawing/2014/main" xmlns="" id="{28D374E5-06ED-40D7-A632-66F8E0629D04}"/>
               </a:ext>
             </a:extLst>
           </p:cNvPr>
@@ -6135,7 +6147,7 @@
           <p:cNvPr id="140" name="TextBox 139">
             <a:extLst>
               <a:ext uri="{FF2B5EF4-FFF2-40B4-BE49-F238E27FC236}">
-                <a16:creationId xmlns:a16="http://schemas.microsoft.com/office/drawing/2014/main" id="{08E09B3B-7C7C-48CD-A31B-7A8617F21E30}"/>
+                <a16:creationId xmlns:a16="http://schemas.microsoft.com/office/drawing/2014/main" xmlns="" id="{08E09B3B-7C7C-48CD-A31B-7A8617F21E30}"/>
               </a:ext>
             </a:extLst>
           </p:cNvPr>
@@ -6175,7 +6187,7 @@
           <p:cNvPr id="141" name="TextBox 140">
             <a:extLst>
               <a:ext uri="{FF2B5EF4-FFF2-40B4-BE49-F238E27FC236}">
-                <a16:creationId xmlns:a16="http://schemas.microsoft.com/office/drawing/2014/main" id="{48A53641-8E73-4D77-A779-96C66ED1D023}"/>
+                <a16:creationId xmlns:a16="http://schemas.microsoft.com/office/drawing/2014/main" xmlns="" id="{48A53641-8E73-4D77-A779-96C66ED1D023}"/>
               </a:ext>
             </a:extLst>
           </p:cNvPr>
@@ -6215,7 +6227,7 @@
           <p:cNvPr id="142" name="TextBox 141">
             <a:extLst>
               <a:ext uri="{FF2B5EF4-FFF2-40B4-BE49-F238E27FC236}">
-                <a16:creationId xmlns:a16="http://schemas.microsoft.com/office/drawing/2014/main" id="{41E88371-96EA-4C24-B2BE-A3B120D76EF7}"/>
+                <a16:creationId xmlns:a16="http://schemas.microsoft.com/office/drawing/2014/main" xmlns="" id="{41E88371-96EA-4C24-B2BE-A3B120D76EF7}"/>
               </a:ext>
             </a:extLst>
           </p:cNvPr>
@@ -6255,7 +6267,7 @@
           <p:cNvPr id="143" name="Rectangle 142">
             <a:extLst>
               <a:ext uri="{FF2B5EF4-FFF2-40B4-BE49-F238E27FC236}">
-                <a16:creationId xmlns:a16="http://schemas.microsoft.com/office/drawing/2014/main" id="{43ED95D3-E850-4338-8272-3D84AB2D45DA}"/>
+                <a16:creationId xmlns:a16="http://schemas.microsoft.com/office/drawing/2014/main" xmlns="" id="{43ED95D3-E850-4338-8272-3D84AB2D45DA}"/>
               </a:ext>
             </a:extLst>
           </p:cNvPr>
@@ -6301,7 +6313,7 @@
           <p:cNvPr id="144" name="Rectangle 143">
             <a:extLst>
               <a:ext uri="{FF2B5EF4-FFF2-40B4-BE49-F238E27FC236}">
-                <a16:creationId xmlns:a16="http://schemas.microsoft.com/office/drawing/2014/main" id="{A15F8655-7E27-4267-8103-68121B965B86}"/>
+                <a16:creationId xmlns:a16="http://schemas.microsoft.com/office/drawing/2014/main" xmlns="" id="{A15F8655-7E27-4267-8103-68121B965B86}"/>
               </a:ext>
             </a:extLst>
           </p:cNvPr>
@@ -6347,7 +6359,7 @@
           <p:cNvPr id="145" name="Rectangle 144">
             <a:extLst>
               <a:ext uri="{FF2B5EF4-FFF2-40B4-BE49-F238E27FC236}">
-                <a16:creationId xmlns:a16="http://schemas.microsoft.com/office/drawing/2014/main" id="{89A50676-A6C6-4096-8631-38DDD5D9293A}"/>
+                <a16:creationId xmlns:a16="http://schemas.microsoft.com/office/drawing/2014/main" xmlns="" id="{89A50676-A6C6-4096-8631-38DDD5D9293A}"/>
               </a:ext>
             </a:extLst>
           </p:cNvPr>
@@ -6393,7 +6405,7 @@
           <p:cNvPr id="146" name="Rectangle 145">
             <a:extLst>
               <a:ext uri="{FF2B5EF4-FFF2-40B4-BE49-F238E27FC236}">
-                <a16:creationId xmlns:a16="http://schemas.microsoft.com/office/drawing/2014/main" id="{7FE732F5-66F4-49C2-893F-7A2552A3EFE2}"/>
+                <a16:creationId xmlns:a16="http://schemas.microsoft.com/office/drawing/2014/main" xmlns="" id="{7FE732F5-66F4-49C2-893F-7A2552A3EFE2}"/>
               </a:ext>
             </a:extLst>
           </p:cNvPr>
@@ -6439,7 +6451,7 @@
           <p:cNvPr id="147" name="TextBox 146">
             <a:extLst>
               <a:ext uri="{FF2B5EF4-FFF2-40B4-BE49-F238E27FC236}">
-                <a16:creationId xmlns:a16="http://schemas.microsoft.com/office/drawing/2014/main" id="{28666FA5-C0D4-4B21-B8A9-E3987B5394BD}"/>
+                <a16:creationId xmlns:a16="http://schemas.microsoft.com/office/drawing/2014/main" xmlns="" id="{28666FA5-C0D4-4B21-B8A9-E3987B5394BD}"/>
               </a:ext>
             </a:extLst>
           </p:cNvPr>
@@ -6479,7 +6491,7 @@
           <p:cNvPr id="148" name="TextBox 147">
             <a:extLst>
               <a:ext uri="{FF2B5EF4-FFF2-40B4-BE49-F238E27FC236}">
-                <a16:creationId xmlns:a16="http://schemas.microsoft.com/office/drawing/2014/main" id="{6958D732-41EC-4E29-BB37-E1B609EF6CF5}"/>
+                <a16:creationId xmlns:a16="http://schemas.microsoft.com/office/drawing/2014/main" xmlns="" id="{6958D732-41EC-4E29-BB37-E1B609EF6CF5}"/>
               </a:ext>
             </a:extLst>
           </p:cNvPr>
@@ -6519,7 +6531,7 @@
           <p:cNvPr id="149" name="TextBox 148">
             <a:extLst>
               <a:ext uri="{FF2B5EF4-FFF2-40B4-BE49-F238E27FC236}">
-                <a16:creationId xmlns:a16="http://schemas.microsoft.com/office/drawing/2014/main" id="{FCA8E678-C86C-48A6-86AB-F0FB7C0B80AB}"/>
+                <a16:creationId xmlns:a16="http://schemas.microsoft.com/office/drawing/2014/main" xmlns="" id="{FCA8E678-C86C-48A6-86AB-F0FB7C0B80AB}"/>
               </a:ext>
             </a:extLst>
           </p:cNvPr>
@@ -6559,7 +6571,7 @@
           <p:cNvPr id="150" name="TextBox 149">
             <a:extLst>
               <a:ext uri="{FF2B5EF4-FFF2-40B4-BE49-F238E27FC236}">
-                <a16:creationId xmlns:a16="http://schemas.microsoft.com/office/drawing/2014/main" id="{F276A2BC-4C1C-467D-9106-63F10BAB4549}"/>
+                <a16:creationId xmlns:a16="http://schemas.microsoft.com/office/drawing/2014/main" xmlns="" id="{F276A2BC-4C1C-467D-9106-63F10BAB4549}"/>
               </a:ext>
             </a:extLst>
           </p:cNvPr>
@@ -6599,7 +6611,7 @@
           <p:cNvPr id="151" name="Rectangle 150">
             <a:extLst>
               <a:ext uri="{FF2B5EF4-FFF2-40B4-BE49-F238E27FC236}">
-                <a16:creationId xmlns:a16="http://schemas.microsoft.com/office/drawing/2014/main" id="{D6605B80-EA63-47AC-B019-BB0914DD6F2F}"/>
+                <a16:creationId xmlns:a16="http://schemas.microsoft.com/office/drawing/2014/main" xmlns="" id="{D6605B80-EA63-47AC-B019-BB0914DD6F2F}"/>
               </a:ext>
             </a:extLst>
           </p:cNvPr>
@@ -6645,7 +6657,7 @@
           <p:cNvPr id="152" name="Rectangle 151">
             <a:extLst>
               <a:ext uri="{FF2B5EF4-FFF2-40B4-BE49-F238E27FC236}">
-                <a16:creationId xmlns:a16="http://schemas.microsoft.com/office/drawing/2014/main" id="{80E8B561-1BDB-46F9-A7AA-8351ADCD9C6A}"/>
+                <a16:creationId xmlns:a16="http://schemas.microsoft.com/office/drawing/2014/main" xmlns="" id="{80E8B561-1BDB-46F9-A7AA-8351ADCD9C6A}"/>
               </a:ext>
             </a:extLst>
           </p:cNvPr>
@@ -6691,7 +6703,7 @@
           <p:cNvPr id="153" name="TextBox 152">
             <a:extLst>
               <a:ext uri="{FF2B5EF4-FFF2-40B4-BE49-F238E27FC236}">
-                <a16:creationId xmlns:a16="http://schemas.microsoft.com/office/drawing/2014/main" id="{CB553CFA-BF9B-491B-86EA-44571A7F90C9}"/>
+                <a16:creationId xmlns:a16="http://schemas.microsoft.com/office/drawing/2014/main" xmlns="" id="{CB553CFA-BF9B-491B-86EA-44571A7F90C9}"/>
               </a:ext>
             </a:extLst>
           </p:cNvPr>
@@ -6731,7 +6743,7 @@
           <p:cNvPr id="154" name="TextBox 153">
             <a:extLst>
               <a:ext uri="{FF2B5EF4-FFF2-40B4-BE49-F238E27FC236}">
-                <a16:creationId xmlns:a16="http://schemas.microsoft.com/office/drawing/2014/main" id="{808A2A9B-0FD4-41F4-A4E0-CA3CB687D947}"/>
+                <a16:creationId xmlns:a16="http://schemas.microsoft.com/office/drawing/2014/main" xmlns="" id="{808A2A9B-0FD4-41F4-A4E0-CA3CB687D947}"/>
               </a:ext>
             </a:extLst>
           </p:cNvPr>
@@ -6771,7 +6783,7 @@
           <p:cNvPr id="162" name="Connector: Elbow 161">
             <a:extLst>
               <a:ext uri="{FF2B5EF4-FFF2-40B4-BE49-F238E27FC236}">
-                <a16:creationId xmlns:a16="http://schemas.microsoft.com/office/drawing/2014/main" id="{29A04AE2-49C2-4F38-93BD-DE298AB3BE2B}"/>
+                <a16:creationId xmlns:a16="http://schemas.microsoft.com/office/drawing/2014/main" xmlns="" id="{29A04AE2-49C2-4F38-93BD-DE298AB3BE2B}"/>
               </a:ext>
             </a:extLst>
           </p:cNvPr>
@@ -6813,7 +6825,7 @@
           <p:cNvPr id="164" name="Connector: Elbow 163">
             <a:extLst>
               <a:ext uri="{FF2B5EF4-FFF2-40B4-BE49-F238E27FC236}">
-                <a16:creationId xmlns:a16="http://schemas.microsoft.com/office/drawing/2014/main" id="{E2B5DC45-CE47-4B72-8E39-44C28359E106}"/>
+                <a16:creationId xmlns:a16="http://schemas.microsoft.com/office/drawing/2014/main" xmlns="" id="{E2B5DC45-CE47-4B72-8E39-44C28359E106}"/>
               </a:ext>
             </a:extLst>
           </p:cNvPr>
@@ -6855,7 +6867,7 @@
           <p:cNvPr id="166" name="Connector: Elbow 165">
             <a:extLst>
               <a:ext uri="{FF2B5EF4-FFF2-40B4-BE49-F238E27FC236}">
-                <a16:creationId xmlns:a16="http://schemas.microsoft.com/office/drawing/2014/main" id="{1FDEA49E-70F0-4395-8B35-5E7B5289D153}"/>
+                <a16:creationId xmlns:a16="http://schemas.microsoft.com/office/drawing/2014/main" xmlns="" id="{1FDEA49E-70F0-4395-8B35-5E7B5289D153}"/>
               </a:ext>
             </a:extLst>
           </p:cNvPr>
@@ -6897,7 +6909,7 @@
           <p:cNvPr id="168" name="Connector: Elbow 167">
             <a:extLst>
               <a:ext uri="{FF2B5EF4-FFF2-40B4-BE49-F238E27FC236}">
-                <a16:creationId xmlns:a16="http://schemas.microsoft.com/office/drawing/2014/main" id="{FB2ADCF2-EDF7-4CF3-AF75-FFC10B337224}"/>
+                <a16:creationId xmlns:a16="http://schemas.microsoft.com/office/drawing/2014/main" xmlns="" id="{FB2ADCF2-EDF7-4CF3-AF75-FFC10B337224}"/>
               </a:ext>
             </a:extLst>
           </p:cNvPr>
@@ -6939,7 +6951,7 @@
           <p:cNvPr id="170" name="Connector: Elbow 169">
             <a:extLst>
               <a:ext uri="{FF2B5EF4-FFF2-40B4-BE49-F238E27FC236}">
-                <a16:creationId xmlns:a16="http://schemas.microsoft.com/office/drawing/2014/main" id="{82C98B70-ECDB-47D1-AD3C-66631A0D288D}"/>
+                <a16:creationId xmlns:a16="http://schemas.microsoft.com/office/drawing/2014/main" xmlns="" id="{82C98B70-ECDB-47D1-AD3C-66631A0D288D}"/>
               </a:ext>
             </a:extLst>
           </p:cNvPr>
@@ -6981,7 +6993,7 @@
           <p:cNvPr id="172" name="Connector: Elbow 171">
             <a:extLst>
               <a:ext uri="{FF2B5EF4-FFF2-40B4-BE49-F238E27FC236}">
-                <a16:creationId xmlns:a16="http://schemas.microsoft.com/office/drawing/2014/main" id="{2BBC7BE9-FC5D-4705-95A0-3E9E354F2227}"/>
+                <a16:creationId xmlns:a16="http://schemas.microsoft.com/office/drawing/2014/main" xmlns="" id="{2BBC7BE9-FC5D-4705-95A0-3E9E354F2227}"/>
               </a:ext>
             </a:extLst>
           </p:cNvPr>
@@ -7023,7 +7035,7 @@
           <p:cNvPr id="173" name="TextBox 172">
             <a:extLst>
               <a:ext uri="{FF2B5EF4-FFF2-40B4-BE49-F238E27FC236}">
-                <a16:creationId xmlns:a16="http://schemas.microsoft.com/office/drawing/2014/main" id="{F2749A32-760F-4499-B593-70738991A69E}"/>
+                <a16:creationId xmlns:a16="http://schemas.microsoft.com/office/drawing/2014/main" xmlns="" id="{F2749A32-760F-4499-B593-70738991A69E}"/>
               </a:ext>
             </a:extLst>
           </p:cNvPr>
@@ -7058,7 +7070,7 @@
           <p:cNvPr id="174" name="TextBox 173">
             <a:extLst>
               <a:ext uri="{FF2B5EF4-FFF2-40B4-BE49-F238E27FC236}">
-                <a16:creationId xmlns:a16="http://schemas.microsoft.com/office/drawing/2014/main" id="{FA5DF48E-E540-4D75-A564-1B722F12FB99}"/>
+                <a16:creationId xmlns:a16="http://schemas.microsoft.com/office/drawing/2014/main" xmlns="" id="{FA5DF48E-E540-4D75-A564-1B722F12FB99}"/>
               </a:ext>
             </a:extLst>
           </p:cNvPr>
@@ -7093,7 +7105,7 @@
           <p:cNvPr id="175" name="TextBox 174">
             <a:extLst>
               <a:ext uri="{FF2B5EF4-FFF2-40B4-BE49-F238E27FC236}">
-                <a16:creationId xmlns:a16="http://schemas.microsoft.com/office/drawing/2014/main" id="{DBB8BFA0-DBEB-456D-B835-8E6BF95CBED4}"/>
+                <a16:creationId xmlns:a16="http://schemas.microsoft.com/office/drawing/2014/main" xmlns="" id="{DBB8BFA0-DBEB-456D-B835-8E6BF95CBED4}"/>
               </a:ext>
             </a:extLst>
           </p:cNvPr>
@@ -7128,7 +7140,7 @@
           <p:cNvPr id="177" name="TextBox 176">
             <a:extLst>
               <a:ext uri="{FF2B5EF4-FFF2-40B4-BE49-F238E27FC236}">
-                <a16:creationId xmlns:a16="http://schemas.microsoft.com/office/drawing/2014/main" id="{132309CA-EB51-4E57-AB15-4F96A2510424}"/>
+                <a16:creationId xmlns:a16="http://schemas.microsoft.com/office/drawing/2014/main" xmlns="" id="{132309CA-EB51-4E57-AB15-4F96A2510424}"/>
               </a:ext>
             </a:extLst>
           </p:cNvPr>
@@ -7163,7 +7175,7 @@
           <p:cNvPr id="183" name="Connector: Elbow 182">
             <a:extLst>
               <a:ext uri="{FF2B5EF4-FFF2-40B4-BE49-F238E27FC236}">
-                <a16:creationId xmlns:a16="http://schemas.microsoft.com/office/drawing/2014/main" id="{A23746F9-AF66-45CD-A397-F1BC32D609E0}"/>
+                <a16:creationId xmlns:a16="http://schemas.microsoft.com/office/drawing/2014/main" xmlns="" id="{A23746F9-AF66-45CD-A397-F1BC32D609E0}"/>
               </a:ext>
             </a:extLst>
           </p:cNvPr>
@@ -7513,7 +7525,7 @@
           <p:cNvPr id="70" name="TextBox 69">
             <a:extLst>
               <a:ext uri="{FF2B5EF4-FFF2-40B4-BE49-F238E27FC236}">
-                <a16:creationId xmlns:a16="http://schemas.microsoft.com/office/drawing/2014/main" id="{4A97F8ED-AE3E-444D-B3FD-EF24CB125651}"/>
+                <a16:creationId xmlns:a16="http://schemas.microsoft.com/office/drawing/2014/main" xmlns="" id="{4A97F8ED-AE3E-444D-B3FD-EF24CB125651}"/>
               </a:ext>
             </a:extLst>
           </p:cNvPr>
@@ -7572,7 +7584,7 @@
           <p:cNvPr id="74" name="Rectangle 73">
             <a:extLst>
               <a:ext uri="{FF2B5EF4-FFF2-40B4-BE49-F238E27FC236}">
-                <a16:creationId xmlns:a16="http://schemas.microsoft.com/office/drawing/2014/main" id="{C02AE149-738A-4BF4-9A46-DFA2979393B1}"/>
+                <a16:creationId xmlns:a16="http://schemas.microsoft.com/office/drawing/2014/main" xmlns="" id="{C02AE149-738A-4BF4-9A46-DFA2979393B1}"/>
               </a:ext>
             </a:extLst>
           </p:cNvPr>
@@ -7618,7 +7630,7 @@
           <p:cNvPr id="80" name="TextBox 79">
             <a:extLst>
               <a:ext uri="{FF2B5EF4-FFF2-40B4-BE49-F238E27FC236}">
-                <a16:creationId xmlns:a16="http://schemas.microsoft.com/office/drawing/2014/main" id="{50BFA0C1-5175-4E36-AC8A-BED98753ACF9}"/>
+                <a16:creationId xmlns:a16="http://schemas.microsoft.com/office/drawing/2014/main" xmlns="" id="{50BFA0C1-5175-4E36-AC8A-BED98753ACF9}"/>
               </a:ext>
             </a:extLst>
           </p:cNvPr>
@@ -7691,7 +7703,7 @@
           <p:cNvPr id="87" name="Rectangle 86">
             <a:extLst>
               <a:ext uri="{FF2B5EF4-FFF2-40B4-BE49-F238E27FC236}">
-                <a16:creationId xmlns:a16="http://schemas.microsoft.com/office/drawing/2014/main" id="{D987B2E7-8B3E-4A0C-B942-D65D26E341F4}"/>
+                <a16:creationId xmlns:a16="http://schemas.microsoft.com/office/drawing/2014/main" xmlns="" id="{D987B2E7-8B3E-4A0C-B942-D65D26E341F4}"/>
               </a:ext>
             </a:extLst>
           </p:cNvPr>
@@ -7737,7 +7749,7 @@
           <p:cNvPr id="88" name="Rectangle 87">
             <a:extLst>
               <a:ext uri="{FF2B5EF4-FFF2-40B4-BE49-F238E27FC236}">
-                <a16:creationId xmlns:a16="http://schemas.microsoft.com/office/drawing/2014/main" id="{DD4EE508-B559-410C-A71F-AF36AEFBEC4F}"/>
+                <a16:creationId xmlns:a16="http://schemas.microsoft.com/office/drawing/2014/main" xmlns="" id="{DD4EE508-B559-410C-A71F-AF36AEFBEC4F}"/>
               </a:ext>
             </a:extLst>
           </p:cNvPr>
@@ -7783,7 +7795,7 @@
           <p:cNvPr id="90" name="Rectangle 89">
             <a:extLst>
               <a:ext uri="{FF2B5EF4-FFF2-40B4-BE49-F238E27FC236}">
-                <a16:creationId xmlns:a16="http://schemas.microsoft.com/office/drawing/2014/main" id="{19F2B8FD-60C0-4FBA-9EE1-5E8903307ED9}"/>
+                <a16:creationId xmlns:a16="http://schemas.microsoft.com/office/drawing/2014/main" xmlns="" id="{19F2B8FD-60C0-4FBA-9EE1-5E8903307ED9}"/>
               </a:ext>
             </a:extLst>
           </p:cNvPr>
@@ -7829,7 +7841,7 @@
           <p:cNvPr id="91" name="Flowchart: Decision 90">
             <a:extLst>
               <a:ext uri="{FF2B5EF4-FFF2-40B4-BE49-F238E27FC236}">
-                <a16:creationId xmlns:a16="http://schemas.microsoft.com/office/drawing/2014/main" id="{D843C0B5-757D-415F-BADD-478AF81ED175}"/>
+                <a16:creationId xmlns:a16="http://schemas.microsoft.com/office/drawing/2014/main" xmlns="" id="{D843C0B5-757D-415F-BADD-478AF81ED175}"/>
               </a:ext>
             </a:extLst>
           </p:cNvPr>
@@ -7875,7 +7887,7 @@
           <p:cNvPr id="94" name="TextBox 93">
             <a:extLst>
               <a:ext uri="{FF2B5EF4-FFF2-40B4-BE49-F238E27FC236}">
-                <a16:creationId xmlns:a16="http://schemas.microsoft.com/office/drawing/2014/main" id="{DCA91F34-BD61-4C19-BAFB-A75725B3BF79}"/>
+                <a16:creationId xmlns:a16="http://schemas.microsoft.com/office/drawing/2014/main" xmlns="" id="{DCA91F34-BD61-4C19-BAFB-A75725B3BF79}"/>
               </a:ext>
             </a:extLst>
           </p:cNvPr>
@@ -7900,12 +7912,12 @@
           <a:p>
             <a:pPr algn="ctr"/>
             <a:r>
-              <a:rPr lang="en-IN" sz="1200" b="1" dirty="0" err="1">
+              <a:rPr lang="en-IN" sz="1200" b="1" smtClean="0">
                 <a:solidFill>
                   <a:schemeClr val="bg1"/>
                 </a:solidFill>
               </a:rPr>
-              <a:t>Aggresive</a:t>
+              <a:t>Aggressive</a:t>
             </a:r>
             <a:endParaRPr lang="en-IN" sz="1200" b="1" dirty="0">
               <a:solidFill>
@@ -7920,7 +7932,7 @@
           <p:cNvPr id="95" name="TextBox 94">
             <a:extLst>
               <a:ext uri="{FF2B5EF4-FFF2-40B4-BE49-F238E27FC236}">
-                <a16:creationId xmlns:a16="http://schemas.microsoft.com/office/drawing/2014/main" id="{6081199C-117E-4927-8418-CC92E56A46C1}"/>
+                <a16:creationId xmlns:a16="http://schemas.microsoft.com/office/drawing/2014/main" xmlns="" id="{6081199C-117E-4927-8418-CC92E56A46C1}"/>
               </a:ext>
             </a:extLst>
           </p:cNvPr>
@@ -7960,7 +7972,7 @@
           <p:cNvPr id="97" name="TextBox 96">
             <a:extLst>
               <a:ext uri="{FF2B5EF4-FFF2-40B4-BE49-F238E27FC236}">
-                <a16:creationId xmlns:a16="http://schemas.microsoft.com/office/drawing/2014/main" id="{EDA1FFFA-D300-40A8-96CE-E23ABFEB31B4}"/>
+                <a16:creationId xmlns:a16="http://schemas.microsoft.com/office/drawing/2014/main" xmlns="" id="{EDA1FFFA-D300-40A8-96CE-E23ABFEB31B4}"/>
               </a:ext>
             </a:extLst>
           </p:cNvPr>
@@ -8000,7 +8012,7 @@
           <p:cNvPr id="101" name="Connector: Elbow 100">
             <a:extLst>
               <a:ext uri="{FF2B5EF4-FFF2-40B4-BE49-F238E27FC236}">
-                <a16:creationId xmlns:a16="http://schemas.microsoft.com/office/drawing/2014/main" id="{CBAF200F-A791-4B0F-B0C7-311F5F0FB4A7}"/>
+                <a16:creationId xmlns:a16="http://schemas.microsoft.com/office/drawing/2014/main" xmlns="" id="{CBAF200F-A791-4B0F-B0C7-311F5F0FB4A7}"/>
               </a:ext>
             </a:extLst>
           </p:cNvPr>
@@ -8039,7 +8051,7 @@
           <p:cNvPr id="106" name="Rectangle 105">
             <a:extLst>
               <a:ext uri="{FF2B5EF4-FFF2-40B4-BE49-F238E27FC236}">
-                <a16:creationId xmlns:a16="http://schemas.microsoft.com/office/drawing/2014/main" id="{81946E50-5607-4B11-89B5-521BB3C431E7}"/>
+                <a16:creationId xmlns:a16="http://schemas.microsoft.com/office/drawing/2014/main" xmlns="" id="{81946E50-5607-4B11-89B5-521BB3C431E7}"/>
               </a:ext>
             </a:extLst>
           </p:cNvPr>
@@ -8085,7 +8097,7 @@
           <p:cNvPr id="107" name="Rectangle 106">
             <a:extLst>
               <a:ext uri="{FF2B5EF4-FFF2-40B4-BE49-F238E27FC236}">
-                <a16:creationId xmlns:a16="http://schemas.microsoft.com/office/drawing/2014/main" id="{130E79D5-9C9D-4BA9-9100-FC6C9F1DF5A6}"/>
+                <a16:creationId xmlns:a16="http://schemas.microsoft.com/office/drawing/2014/main" xmlns="" id="{130E79D5-9C9D-4BA9-9100-FC6C9F1DF5A6}"/>
               </a:ext>
             </a:extLst>
           </p:cNvPr>
@@ -8131,7 +8143,7 @@
           <p:cNvPr id="108" name="TextBox 107">
             <a:extLst>
               <a:ext uri="{FF2B5EF4-FFF2-40B4-BE49-F238E27FC236}">
-                <a16:creationId xmlns:a16="http://schemas.microsoft.com/office/drawing/2014/main" id="{72F825C1-9F1C-4AB2-8A5A-5906D64704E4}"/>
+                <a16:creationId xmlns:a16="http://schemas.microsoft.com/office/drawing/2014/main" xmlns="" id="{72F825C1-9F1C-4AB2-8A5A-5906D64704E4}"/>
               </a:ext>
             </a:extLst>
           </p:cNvPr>
@@ -8171,7 +8183,7 @@
           <p:cNvPr id="109" name="TextBox 108">
             <a:extLst>
               <a:ext uri="{FF2B5EF4-FFF2-40B4-BE49-F238E27FC236}">
-                <a16:creationId xmlns:a16="http://schemas.microsoft.com/office/drawing/2014/main" id="{EAA01326-13FC-4AE4-8025-2C2D3D87C06B}"/>
+                <a16:creationId xmlns:a16="http://schemas.microsoft.com/office/drawing/2014/main" xmlns="" id="{EAA01326-13FC-4AE4-8025-2C2D3D87C06B}"/>
               </a:ext>
             </a:extLst>
           </p:cNvPr>
@@ -8211,7 +8223,7 @@
           <p:cNvPr id="119" name="Connector: Elbow 118">
             <a:extLst>
               <a:ext uri="{FF2B5EF4-FFF2-40B4-BE49-F238E27FC236}">
-                <a16:creationId xmlns:a16="http://schemas.microsoft.com/office/drawing/2014/main" id="{56DE157D-EE6A-41C5-8151-1FC45DFDDFEB}"/>
+                <a16:creationId xmlns:a16="http://schemas.microsoft.com/office/drawing/2014/main" xmlns="" id="{56DE157D-EE6A-41C5-8151-1FC45DFDDFEB}"/>
               </a:ext>
             </a:extLst>
           </p:cNvPr>
@@ -8254,7 +8266,7 @@
           <p:cNvPr id="121" name="Connector: Elbow 120">
             <a:extLst>
               <a:ext uri="{FF2B5EF4-FFF2-40B4-BE49-F238E27FC236}">
-                <a16:creationId xmlns:a16="http://schemas.microsoft.com/office/drawing/2014/main" id="{CC9B43A8-3B74-4FD3-85C4-2DB00FEBC3F5}"/>
+                <a16:creationId xmlns:a16="http://schemas.microsoft.com/office/drawing/2014/main" xmlns="" id="{CC9B43A8-3B74-4FD3-85C4-2DB00FEBC3F5}"/>
               </a:ext>
             </a:extLst>
           </p:cNvPr>
@@ -8299,7 +8311,7 @@
           <p:cNvPr id="125" name="Connector: Elbow 124">
             <a:extLst>
               <a:ext uri="{FF2B5EF4-FFF2-40B4-BE49-F238E27FC236}">
-                <a16:creationId xmlns:a16="http://schemas.microsoft.com/office/drawing/2014/main" id="{322A6308-C0B2-43B7-A434-96764C3CE99D}"/>
+                <a16:creationId xmlns:a16="http://schemas.microsoft.com/office/drawing/2014/main" xmlns="" id="{322A6308-C0B2-43B7-A434-96764C3CE99D}"/>
               </a:ext>
             </a:extLst>
           </p:cNvPr>
@@ -8342,7 +8354,7 @@
           <p:cNvPr id="139" name="Rectangle 138">
             <a:extLst>
               <a:ext uri="{FF2B5EF4-FFF2-40B4-BE49-F238E27FC236}">
-                <a16:creationId xmlns:a16="http://schemas.microsoft.com/office/drawing/2014/main" id="{28D374E5-06ED-40D7-A632-66F8E0629D04}"/>
+                <a16:creationId xmlns:a16="http://schemas.microsoft.com/office/drawing/2014/main" xmlns="" id="{28D374E5-06ED-40D7-A632-66F8E0629D04}"/>
               </a:ext>
             </a:extLst>
           </p:cNvPr>
@@ -8388,7 +8400,7 @@
           <p:cNvPr id="142" name="TextBox 141">
             <a:extLst>
               <a:ext uri="{FF2B5EF4-FFF2-40B4-BE49-F238E27FC236}">
-                <a16:creationId xmlns:a16="http://schemas.microsoft.com/office/drawing/2014/main" id="{41E88371-96EA-4C24-B2BE-A3B120D76EF7}"/>
+                <a16:creationId xmlns:a16="http://schemas.microsoft.com/office/drawing/2014/main" xmlns="" id="{41E88371-96EA-4C24-B2BE-A3B120D76EF7}"/>
               </a:ext>
             </a:extLst>
           </p:cNvPr>
@@ -8428,7 +8440,7 @@
           <p:cNvPr id="145" name="Rectangle 144">
             <a:extLst>
               <a:ext uri="{FF2B5EF4-FFF2-40B4-BE49-F238E27FC236}">
-                <a16:creationId xmlns:a16="http://schemas.microsoft.com/office/drawing/2014/main" id="{89A50676-A6C6-4096-8631-38DDD5D9293A}"/>
+                <a16:creationId xmlns:a16="http://schemas.microsoft.com/office/drawing/2014/main" xmlns="" id="{89A50676-A6C6-4096-8631-38DDD5D9293A}"/>
               </a:ext>
             </a:extLst>
           </p:cNvPr>
@@ -8474,7 +8486,7 @@
           <p:cNvPr id="146" name="Rectangle 145">
             <a:extLst>
               <a:ext uri="{FF2B5EF4-FFF2-40B4-BE49-F238E27FC236}">
-                <a16:creationId xmlns:a16="http://schemas.microsoft.com/office/drawing/2014/main" id="{7FE732F5-66F4-49C2-893F-7A2552A3EFE2}"/>
+                <a16:creationId xmlns:a16="http://schemas.microsoft.com/office/drawing/2014/main" xmlns="" id="{7FE732F5-66F4-49C2-893F-7A2552A3EFE2}"/>
               </a:ext>
             </a:extLst>
           </p:cNvPr>
@@ -8520,7 +8532,7 @@
           <p:cNvPr id="150" name="TextBox 149">
             <a:extLst>
               <a:ext uri="{FF2B5EF4-FFF2-40B4-BE49-F238E27FC236}">
-                <a16:creationId xmlns:a16="http://schemas.microsoft.com/office/drawing/2014/main" id="{F276A2BC-4C1C-467D-9106-63F10BAB4549}"/>
+                <a16:creationId xmlns:a16="http://schemas.microsoft.com/office/drawing/2014/main" xmlns="" id="{F276A2BC-4C1C-467D-9106-63F10BAB4549}"/>
               </a:ext>
             </a:extLst>
           </p:cNvPr>
@@ -8582,7 +8594,7 @@
           <p:cNvPr id="153" name="TextBox 152">
             <a:extLst>
               <a:ext uri="{FF2B5EF4-FFF2-40B4-BE49-F238E27FC236}">
-                <a16:creationId xmlns:a16="http://schemas.microsoft.com/office/drawing/2014/main" id="{CB553CFA-BF9B-491B-86EA-44571A7F90C9}"/>
+                <a16:creationId xmlns:a16="http://schemas.microsoft.com/office/drawing/2014/main" xmlns="" id="{CB553CFA-BF9B-491B-86EA-44571A7F90C9}"/>
               </a:ext>
             </a:extLst>
           </p:cNvPr>
@@ -8630,7 +8642,7 @@
           <p:cNvPr id="168" name="Connector: Elbow 167">
             <a:extLst>
               <a:ext uri="{FF2B5EF4-FFF2-40B4-BE49-F238E27FC236}">
-                <a16:creationId xmlns:a16="http://schemas.microsoft.com/office/drawing/2014/main" id="{FB2ADCF2-EDF7-4CF3-AF75-FFC10B337224}"/>
+                <a16:creationId xmlns:a16="http://schemas.microsoft.com/office/drawing/2014/main" xmlns="" id="{FB2ADCF2-EDF7-4CF3-AF75-FFC10B337224}"/>
               </a:ext>
             </a:extLst>
           </p:cNvPr>
@@ -8673,7 +8685,7 @@
           <p:cNvPr id="43" name="Connector: Elbow 42">
             <a:extLst>
               <a:ext uri="{FF2B5EF4-FFF2-40B4-BE49-F238E27FC236}">
-                <a16:creationId xmlns:a16="http://schemas.microsoft.com/office/drawing/2014/main" id="{8D3FDF21-FBBF-4ED0-9E0C-B00679A6292D}"/>
+                <a16:creationId xmlns:a16="http://schemas.microsoft.com/office/drawing/2014/main" xmlns="" id="{8D3FDF21-FBBF-4ED0-9E0C-B00679A6292D}"/>
               </a:ext>
             </a:extLst>
           </p:cNvPr>
@@ -8712,7 +8724,7 @@
           <p:cNvPr id="47" name="Connector: Elbow 46">
             <a:extLst>
               <a:ext uri="{FF2B5EF4-FFF2-40B4-BE49-F238E27FC236}">
-                <a16:creationId xmlns:a16="http://schemas.microsoft.com/office/drawing/2014/main" id="{E8115F2D-3657-40B8-A9BF-471873119C0D}"/>
+                <a16:creationId xmlns:a16="http://schemas.microsoft.com/office/drawing/2014/main" xmlns="" id="{E8115F2D-3657-40B8-A9BF-471873119C0D}"/>
               </a:ext>
             </a:extLst>
           </p:cNvPr>
@@ -8751,7 +8763,7 @@
           <p:cNvPr id="53" name="Connector: Elbow 52">
             <a:extLst>
               <a:ext uri="{FF2B5EF4-FFF2-40B4-BE49-F238E27FC236}">
-                <a16:creationId xmlns:a16="http://schemas.microsoft.com/office/drawing/2014/main" id="{00B13188-AF6C-4E65-A0C5-17EB06B67359}"/>
+                <a16:creationId xmlns:a16="http://schemas.microsoft.com/office/drawing/2014/main" xmlns="" id="{00B13188-AF6C-4E65-A0C5-17EB06B67359}"/>
               </a:ext>
             </a:extLst>
           </p:cNvPr>
@@ -8794,7 +8806,7 @@
           <p:cNvPr id="111" name="TextBox 110">
             <a:extLst>
               <a:ext uri="{FF2B5EF4-FFF2-40B4-BE49-F238E27FC236}">
-                <a16:creationId xmlns:a16="http://schemas.microsoft.com/office/drawing/2014/main" id="{5F15E52F-B5D3-4CB7-882A-AA33486271F8}"/>
+                <a16:creationId xmlns:a16="http://schemas.microsoft.com/office/drawing/2014/main" xmlns="" id="{5F15E52F-B5D3-4CB7-882A-AA33486271F8}"/>
               </a:ext>
             </a:extLst>
           </p:cNvPr>
@@ -8864,7 +8876,7 @@
           <p:cNvPr id="118" name="TextBox 117">
             <a:extLst>
               <a:ext uri="{FF2B5EF4-FFF2-40B4-BE49-F238E27FC236}">
-                <a16:creationId xmlns:a16="http://schemas.microsoft.com/office/drawing/2014/main" id="{8E06F1A3-43B3-42E7-B34C-25FCF2CA0BC4}"/>
+                <a16:creationId xmlns:a16="http://schemas.microsoft.com/office/drawing/2014/main" xmlns="" id="{8E06F1A3-43B3-42E7-B34C-25FCF2CA0BC4}"/>
               </a:ext>
             </a:extLst>
           </p:cNvPr>
@@ -8934,7 +8946,7 @@
           <p:cNvPr id="64" name="Connector: Elbow 63">
             <a:extLst>
               <a:ext uri="{FF2B5EF4-FFF2-40B4-BE49-F238E27FC236}">
-                <a16:creationId xmlns:a16="http://schemas.microsoft.com/office/drawing/2014/main" id="{7599493B-77EE-4317-B0D3-D9EB52A60356}"/>
+                <a16:creationId xmlns:a16="http://schemas.microsoft.com/office/drawing/2014/main" xmlns="" id="{7599493B-77EE-4317-B0D3-D9EB52A60356}"/>
               </a:ext>
             </a:extLst>
           </p:cNvPr>

</xml_diff>